<commit_message>
Add two plotting functions, 2 slides in Data Summary.pptx and small edits
1. Two plotting functions for plotting pie charts with and without exploding the max percentage piece. 
2. Saved off the original df at beginning. Change to avoid SettingwithCopyWarning
3. Additional Comments
</commit_message>
<xml_diff>
--- a/Data_Summary.pptx
+++ b/Data_Summary.pptx
@@ -6,6 +6,7 @@
   </p:sldMasterIdLst>
   <p:sldIdLst>
     <p:sldId id="256" r:id="rId2"/>
+    <p:sldId id="257" r:id="rId3"/>
   </p:sldIdLst>
   <p:sldSz cx="12192000" cy="6858000"/>
   <p:notesSz cx="6858000" cy="9144000"/>
@@ -104,6 +105,11 @@
       </a:defRPr>
     </a:lvl9pPr>
   </p:defaultTextStyle>
+  <p:extLst>
+    <p:ext uri="{EFAFB233-063F-42B5-8137-9DF3F51BA10A}">
+      <p15:sldGuideLst xmlns:p15="http://schemas.microsoft.com/office/powerpoint/2012/main"/>
+    </p:ext>
+  </p:extLst>
 </p:presentation>
 </file>
 
@@ -3411,6 +3417,195 @@
 </p:sld>
 </file>
 
+<file path=ppt/slides/slide2.xml><?xml version="1.0" encoding="utf-8"?>
+<p:sld xmlns:a="http://schemas.openxmlformats.org/drawingml/2006/main" xmlns:r="http://schemas.openxmlformats.org/officeDocument/2006/relationships" xmlns:p="http://schemas.openxmlformats.org/presentationml/2006/main">
+  <p:cSld>
+    <p:spTree>
+      <p:nvGrpSpPr>
+        <p:cNvPr id="1" name=""/>
+        <p:cNvGrpSpPr/>
+        <p:nvPr/>
+      </p:nvGrpSpPr>
+      <p:grpSpPr>
+        <a:xfrm>
+          <a:off x="0" y="0"/>
+          <a:ext cx="0" cy="0"/>
+          <a:chOff x="0" y="0"/>
+          <a:chExt cx="0" cy="0"/>
+        </a:xfrm>
+      </p:grpSpPr>
+      <p:sp>
+        <p:nvSpPr>
+          <p:cNvPr id="2" name="Title 1">
+            <a:extLst>
+              <a:ext uri="{FF2B5EF4-FFF2-40B4-BE49-F238E27FC236}">
+                <a16:creationId xmlns:a16="http://schemas.microsoft.com/office/drawing/2014/main" id="{6480FB91-099A-4D54-B87A-E0E3056593EB}"/>
+              </a:ext>
+            </a:extLst>
+          </p:cNvPr>
+          <p:cNvSpPr>
+            <a:spLocks noGrp="1"/>
+          </p:cNvSpPr>
+          <p:nvPr>
+            <p:ph type="title"/>
+          </p:nvPr>
+        </p:nvSpPr>
+        <p:spPr/>
+        <p:txBody>
+          <a:bodyPr/>
+          <a:lstStyle/>
+          <a:p>
+            <a:r>
+              <a:rPr lang="en-GB" dirty="0"/>
+              <a:t>Data – First Impressions</a:t>
+            </a:r>
+          </a:p>
+        </p:txBody>
+      </p:sp>
+      <p:sp>
+        <p:nvSpPr>
+          <p:cNvPr id="3" name="Content Placeholder 2">
+            <a:extLst>
+              <a:ext uri="{FF2B5EF4-FFF2-40B4-BE49-F238E27FC236}">
+                <a16:creationId xmlns:a16="http://schemas.microsoft.com/office/drawing/2014/main" id="{04FE3E25-AC77-495B-9444-EA9667F9129E}"/>
+              </a:ext>
+            </a:extLst>
+          </p:cNvPr>
+          <p:cNvSpPr>
+            <a:spLocks noGrp="1"/>
+          </p:cNvSpPr>
+          <p:nvPr>
+            <p:ph idx="1"/>
+          </p:nvPr>
+        </p:nvSpPr>
+        <p:spPr>
+          <a:xfrm>
+            <a:off x="838200" y="1825625"/>
+            <a:ext cx="8664559" cy="4351338"/>
+          </a:xfrm>
+        </p:spPr>
+        <p:txBody>
+          <a:bodyPr/>
+          <a:lstStyle/>
+          <a:p>
+            <a:r>
+              <a:rPr lang="en-GB" dirty="0"/>
+              <a:t>260 Data Points</a:t>
+            </a:r>
+          </a:p>
+          <a:p>
+            <a:r>
+              <a:rPr lang="en-GB" dirty="0"/>
+              <a:t>15 different data attributes </a:t>
+            </a:r>
+          </a:p>
+          <a:p>
+            <a:r>
+              <a:rPr lang="en-GB" dirty="0"/>
+              <a:t>11 (maybe 12) different locations</a:t>
+            </a:r>
+          </a:p>
+          <a:p>
+            <a:r>
+              <a:rPr lang="en-GB" dirty="0"/>
+              <a:t>Minimum Distance: 0.52km</a:t>
+            </a:r>
+          </a:p>
+          <a:p>
+            <a:r>
+              <a:rPr lang="en-GB" dirty="0"/>
+              <a:t>Max Distance: 13.82km  :O</a:t>
+            </a:r>
+          </a:p>
+          <a:p>
+            <a:r>
+              <a:rPr lang="en-GB"/>
+              <a:t>Dates: 03/12/2017 – 30/07/2019</a:t>
+            </a:r>
+            <a:endParaRPr lang="en-GB" dirty="0"/>
+          </a:p>
+          <a:p>
+            <a:endParaRPr lang="en-GB" dirty="0"/>
+          </a:p>
+        </p:txBody>
+      </p:sp>
+      <p:pic>
+        <p:nvPicPr>
+          <p:cNvPr id="4" name="Picture 3">
+            <a:extLst>
+              <a:ext uri="{FF2B5EF4-FFF2-40B4-BE49-F238E27FC236}">
+                <a16:creationId xmlns:a16="http://schemas.microsoft.com/office/drawing/2014/main" id="{219E022A-5CBD-4579-891B-5A96A2DC8CB4}"/>
+              </a:ext>
+            </a:extLst>
+          </p:cNvPr>
+          <p:cNvPicPr>
+            <a:picLocks noChangeAspect="1"/>
+          </p:cNvPicPr>
+          <p:nvPr/>
+        </p:nvPicPr>
+        <p:blipFill rotWithShape="1">
+          <a:blip r:embed="rId2"/>
+          <a:srcRect t="4178" r="39572"/>
+          <a:stretch/>
+        </p:blipFill>
+        <p:spPr>
+          <a:xfrm>
+            <a:off x="9678929" y="1027906"/>
+            <a:ext cx="2141158" cy="5284532"/>
+          </a:xfrm>
+          <a:prstGeom prst="rect">
+            <a:avLst/>
+          </a:prstGeom>
+        </p:spPr>
+      </p:pic>
+      <p:sp>
+        <p:nvSpPr>
+          <p:cNvPr id="5" name="TextBox 4">
+            <a:extLst>
+              <a:ext uri="{FF2B5EF4-FFF2-40B4-BE49-F238E27FC236}">
+                <a16:creationId xmlns:a16="http://schemas.microsoft.com/office/drawing/2014/main" id="{08CC70BD-552D-4927-B286-BE053E00677E}"/>
+              </a:ext>
+            </a:extLst>
+          </p:cNvPr>
+          <p:cNvSpPr txBox="1"/>
+          <p:nvPr/>
+        </p:nvSpPr>
+        <p:spPr>
+          <a:xfrm>
+            <a:off x="9754430" y="504686"/>
+            <a:ext cx="2250216" cy="523220"/>
+          </a:xfrm>
+          <a:prstGeom prst="rect">
+            <a:avLst/>
+          </a:prstGeom>
+          <a:noFill/>
+        </p:spPr>
+        <p:txBody>
+          <a:bodyPr wrap="square" rtlCol="0">
+            <a:spAutoFit/>
+          </a:bodyPr>
+          <a:lstStyle/>
+          <a:p>
+            <a:r>
+              <a:rPr lang="en-GB" sz="2800" dirty="0"/>
+              <a:t>Attributes</a:t>
+            </a:r>
+          </a:p>
+        </p:txBody>
+      </p:sp>
+    </p:spTree>
+    <p:extLst>
+      <p:ext uri="{BB962C8B-B14F-4D97-AF65-F5344CB8AC3E}">
+        <p14:creationId xmlns:p14="http://schemas.microsoft.com/office/powerpoint/2010/main" val="3391182616"/>
+      </p:ext>
+    </p:extLst>
+  </p:cSld>
+  <p:clrMapOvr>
+    <a:masterClrMapping/>
+  </p:clrMapOvr>
+</p:sld>
+</file>
+
 <file path=ppt/theme/theme1.xml><?xml version="1.0" encoding="utf-8"?>
 <a:theme xmlns:a="http://schemas.openxmlformats.org/drawingml/2006/main" name="Office Theme">
   <a:themeElements>

</xml_diff>

<commit_message>
Add 6 images to summary report
6 images saved and added to summary report.
</commit_message>
<xml_diff>
--- a/Data_Summary.pptx
+++ b/Data_Summary.pptx
@@ -6,7 +6,21 @@
   </p:sldMasterIdLst>
   <p:sldIdLst>
     <p:sldId id="256" r:id="rId2"/>
-    <p:sldId id="257" r:id="rId3"/>
+    <p:sldId id="259" r:id="rId3"/>
+    <p:sldId id="260" r:id="rId4"/>
+    <p:sldId id="261" r:id="rId5"/>
+    <p:sldId id="257" r:id="rId6"/>
+    <p:sldId id="258" r:id="rId7"/>
+    <p:sldId id="262" r:id="rId8"/>
+    <p:sldId id="264" r:id="rId9"/>
+    <p:sldId id="265" r:id="rId10"/>
+    <p:sldId id="267" r:id="rId11"/>
+    <p:sldId id="266" r:id="rId12"/>
+    <p:sldId id="268" r:id="rId13"/>
+    <p:sldId id="263" r:id="rId14"/>
+    <p:sldId id="269" r:id="rId15"/>
+    <p:sldId id="270" r:id="rId16"/>
+    <p:sldId id="271" r:id="rId17"/>
   </p:sldIdLst>
   <p:sldSz cx="12192000" cy="6858000"/>
   <p:notesSz cx="6858000" cy="9144000"/>
@@ -3417,6 +3431,1255 @@
 </p:sld>
 </file>
 
+<file path=ppt/slides/slide10.xml><?xml version="1.0" encoding="utf-8"?>
+<p:sld xmlns:a="http://schemas.openxmlformats.org/drawingml/2006/main" xmlns:r="http://schemas.openxmlformats.org/officeDocument/2006/relationships" xmlns:p="http://schemas.openxmlformats.org/presentationml/2006/main">
+  <p:cSld>
+    <p:spTree>
+      <p:nvGrpSpPr>
+        <p:cNvPr id="1" name=""/>
+        <p:cNvGrpSpPr/>
+        <p:nvPr/>
+      </p:nvGrpSpPr>
+      <p:grpSpPr>
+        <a:xfrm>
+          <a:off x="0" y="0"/>
+          <a:ext cx="0" cy="0"/>
+          <a:chOff x="0" y="0"/>
+          <a:chExt cx="0" cy="0"/>
+        </a:xfrm>
+      </p:grpSpPr>
+      <p:pic>
+        <p:nvPicPr>
+          <p:cNvPr id="7" name="Picture 6" descr="A screenshot of a social media post&#10;&#10;Description automatically generated">
+            <a:extLst>
+              <a:ext uri="{FF2B5EF4-FFF2-40B4-BE49-F238E27FC236}">
+                <a16:creationId xmlns:a16="http://schemas.microsoft.com/office/drawing/2014/main" id="{5861CA30-3FA2-4EC2-8604-83F1A02EF719}"/>
+              </a:ext>
+            </a:extLst>
+          </p:cNvPr>
+          <p:cNvPicPr>
+            <a:picLocks noChangeAspect="1"/>
+          </p:cNvPicPr>
+          <p:nvPr/>
+        </p:nvPicPr>
+        <p:blipFill>
+          <a:blip r:embed="rId2">
+            <a:extLst>
+              <a:ext uri="{28A0092B-C50C-407E-A947-70E740481C1C}">
+                <a14:useLocalDpi xmlns:a14="http://schemas.microsoft.com/office/drawing/2010/main" val="0"/>
+              </a:ext>
+            </a:extLst>
+          </a:blip>
+          <a:stretch>
+            <a:fillRect/>
+          </a:stretch>
+        </p:blipFill>
+        <p:spPr>
+          <a:xfrm>
+            <a:off x="1446741" y="278682"/>
+            <a:ext cx="9298518" cy="6300635"/>
+          </a:xfrm>
+          <a:prstGeom prst="rect">
+            <a:avLst/>
+          </a:prstGeom>
+        </p:spPr>
+      </p:pic>
+      <p:sp>
+        <p:nvSpPr>
+          <p:cNvPr id="8" name="TextBox 7">
+            <a:extLst>
+              <a:ext uri="{FF2B5EF4-FFF2-40B4-BE49-F238E27FC236}">
+                <a16:creationId xmlns:a16="http://schemas.microsoft.com/office/drawing/2014/main" id="{551B25CD-421C-4AD7-A520-C3594F0BAD43}"/>
+              </a:ext>
+            </a:extLst>
+          </p:cNvPr>
+          <p:cNvSpPr txBox="1"/>
+          <p:nvPr/>
+        </p:nvSpPr>
+        <p:spPr>
+          <a:xfrm>
+            <a:off x="1295739" y="5427677"/>
+            <a:ext cx="2718033" cy="923330"/>
+          </a:xfrm>
+          <a:prstGeom prst="rect">
+            <a:avLst/>
+          </a:prstGeom>
+          <a:solidFill>
+            <a:schemeClr val="bg1"/>
+          </a:solidFill>
+        </p:spPr>
+        <p:txBody>
+          <a:bodyPr wrap="square" rtlCol="0">
+            <a:spAutoFit/>
+          </a:bodyPr>
+          <a:lstStyle/>
+          <a:p>
+            <a:r>
+              <a:rPr lang="en-GB" dirty="0"/>
+              <a:t>Woodley runs are all before approx. March 2018.</a:t>
+            </a:r>
+          </a:p>
+        </p:txBody>
+      </p:sp>
+      <p:sp>
+        <p:nvSpPr>
+          <p:cNvPr id="9" name="Oval 8">
+            <a:extLst>
+              <a:ext uri="{FF2B5EF4-FFF2-40B4-BE49-F238E27FC236}">
+                <a16:creationId xmlns:a16="http://schemas.microsoft.com/office/drawing/2014/main" id="{8CAC5568-EFEA-4899-AA02-E63462040464}"/>
+              </a:ext>
+            </a:extLst>
+          </p:cNvPr>
+          <p:cNvSpPr/>
+          <p:nvPr/>
+        </p:nvSpPr>
+        <p:spPr>
+          <a:xfrm rot="1257560">
+            <a:off x="2506220" y="3059110"/>
+            <a:ext cx="937322" cy="2357727"/>
+          </a:xfrm>
+          <a:prstGeom prst="ellipse">
+            <a:avLst/>
+          </a:prstGeom>
+          <a:noFill/>
+        </p:spPr>
+        <p:style>
+          <a:lnRef idx="2">
+            <a:schemeClr val="accent1">
+              <a:shade val="50000"/>
+            </a:schemeClr>
+          </a:lnRef>
+          <a:fillRef idx="1">
+            <a:schemeClr val="accent1"/>
+          </a:fillRef>
+          <a:effectRef idx="0">
+            <a:schemeClr val="accent1"/>
+          </a:effectRef>
+          <a:fontRef idx="minor">
+            <a:schemeClr val="lt1"/>
+          </a:fontRef>
+        </p:style>
+        <p:txBody>
+          <a:bodyPr rtlCol="0" anchor="ctr"/>
+          <a:lstStyle/>
+          <a:p>
+            <a:pPr algn="ctr"/>
+            <a:endParaRPr lang="en-GB"/>
+          </a:p>
+        </p:txBody>
+      </p:sp>
+      <p:cxnSp>
+        <p:nvCxnSpPr>
+          <p:cNvPr id="10" name="Straight Connector 9">
+            <a:extLst>
+              <a:ext uri="{FF2B5EF4-FFF2-40B4-BE49-F238E27FC236}">
+                <a16:creationId xmlns:a16="http://schemas.microsoft.com/office/drawing/2014/main" id="{67132F21-B2D9-40ED-9B49-FD9A8CC63560}"/>
+              </a:ext>
+            </a:extLst>
+          </p:cNvPr>
+          <p:cNvCxnSpPr>
+            <a:cxnSpLocks/>
+          </p:cNvCxnSpPr>
+          <p:nvPr/>
+        </p:nvCxnSpPr>
+        <p:spPr>
+          <a:xfrm flipV="1">
+            <a:off x="5556234" y="704677"/>
+            <a:ext cx="0" cy="4060270"/>
+          </a:xfrm>
+          <a:prstGeom prst="line">
+            <a:avLst/>
+          </a:prstGeom>
+          <a:ln w="19050">
+            <a:solidFill>
+              <a:schemeClr val="tx1"/>
+            </a:solidFill>
+            <a:prstDash val="dash"/>
+          </a:ln>
+        </p:spPr>
+        <p:style>
+          <a:lnRef idx="1">
+            <a:schemeClr val="accent1"/>
+          </a:lnRef>
+          <a:fillRef idx="0">
+            <a:schemeClr val="accent1"/>
+          </a:fillRef>
+          <a:effectRef idx="0">
+            <a:schemeClr val="accent1"/>
+          </a:effectRef>
+          <a:fontRef idx="minor">
+            <a:schemeClr val="tx1"/>
+          </a:fontRef>
+        </p:style>
+      </p:cxnSp>
+      <p:cxnSp>
+        <p:nvCxnSpPr>
+          <p:cNvPr id="11" name="Straight Connector 10">
+            <a:extLst>
+              <a:ext uri="{FF2B5EF4-FFF2-40B4-BE49-F238E27FC236}">
+                <a16:creationId xmlns:a16="http://schemas.microsoft.com/office/drawing/2014/main" id="{8749D3D9-16AC-4EEB-8427-2C6829C925AA}"/>
+              </a:ext>
+            </a:extLst>
+          </p:cNvPr>
+          <p:cNvCxnSpPr>
+            <a:cxnSpLocks/>
+          </p:cNvCxnSpPr>
+          <p:nvPr/>
+        </p:nvCxnSpPr>
+        <p:spPr>
+          <a:xfrm flipV="1">
+            <a:off x="5784135" y="704677"/>
+            <a:ext cx="0" cy="4135771"/>
+          </a:xfrm>
+          <a:prstGeom prst="line">
+            <a:avLst/>
+          </a:prstGeom>
+          <a:ln w="19050">
+            <a:solidFill>
+              <a:schemeClr val="tx1"/>
+            </a:solidFill>
+            <a:prstDash val="dash"/>
+          </a:ln>
+        </p:spPr>
+        <p:style>
+          <a:lnRef idx="1">
+            <a:schemeClr val="accent1"/>
+          </a:lnRef>
+          <a:fillRef idx="0">
+            <a:schemeClr val="accent1"/>
+          </a:fillRef>
+          <a:effectRef idx="0">
+            <a:schemeClr val="accent1"/>
+          </a:effectRef>
+          <a:fontRef idx="minor">
+            <a:schemeClr val="tx1"/>
+          </a:fontRef>
+        </p:style>
+      </p:cxnSp>
+      <p:sp>
+        <p:nvSpPr>
+          <p:cNvPr id="12" name="TextBox 11">
+            <a:extLst>
+              <a:ext uri="{FF2B5EF4-FFF2-40B4-BE49-F238E27FC236}">
+                <a16:creationId xmlns:a16="http://schemas.microsoft.com/office/drawing/2014/main" id="{BCDE75E7-F579-4254-9DF9-BC8C367FD16D}"/>
+              </a:ext>
+            </a:extLst>
+          </p:cNvPr>
+          <p:cNvSpPr txBox="1"/>
+          <p:nvPr/>
+        </p:nvSpPr>
+        <p:spPr>
+          <a:xfrm>
+            <a:off x="5944941" y="5056193"/>
+            <a:ext cx="1098954" cy="923330"/>
+          </a:xfrm>
+          <a:prstGeom prst="rect">
+            <a:avLst/>
+          </a:prstGeom>
+          <a:noFill/>
+        </p:spPr>
+        <p:txBody>
+          <a:bodyPr wrap="square" rtlCol="0">
+            <a:spAutoFit/>
+          </a:bodyPr>
+          <a:lstStyle/>
+          <a:p>
+            <a:r>
+              <a:rPr lang="en-GB" dirty="0"/>
+              <a:t>Approx. 1 month gap</a:t>
+            </a:r>
+          </a:p>
+        </p:txBody>
+      </p:sp>
+      <p:cxnSp>
+        <p:nvCxnSpPr>
+          <p:cNvPr id="13" name="Straight Arrow Connector 12">
+            <a:extLst>
+              <a:ext uri="{FF2B5EF4-FFF2-40B4-BE49-F238E27FC236}">
+                <a16:creationId xmlns:a16="http://schemas.microsoft.com/office/drawing/2014/main" id="{35EB89A2-5717-47FD-9AD0-7DB96F986203}"/>
+              </a:ext>
+            </a:extLst>
+          </p:cNvPr>
+          <p:cNvCxnSpPr>
+            <a:cxnSpLocks/>
+            <a:stCxn id="12" idx="0"/>
+          </p:cNvCxnSpPr>
+          <p:nvPr/>
+        </p:nvCxnSpPr>
+        <p:spPr>
+          <a:xfrm flipH="1" flipV="1">
+            <a:off x="5835882" y="4597167"/>
+            <a:ext cx="658536" cy="459026"/>
+          </a:xfrm>
+          <a:prstGeom prst="straightConnector1">
+            <a:avLst/>
+          </a:prstGeom>
+          <a:ln>
+            <a:tailEnd type="triangle"/>
+          </a:ln>
+        </p:spPr>
+        <p:style>
+          <a:lnRef idx="1">
+            <a:schemeClr val="accent1"/>
+          </a:lnRef>
+          <a:fillRef idx="0">
+            <a:schemeClr val="accent1"/>
+          </a:fillRef>
+          <a:effectRef idx="0">
+            <a:schemeClr val="accent1"/>
+          </a:effectRef>
+          <a:fontRef idx="minor">
+            <a:schemeClr val="tx1"/>
+          </a:fontRef>
+        </p:style>
+      </p:cxnSp>
+      <p:sp>
+        <p:nvSpPr>
+          <p:cNvPr id="14" name="TextBox 13">
+            <a:extLst>
+              <a:ext uri="{FF2B5EF4-FFF2-40B4-BE49-F238E27FC236}">
+                <a16:creationId xmlns:a16="http://schemas.microsoft.com/office/drawing/2014/main" id="{23C77B2E-BBD6-4212-9198-B48358DEFD1A}"/>
+              </a:ext>
+            </a:extLst>
+          </p:cNvPr>
+          <p:cNvSpPr txBox="1"/>
+          <p:nvPr/>
+        </p:nvSpPr>
+        <p:spPr>
+          <a:xfrm>
+            <a:off x="7358687" y="2248250"/>
+            <a:ext cx="1812020" cy="369332"/>
+          </a:xfrm>
+          <a:prstGeom prst="rect">
+            <a:avLst/>
+          </a:prstGeom>
+          <a:noFill/>
+        </p:spPr>
+        <p:txBody>
+          <a:bodyPr wrap="square" rtlCol="0">
+            <a:spAutoFit/>
+          </a:bodyPr>
+          <a:lstStyle/>
+          <a:p>
+            <a:r>
+              <a:rPr lang="en-GB" dirty="0"/>
+              <a:t>Periodic 10k runs</a:t>
+            </a:r>
+          </a:p>
+        </p:txBody>
+      </p:sp>
+      <p:sp>
+        <p:nvSpPr>
+          <p:cNvPr id="2" name="TextBox 1">
+            <a:extLst>
+              <a:ext uri="{FF2B5EF4-FFF2-40B4-BE49-F238E27FC236}">
+                <a16:creationId xmlns:a16="http://schemas.microsoft.com/office/drawing/2014/main" id="{D8EF14D9-65F1-4F77-9626-A2F3C247EFFA}"/>
+              </a:ext>
+            </a:extLst>
+          </p:cNvPr>
+          <p:cNvSpPr txBox="1"/>
+          <p:nvPr/>
+        </p:nvSpPr>
+        <p:spPr>
+          <a:xfrm>
+            <a:off x="184558" y="645952"/>
+            <a:ext cx="1669397" cy="1200329"/>
+          </a:xfrm>
+          <a:prstGeom prst="rect">
+            <a:avLst/>
+          </a:prstGeom>
+          <a:noFill/>
+        </p:spPr>
+        <p:txBody>
+          <a:bodyPr wrap="square" rtlCol="0">
+            <a:spAutoFit/>
+          </a:bodyPr>
+          <a:lstStyle/>
+          <a:p>
+            <a:r>
+              <a:rPr lang="en-GB" dirty="0"/>
+              <a:t>Axis limited to 100 minutes to avoid 180min outlier. </a:t>
+            </a:r>
+          </a:p>
+        </p:txBody>
+      </p:sp>
+    </p:spTree>
+    <p:extLst>
+      <p:ext uri="{BB962C8B-B14F-4D97-AF65-F5344CB8AC3E}">
+        <p14:creationId xmlns:p14="http://schemas.microsoft.com/office/powerpoint/2010/main" val="479951623"/>
+      </p:ext>
+    </p:extLst>
+  </p:cSld>
+  <p:clrMapOvr>
+    <a:masterClrMapping/>
+  </p:clrMapOvr>
+</p:sld>
+</file>
+
+<file path=ppt/slides/slide11.xml><?xml version="1.0" encoding="utf-8"?>
+<p:sld xmlns:a="http://schemas.openxmlformats.org/drawingml/2006/main" xmlns:r="http://schemas.openxmlformats.org/officeDocument/2006/relationships" xmlns:p="http://schemas.openxmlformats.org/presentationml/2006/main">
+  <p:cSld>
+    <p:spTree>
+      <p:nvGrpSpPr>
+        <p:cNvPr id="1" name=""/>
+        <p:cNvGrpSpPr/>
+        <p:nvPr/>
+      </p:nvGrpSpPr>
+      <p:grpSpPr>
+        <a:xfrm>
+          <a:off x="0" y="0"/>
+          <a:ext cx="0" cy="0"/>
+          <a:chOff x="0" y="0"/>
+          <a:chExt cx="0" cy="0"/>
+        </a:xfrm>
+      </p:grpSpPr>
+      <p:pic>
+        <p:nvPicPr>
+          <p:cNvPr id="18" name="Picture 17" descr="A close up of a map&#10;&#10;Description automatically generated">
+            <a:extLst>
+              <a:ext uri="{FF2B5EF4-FFF2-40B4-BE49-F238E27FC236}">
+                <a16:creationId xmlns:a16="http://schemas.microsoft.com/office/drawing/2014/main" id="{1464FD78-6D0C-4238-BD0C-03CEB9457E2A}"/>
+              </a:ext>
+            </a:extLst>
+          </p:cNvPr>
+          <p:cNvPicPr>
+            <a:picLocks noChangeAspect="1"/>
+          </p:cNvPicPr>
+          <p:nvPr/>
+        </p:nvPicPr>
+        <p:blipFill>
+          <a:blip r:embed="rId2">
+            <a:extLst>
+              <a:ext uri="{28A0092B-C50C-407E-A947-70E740481C1C}">
+                <a14:useLocalDpi xmlns:a14="http://schemas.microsoft.com/office/drawing/2010/main" val="0"/>
+              </a:ext>
+            </a:extLst>
+          </a:blip>
+          <a:stretch>
+            <a:fillRect/>
+          </a:stretch>
+        </p:blipFill>
+        <p:spPr>
+          <a:xfrm>
+            <a:off x="565354" y="0"/>
+            <a:ext cx="11061291" cy="6858000"/>
+          </a:xfrm>
+          <a:prstGeom prst="rect">
+            <a:avLst/>
+          </a:prstGeom>
+        </p:spPr>
+      </p:pic>
+    </p:spTree>
+    <p:extLst>
+      <p:ext uri="{BB962C8B-B14F-4D97-AF65-F5344CB8AC3E}">
+        <p14:creationId xmlns:p14="http://schemas.microsoft.com/office/powerpoint/2010/main" val="1856502500"/>
+      </p:ext>
+    </p:extLst>
+  </p:cSld>
+  <p:clrMapOvr>
+    <a:masterClrMapping/>
+  </p:clrMapOvr>
+</p:sld>
+</file>
+
+<file path=ppt/slides/slide12.xml><?xml version="1.0" encoding="utf-8"?>
+<p:sld xmlns:a="http://schemas.openxmlformats.org/drawingml/2006/main" xmlns:r="http://schemas.openxmlformats.org/officeDocument/2006/relationships" xmlns:p="http://schemas.openxmlformats.org/presentationml/2006/main">
+  <p:cSld>
+    <p:spTree>
+      <p:nvGrpSpPr>
+        <p:cNvPr id="1" name=""/>
+        <p:cNvGrpSpPr/>
+        <p:nvPr/>
+      </p:nvGrpSpPr>
+      <p:grpSpPr>
+        <a:xfrm>
+          <a:off x="0" y="0"/>
+          <a:ext cx="0" cy="0"/>
+          <a:chOff x="0" y="0"/>
+          <a:chExt cx="0" cy="0"/>
+        </a:xfrm>
+      </p:grpSpPr>
+      <p:pic>
+        <p:nvPicPr>
+          <p:cNvPr id="18" name="Picture 17" descr="A close up of a map&#10;&#10;Description automatically generated">
+            <a:extLst>
+              <a:ext uri="{FF2B5EF4-FFF2-40B4-BE49-F238E27FC236}">
+                <a16:creationId xmlns:a16="http://schemas.microsoft.com/office/drawing/2014/main" id="{1464FD78-6D0C-4238-BD0C-03CEB9457E2A}"/>
+              </a:ext>
+            </a:extLst>
+          </p:cNvPr>
+          <p:cNvPicPr>
+            <a:picLocks noChangeAspect="1"/>
+          </p:cNvPicPr>
+          <p:nvPr/>
+        </p:nvPicPr>
+        <p:blipFill>
+          <a:blip r:embed="rId2">
+            <a:extLst>
+              <a:ext uri="{28A0092B-C50C-407E-A947-70E740481C1C}">
+                <a14:useLocalDpi xmlns:a14="http://schemas.microsoft.com/office/drawing/2010/main" val="0"/>
+              </a:ext>
+            </a:extLst>
+          </a:blip>
+          <a:stretch>
+            <a:fillRect/>
+          </a:stretch>
+        </p:blipFill>
+        <p:spPr>
+          <a:xfrm>
+            <a:off x="565354" y="0"/>
+            <a:ext cx="11061291" cy="6858000"/>
+          </a:xfrm>
+          <a:prstGeom prst="rect">
+            <a:avLst/>
+          </a:prstGeom>
+        </p:spPr>
+      </p:pic>
+      <p:sp>
+        <p:nvSpPr>
+          <p:cNvPr id="2" name="TextBox 1">
+            <a:extLst>
+              <a:ext uri="{FF2B5EF4-FFF2-40B4-BE49-F238E27FC236}">
+                <a16:creationId xmlns:a16="http://schemas.microsoft.com/office/drawing/2014/main" id="{B7CE46A8-DD70-4025-B574-BFC80045E317}"/>
+              </a:ext>
+            </a:extLst>
+          </p:cNvPr>
+          <p:cNvSpPr txBox="1"/>
+          <p:nvPr/>
+        </p:nvSpPr>
+        <p:spPr>
+          <a:xfrm>
+            <a:off x="9319260" y="4549140"/>
+            <a:ext cx="1996440" cy="646331"/>
+          </a:xfrm>
+          <a:prstGeom prst="rect">
+            <a:avLst/>
+          </a:prstGeom>
+          <a:noFill/>
+        </p:spPr>
+        <p:txBody>
+          <a:bodyPr wrap="square" rtlCol="0">
+            <a:spAutoFit/>
+          </a:bodyPr>
+          <a:lstStyle/>
+          <a:p>
+            <a:r>
+              <a:rPr lang="en-GB" dirty="0"/>
+              <a:t>No clear trends across the 5k runs. </a:t>
+            </a:r>
+          </a:p>
+        </p:txBody>
+      </p:sp>
+      <p:sp>
+        <p:nvSpPr>
+          <p:cNvPr id="4" name="TextBox 3">
+            <a:extLst>
+              <a:ext uri="{FF2B5EF4-FFF2-40B4-BE49-F238E27FC236}">
+                <a16:creationId xmlns:a16="http://schemas.microsoft.com/office/drawing/2014/main" id="{A68D8A80-349E-4093-947B-B042A73AA791}"/>
+              </a:ext>
+            </a:extLst>
+          </p:cNvPr>
+          <p:cNvSpPr txBox="1"/>
+          <p:nvPr/>
+        </p:nvSpPr>
+        <p:spPr>
+          <a:xfrm>
+            <a:off x="8130540" y="1847195"/>
+            <a:ext cx="2377440" cy="923330"/>
+          </a:xfrm>
+          <a:prstGeom prst="rect">
+            <a:avLst/>
+          </a:prstGeom>
+          <a:noFill/>
+        </p:spPr>
+        <p:txBody>
+          <a:bodyPr wrap="square" rtlCol="0">
+            <a:spAutoFit/>
+          </a:bodyPr>
+          <a:lstStyle/>
+          <a:p>
+            <a:r>
+              <a:rPr lang="en-GB" dirty="0"/>
+              <a:t>10k runs are dominated by Saturdays. </a:t>
+            </a:r>
+          </a:p>
+        </p:txBody>
+      </p:sp>
+      <p:sp>
+        <p:nvSpPr>
+          <p:cNvPr id="3" name="TextBox 2">
+            <a:extLst>
+              <a:ext uri="{FF2B5EF4-FFF2-40B4-BE49-F238E27FC236}">
+                <a16:creationId xmlns:a16="http://schemas.microsoft.com/office/drawing/2014/main" id="{8267E8D0-5598-497C-9054-4F50719184BB}"/>
+              </a:ext>
+            </a:extLst>
+          </p:cNvPr>
+          <p:cNvSpPr txBox="1"/>
+          <p:nvPr/>
+        </p:nvSpPr>
+        <p:spPr>
+          <a:xfrm>
+            <a:off x="4137660" y="297180"/>
+            <a:ext cx="1379220" cy="923330"/>
+          </a:xfrm>
+          <a:prstGeom prst="rect">
+            <a:avLst/>
+          </a:prstGeom>
+          <a:noFill/>
+        </p:spPr>
+        <p:txBody>
+          <a:bodyPr wrap="square" rtlCol="0">
+            <a:spAutoFit/>
+          </a:bodyPr>
+          <a:lstStyle/>
+          <a:p>
+            <a:r>
+              <a:rPr lang="en-GB" dirty="0"/>
+              <a:t>Fridays are a quiet day for running. </a:t>
+            </a:r>
+          </a:p>
+        </p:txBody>
+      </p:sp>
+      <p:sp>
+        <p:nvSpPr>
+          <p:cNvPr id="6" name="TextBox 5">
+            <a:extLst>
+              <a:ext uri="{FF2B5EF4-FFF2-40B4-BE49-F238E27FC236}">
+                <a16:creationId xmlns:a16="http://schemas.microsoft.com/office/drawing/2014/main" id="{D4BC2D2D-FF56-42B3-92FF-FC4239DC1291}"/>
+              </a:ext>
+            </a:extLst>
+          </p:cNvPr>
+          <p:cNvSpPr txBox="1"/>
+          <p:nvPr/>
+        </p:nvSpPr>
+        <p:spPr>
+          <a:xfrm>
+            <a:off x="6526341" y="221679"/>
+            <a:ext cx="2628043" cy="923330"/>
+          </a:xfrm>
+          <a:prstGeom prst="rect">
+            <a:avLst/>
+          </a:prstGeom>
+          <a:noFill/>
+        </p:spPr>
+        <p:txBody>
+          <a:bodyPr wrap="square" rtlCol="0">
+            <a:spAutoFit/>
+          </a:bodyPr>
+          <a:lstStyle/>
+          <a:p>
+            <a:r>
+              <a:rPr lang="en-GB" dirty="0"/>
+              <a:t>Axis limited to 100 minutes to avoid 180min outlier. </a:t>
+            </a:r>
+          </a:p>
+        </p:txBody>
+      </p:sp>
+    </p:spTree>
+    <p:extLst>
+      <p:ext uri="{BB962C8B-B14F-4D97-AF65-F5344CB8AC3E}">
+        <p14:creationId xmlns:p14="http://schemas.microsoft.com/office/powerpoint/2010/main" val="1505065678"/>
+      </p:ext>
+    </p:extLst>
+  </p:cSld>
+  <p:clrMapOvr>
+    <a:masterClrMapping/>
+  </p:clrMapOvr>
+</p:sld>
+</file>
+
+<file path=ppt/slides/slide13.xml><?xml version="1.0" encoding="utf-8"?>
+<p:sld xmlns:a="http://schemas.openxmlformats.org/drawingml/2006/main" xmlns:r="http://schemas.openxmlformats.org/officeDocument/2006/relationships" xmlns:p="http://schemas.openxmlformats.org/presentationml/2006/main">
+  <p:cSld>
+    <p:spTree>
+      <p:nvGrpSpPr>
+        <p:cNvPr id="1" name=""/>
+        <p:cNvGrpSpPr/>
+        <p:nvPr/>
+      </p:nvGrpSpPr>
+      <p:grpSpPr>
+        <a:xfrm>
+          <a:off x="0" y="0"/>
+          <a:ext cx="0" cy="0"/>
+          <a:chOff x="0" y="0"/>
+          <a:chExt cx="0" cy="0"/>
+        </a:xfrm>
+      </p:grpSpPr>
+      <p:sp>
+        <p:nvSpPr>
+          <p:cNvPr id="2" name="Title 1">
+            <a:extLst>
+              <a:ext uri="{FF2B5EF4-FFF2-40B4-BE49-F238E27FC236}">
+                <a16:creationId xmlns:a16="http://schemas.microsoft.com/office/drawing/2014/main" id="{74E9F826-5C6E-4474-BE7E-DEC7BF10A7D7}"/>
+              </a:ext>
+            </a:extLst>
+          </p:cNvPr>
+          <p:cNvSpPr>
+            <a:spLocks noGrp="1"/>
+          </p:cNvSpPr>
+          <p:nvPr>
+            <p:ph type="title"/>
+          </p:nvPr>
+        </p:nvSpPr>
+        <p:spPr/>
+        <p:txBody>
+          <a:bodyPr/>
+          <a:lstStyle/>
+          <a:p>
+            <a:r>
+              <a:rPr lang="en-GB" dirty="0"/>
+              <a:t>Contents</a:t>
+            </a:r>
+          </a:p>
+        </p:txBody>
+      </p:sp>
+      <p:sp>
+        <p:nvSpPr>
+          <p:cNvPr id="3" name="Content Placeholder 2">
+            <a:extLst>
+              <a:ext uri="{FF2B5EF4-FFF2-40B4-BE49-F238E27FC236}">
+                <a16:creationId xmlns:a16="http://schemas.microsoft.com/office/drawing/2014/main" id="{6507AB12-866C-4630-8EBA-A96761B739A0}"/>
+              </a:ext>
+            </a:extLst>
+          </p:cNvPr>
+          <p:cNvSpPr>
+            <a:spLocks noGrp="1"/>
+          </p:cNvSpPr>
+          <p:nvPr>
+            <p:ph idx="1"/>
+          </p:nvPr>
+        </p:nvSpPr>
+        <p:spPr/>
+        <p:txBody>
+          <a:bodyPr/>
+          <a:lstStyle/>
+          <a:p>
+            <a:pPr marL="514350" indent="-514350">
+              <a:buFont typeface="+mj-lt"/>
+              <a:buAutoNum type="arabicPeriod"/>
+            </a:pPr>
+            <a:r>
+              <a:rPr lang="en-GB" dirty="0"/>
+              <a:t>Introduction</a:t>
+            </a:r>
+          </a:p>
+          <a:p>
+            <a:pPr marL="514350" indent="-514350">
+              <a:buFont typeface="+mj-lt"/>
+              <a:buAutoNum type="arabicPeriod"/>
+            </a:pPr>
+            <a:r>
+              <a:rPr lang="en-GB" b="1" dirty="0"/>
+              <a:t>5k Data</a:t>
+            </a:r>
+          </a:p>
+          <a:p>
+            <a:pPr marL="514350" indent="-514350">
+              <a:buFont typeface="+mj-lt"/>
+              <a:buAutoNum type="arabicPeriod"/>
+            </a:pPr>
+            <a:r>
+              <a:rPr lang="en-GB" dirty="0"/>
+              <a:t>10k Data</a:t>
+            </a:r>
+          </a:p>
+          <a:p>
+            <a:pPr marL="514350" indent="-514350">
+              <a:buFont typeface="+mj-lt"/>
+              <a:buAutoNum type="arabicPeriod"/>
+            </a:pPr>
+            <a:r>
+              <a:rPr lang="en-GB" dirty="0"/>
+              <a:t>Other</a:t>
+            </a:r>
+          </a:p>
+          <a:p>
+            <a:pPr marL="514350" indent="-514350">
+              <a:buFont typeface="+mj-lt"/>
+              <a:buAutoNum type="arabicPeriod"/>
+            </a:pPr>
+            <a:r>
+              <a:rPr lang="en-GB" dirty="0"/>
+              <a:t>Conclusion</a:t>
+            </a:r>
+          </a:p>
+        </p:txBody>
+      </p:sp>
+    </p:spTree>
+    <p:extLst>
+      <p:ext uri="{BB962C8B-B14F-4D97-AF65-F5344CB8AC3E}">
+        <p14:creationId xmlns:p14="http://schemas.microsoft.com/office/powerpoint/2010/main" val="2594530493"/>
+      </p:ext>
+    </p:extLst>
+  </p:cSld>
+  <p:clrMapOvr>
+    <a:masterClrMapping/>
+  </p:clrMapOvr>
+</p:sld>
+</file>
+
+<file path=ppt/slides/slide14.xml><?xml version="1.0" encoding="utf-8"?>
+<p:sld xmlns:a="http://schemas.openxmlformats.org/drawingml/2006/main" xmlns:r="http://schemas.openxmlformats.org/officeDocument/2006/relationships" xmlns:p="http://schemas.openxmlformats.org/presentationml/2006/main">
+  <p:cSld>
+    <p:spTree>
+      <p:nvGrpSpPr>
+        <p:cNvPr id="1" name=""/>
+        <p:cNvGrpSpPr/>
+        <p:nvPr/>
+      </p:nvGrpSpPr>
+      <p:grpSpPr>
+        <a:xfrm>
+          <a:off x="0" y="0"/>
+          <a:ext cx="0" cy="0"/>
+          <a:chOff x="0" y="0"/>
+          <a:chExt cx="0" cy="0"/>
+        </a:xfrm>
+      </p:grpSpPr>
+      <p:sp>
+        <p:nvSpPr>
+          <p:cNvPr id="2" name="Title 1">
+            <a:extLst>
+              <a:ext uri="{FF2B5EF4-FFF2-40B4-BE49-F238E27FC236}">
+                <a16:creationId xmlns:a16="http://schemas.microsoft.com/office/drawing/2014/main" id="{F2C74376-574F-47D1-9465-74EB6825B66E}"/>
+              </a:ext>
+            </a:extLst>
+          </p:cNvPr>
+          <p:cNvSpPr>
+            <a:spLocks noGrp="1"/>
+          </p:cNvSpPr>
+          <p:nvPr>
+            <p:ph type="title"/>
+          </p:nvPr>
+        </p:nvSpPr>
+        <p:spPr/>
+        <p:txBody>
+          <a:bodyPr/>
+          <a:lstStyle/>
+          <a:p>
+            <a:r>
+              <a:rPr lang="en-GB" dirty="0"/>
+              <a:t>5K data</a:t>
+            </a:r>
+          </a:p>
+        </p:txBody>
+      </p:sp>
+      <p:sp>
+        <p:nvSpPr>
+          <p:cNvPr id="3" name="Content Placeholder 2">
+            <a:extLst>
+              <a:ext uri="{FF2B5EF4-FFF2-40B4-BE49-F238E27FC236}">
+                <a16:creationId xmlns:a16="http://schemas.microsoft.com/office/drawing/2014/main" id="{3FDEE798-092E-41DD-AD81-32CCD574C570}"/>
+              </a:ext>
+            </a:extLst>
+          </p:cNvPr>
+          <p:cNvSpPr>
+            <a:spLocks noGrp="1"/>
+          </p:cNvSpPr>
+          <p:nvPr>
+            <p:ph idx="1"/>
+          </p:nvPr>
+        </p:nvSpPr>
+        <p:spPr/>
+        <p:txBody>
+          <a:bodyPr/>
+          <a:lstStyle/>
+          <a:p>
+            <a:r>
+              <a:rPr lang="en-GB" dirty="0"/>
+              <a:t>From the 260 data points recorded, 227 were recorded between the distances of 4.9 and 5.1km. </a:t>
+            </a:r>
+          </a:p>
+          <a:p>
+            <a:r>
+              <a:rPr lang="en-GB" dirty="0"/>
+              <a:t>These datapoints will be referred to as 5km runs. </a:t>
+            </a:r>
+          </a:p>
+          <a:p>
+            <a:r>
+              <a:rPr lang="en-GB" dirty="0"/>
+              <a:t>Next slides show some further analysis into the 5k runs. </a:t>
+            </a:r>
+          </a:p>
+        </p:txBody>
+      </p:sp>
+    </p:spTree>
+    <p:extLst>
+      <p:ext uri="{BB962C8B-B14F-4D97-AF65-F5344CB8AC3E}">
+        <p14:creationId xmlns:p14="http://schemas.microsoft.com/office/powerpoint/2010/main" val="669215251"/>
+      </p:ext>
+    </p:extLst>
+  </p:cSld>
+  <p:clrMapOvr>
+    <a:masterClrMapping/>
+  </p:clrMapOvr>
+</p:sld>
+</file>
+
+<file path=ppt/slides/slide15.xml><?xml version="1.0" encoding="utf-8"?>
+<p:sld xmlns:a="http://schemas.openxmlformats.org/drawingml/2006/main" xmlns:r="http://schemas.openxmlformats.org/officeDocument/2006/relationships" xmlns:p="http://schemas.openxmlformats.org/presentationml/2006/main">
+  <p:cSld>
+    <p:spTree>
+      <p:nvGrpSpPr>
+        <p:cNvPr id="1" name=""/>
+        <p:cNvGrpSpPr/>
+        <p:nvPr/>
+      </p:nvGrpSpPr>
+      <p:grpSpPr>
+        <a:xfrm>
+          <a:off x="0" y="0"/>
+          <a:ext cx="0" cy="0"/>
+          <a:chOff x="0" y="0"/>
+          <a:chExt cx="0" cy="0"/>
+        </a:xfrm>
+      </p:grpSpPr>
+      <p:pic>
+        <p:nvPicPr>
+          <p:cNvPr id="3" name="Picture 2" descr="A screenshot of a social media post&#10;&#10;Description automatically generated">
+            <a:extLst>
+              <a:ext uri="{FF2B5EF4-FFF2-40B4-BE49-F238E27FC236}">
+                <a16:creationId xmlns:a16="http://schemas.microsoft.com/office/drawing/2014/main" id="{AF8F47FD-1C17-4DA2-9A54-CC056117C76E}"/>
+              </a:ext>
+            </a:extLst>
+          </p:cNvPr>
+          <p:cNvPicPr>
+            <a:picLocks noChangeAspect="1"/>
+          </p:cNvPicPr>
+          <p:nvPr/>
+        </p:nvPicPr>
+        <p:blipFill>
+          <a:blip r:embed="rId2">
+            <a:extLst>
+              <a:ext uri="{28A0092B-C50C-407E-A947-70E740481C1C}">
+                <a14:useLocalDpi xmlns:a14="http://schemas.microsoft.com/office/drawing/2010/main" val="0"/>
+              </a:ext>
+            </a:extLst>
+          </a:blip>
+          <a:stretch>
+            <a:fillRect/>
+          </a:stretch>
+        </p:blipFill>
+        <p:spPr>
+          <a:xfrm>
+            <a:off x="1124125" y="278682"/>
+            <a:ext cx="9583025" cy="6547080"/>
+          </a:xfrm>
+          <a:prstGeom prst="rect">
+            <a:avLst/>
+          </a:prstGeom>
+        </p:spPr>
+      </p:pic>
+    </p:spTree>
+    <p:extLst>
+      <p:ext uri="{BB962C8B-B14F-4D97-AF65-F5344CB8AC3E}">
+        <p14:creationId xmlns:p14="http://schemas.microsoft.com/office/powerpoint/2010/main" val="1129441894"/>
+      </p:ext>
+    </p:extLst>
+  </p:cSld>
+  <p:clrMapOvr>
+    <a:masterClrMapping/>
+  </p:clrMapOvr>
+</p:sld>
+</file>
+
+<file path=ppt/slides/slide16.xml><?xml version="1.0" encoding="utf-8"?>
+<p:sld xmlns:a="http://schemas.openxmlformats.org/drawingml/2006/main" xmlns:r="http://schemas.openxmlformats.org/officeDocument/2006/relationships" xmlns:p="http://schemas.openxmlformats.org/presentationml/2006/main">
+  <p:cSld>
+    <p:spTree>
+      <p:nvGrpSpPr>
+        <p:cNvPr id="1" name=""/>
+        <p:cNvGrpSpPr/>
+        <p:nvPr/>
+      </p:nvGrpSpPr>
+      <p:grpSpPr>
+        <a:xfrm>
+          <a:off x="0" y="0"/>
+          <a:ext cx="0" cy="0"/>
+          <a:chOff x="0" y="0"/>
+          <a:chExt cx="0" cy="0"/>
+        </a:xfrm>
+      </p:grpSpPr>
+      <p:pic>
+        <p:nvPicPr>
+          <p:cNvPr id="3" name="Picture 2" descr="A screenshot of a social media post&#10;&#10;Description automatically generated">
+            <a:extLst>
+              <a:ext uri="{FF2B5EF4-FFF2-40B4-BE49-F238E27FC236}">
+                <a16:creationId xmlns:a16="http://schemas.microsoft.com/office/drawing/2014/main" id="{AF8F47FD-1C17-4DA2-9A54-CC056117C76E}"/>
+              </a:ext>
+            </a:extLst>
+          </p:cNvPr>
+          <p:cNvPicPr>
+            <a:picLocks noChangeAspect="1"/>
+          </p:cNvPicPr>
+          <p:nvPr/>
+        </p:nvPicPr>
+        <p:blipFill>
+          <a:blip r:embed="rId2">
+            <a:extLst>
+              <a:ext uri="{28A0092B-C50C-407E-A947-70E740481C1C}">
+                <a14:useLocalDpi xmlns:a14="http://schemas.microsoft.com/office/drawing/2010/main" val="0"/>
+              </a:ext>
+            </a:extLst>
+          </a:blip>
+          <a:stretch>
+            <a:fillRect/>
+          </a:stretch>
+        </p:blipFill>
+        <p:spPr>
+          <a:xfrm>
+            <a:off x="1124125" y="278682"/>
+            <a:ext cx="9583025" cy="6547080"/>
+          </a:xfrm>
+          <a:prstGeom prst="rect">
+            <a:avLst/>
+          </a:prstGeom>
+        </p:spPr>
+      </p:pic>
+      <p:sp>
+        <p:nvSpPr>
+          <p:cNvPr id="2" name="TextBox 1">
+            <a:extLst>
+              <a:ext uri="{FF2B5EF4-FFF2-40B4-BE49-F238E27FC236}">
+                <a16:creationId xmlns:a16="http://schemas.microsoft.com/office/drawing/2014/main" id="{4F8F8321-6FCB-4594-A7F1-E2F4CA8A82B7}"/>
+              </a:ext>
+            </a:extLst>
+          </p:cNvPr>
+          <p:cNvSpPr txBox="1"/>
+          <p:nvPr/>
+        </p:nvSpPr>
+        <p:spPr>
+          <a:xfrm>
+            <a:off x="3791825" y="847289"/>
+            <a:ext cx="2038524" cy="923330"/>
+          </a:xfrm>
+          <a:prstGeom prst="rect">
+            <a:avLst/>
+          </a:prstGeom>
+          <a:noFill/>
+        </p:spPr>
+        <p:txBody>
+          <a:bodyPr wrap="square" rtlCol="0">
+            <a:spAutoFit/>
+          </a:bodyPr>
+          <a:lstStyle/>
+          <a:p>
+            <a:r>
+              <a:rPr lang="en-GB" dirty="0"/>
+              <a:t>This was run at La Oliva, Fuerteventura!?!? </a:t>
+            </a:r>
+          </a:p>
+        </p:txBody>
+      </p:sp>
+      <p:cxnSp>
+        <p:nvCxnSpPr>
+          <p:cNvPr id="5" name="Straight Arrow Connector 4">
+            <a:extLst>
+              <a:ext uri="{FF2B5EF4-FFF2-40B4-BE49-F238E27FC236}">
+                <a16:creationId xmlns:a16="http://schemas.microsoft.com/office/drawing/2014/main" id="{7AD4AB87-8A5E-4C72-9CE3-9385DF13ED72}"/>
+              </a:ext>
+            </a:extLst>
+          </p:cNvPr>
+          <p:cNvCxnSpPr>
+            <a:cxnSpLocks/>
+            <a:stCxn id="2" idx="3"/>
+          </p:cNvCxnSpPr>
+          <p:nvPr/>
+        </p:nvCxnSpPr>
+        <p:spPr>
+          <a:xfrm flipV="1">
+            <a:off x="5830349" y="947958"/>
+            <a:ext cx="385893" cy="360996"/>
+          </a:xfrm>
+          <a:prstGeom prst="straightConnector1">
+            <a:avLst/>
+          </a:prstGeom>
+          <a:ln>
+            <a:tailEnd type="triangle"/>
+          </a:ln>
+        </p:spPr>
+        <p:style>
+          <a:lnRef idx="1">
+            <a:schemeClr val="accent1"/>
+          </a:lnRef>
+          <a:fillRef idx="0">
+            <a:schemeClr val="accent1"/>
+          </a:fillRef>
+          <a:effectRef idx="0">
+            <a:schemeClr val="accent1"/>
+          </a:effectRef>
+          <a:fontRef idx="minor">
+            <a:schemeClr val="tx1"/>
+          </a:fontRef>
+        </p:style>
+      </p:cxnSp>
+      <p:sp>
+        <p:nvSpPr>
+          <p:cNvPr id="6" name="TextBox 5">
+            <a:extLst>
+              <a:ext uri="{FF2B5EF4-FFF2-40B4-BE49-F238E27FC236}">
+                <a16:creationId xmlns:a16="http://schemas.microsoft.com/office/drawing/2014/main" id="{DD20D718-F97B-4C40-AE03-B6F9C1DE5508}"/>
+              </a:ext>
+            </a:extLst>
+          </p:cNvPr>
+          <p:cNvSpPr txBox="1"/>
+          <p:nvPr/>
+        </p:nvSpPr>
+        <p:spPr>
+          <a:xfrm>
+            <a:off x="7710882" y="3090557"/>
+            <a:ext cx="1273727" cy="923330"/>
+          </a:xfrm>
+          <a:prstGeom prst="rect">
+            <a:avLst/>
+          </a:prstGeom>
+          <a:noFill/>
+        </p:spPr>
+        <p:txBody>
+          <a:bodyPr wrap="square" rtlCol="0">
+            <a:spAutoFit/>
+          </a:bodyPr>
+          <a:lstStyle/>
+          <a:p>
+            <a:r>
+              <a:rPr lang="en-GB" dirty="0"/>
+              <a:t>Lovely downward trend! </a:t>
+            </a:r>
+          </a:p>
+        </p:txBody>
+      </p:sp>
+      <p:sp>
+        <p:nvSpPr>
+          <p:cNvPr id="7" name="TextBox 6">
+            <a:extLst>
+              <a:ext uri="{FF2B5EF4-FFF2-40B4-BE49-F238E27FC236}">
+                <a16:creationId xmlns:a16="http://schemas.microsoft.com/office/drawing/2014/main" id="{2ED43FB5-0533-49FF-8158-E5E08915F7E0}"/>
+              </a:ext>
+            </a:extLst>
+          </p:cNvPr>
+          <p:cNvSpPr txBox="1"/>
+          <p:nvPr/>
+        </p:nvSpPr>
+        <p:spPr>
+          <a:xfrm>
+            <a:off x="6417579" y="5932987"/>
+            <a:ext cx="2332139" cy="646331"/>
+          </a:xfrm>
+          <a:prstGeom prst="rect">
+            <a:avLst/>
+          </a:prstGeom>
+          <a:solidFill>
+            <a:schemeClr val="bg1"/>
+          </a:solidFill>
+        </p:spPr>
+        <p:txBody>
+          <a:bodyPr wrap="square" rtlCol="0">
+            <a:spAutoFit/>
+          </a:bodyPr>
+          <a:lstStyle/>
+          <a:p>
+            <a:r>
+              <a:rPr lang="en-GB" dirty="0"/>
+              <a:t>Erewash potentially a fast route? </a:t>
+            </a:r>
+          </a:p>
+        </p:txBody>
+      </p:sp>
+      <p:cxnSp>
+        <p:nvCxnSpPr>
+          <p:cNvPr id="9" name="Straight Arrow Connector 8">
+            <a:extLst>
+              <a:ext uri="{FF2B5EF4-FFF2-40B4-BE49-F238E27FC236}">
+                <a16:creationId xmlns:a16="http://schemas.microsoft.com/office/drawing/2014/main" id="{83260E2D-431D-40D7-BABE-3EBB4F1A6BDA}"/>
+              </a:ext>
+            </a:extLst>
+          </p:cNvPr>
+          <p:cNvCxnSpPr>
+            <a:stCxn id="7" idx="0"/>
+          </p:cNvCxnSpPr>
+          <p:nvPr/>
+        </p:nvCxnSpPr>
+        <p:spPr>
+          <a:xfrm flipH="1" flipV="1">
+            <a:off x="7248088" y="5570290"/>
+            <a:ext cx="335561" cy="362697"/>
+          </a:xfrm>
+          <a:prstGeom prst="straightConnector1">
+            <a:avLst/>
+          </a:prstGeom>
+          <a:ln>
+            <a:tailEnd type="triangle"/>
+          </a:ln>
+        </p:spPr>
+        <p:style>
+          <a:lnRef idx="1">
+            <a:schemeClr val="accent1"/>
+          </a:lnRef>
+          <a:fillRef idx="0">
+            <a:schemeClr val="accent1"/>
+          </a:fillRef>
+          <a:effectRef idx="0">
+            <a:schemeClr val="accent1"/>
+          </a:effectRef>
+          <a:fontRef idx="minor">
+            <a:schemeClr val="tx1"/>
+          </a:fontRef>
+        </p:style>
+      </p:cxnSp>
+      <p:cxnSp>
+        <p:nvCxnSpPr>
+          <p:cNvPr id="10" name="Straight Arrow Connector 9">
+            <a:extLst>
+              <a:ext uri="{FF2B5EF4-FFF2-40B4-BE49-F238E27FC236}">
+                <a16:creationId xmlns:a16="http://schemas.microsoft.com/office/drawing/2014/main" id="{A2ED416B-2875-4B16-866A-728D69B97A50}"/>
+              </a:ext>
+            </a:extLst>
+          </p:cNvPr>
+          <p:cNvCxnSpPr>
+            <a:cxnSpLocks/>
+            <a:stCxn id="7" idx="0"/>
+          </p:cNvCxnSpPr>
+          <p:nvPr/>
+        </p:nvCxnSpPr>
+        <p:spPr>
+          <a:xfrm flipV="1">
+            <a:off x="7583649" y="5268286"/>
+            <a:ext cx="226501" cy="664701"/>
+          </a:xfrm>
+          <a:prstGeom prst="straightConnector1">
+            <a:avLst/>
+          </a:prstGeom>
+          <a:ln>
+            <a:tailEnd type="triangle"/>
+          </a:ln>
+        </p:spPr>
+        <p:style>
+          <a:lnRef idx="1">
+            <a:schemeClr val="accent1"/>
+          </a:lnRef>
+          <a:fillRef idx="0">
+            <a:schemeClr val="accent1"/>
+          </a:fillRef>
+          <a:effectRef idx="0">
+            <a:schemeClr val="accent1"/>
+          </a:effectRef>
+          <a:fontRef idx="minor">
+            <a:schemeClr val="tx1"/>
+          </a:fontRef>
+        </p:style>
+      </p:cxnSp>
+    </p:spTree>
+    <p:extLst>
+      <p:ext uri="{BB962C8B-B14F-4D97-AF65-F5344CB8AC3E}">
+        <p14:creationId xmlns:p14="http://schemas.microsoft.com/office/powerpoint/2010/main" val="2970930186"/>
+      </p:ext>
+    </p:extLst>
+  </p:cSld>
+  <p:clrMapOvr>
+    <a:masterClrMapping/>
+  </p:clrMapOvr>
+</p:sld>
+</file>
+
 <file path=ppt/slides/slide2.xml><?xml version="1.0" encoding="utf-8"?>
 <p:sld xmlns:a="http://schemas.openxmlformats.org/drawingml/2006/main" xmlns:r="http://schemas.openxmlformats.org/officeDocument/2006/relationships" xmlns:p="http://schemas.openxmlformats.org/presentationml/2006/main">
   <p:cSld>
@@ -3439,6 +4702,359 @@
           <p:cNvPr id="2" name="Title 1">
             <a:extLst>
               <a:ext uri="{FF2B5EF4-FFF2-40B4-BE49-F238E27FC236}">
+                <a16:creationId xmlns:a16="http://schemas.microsoft.com/office/drawing/2014/main" id="{74E9F826-5C6E-4474-BE7E-DEC7BF10A7D7}"/>
+              </a:ext>
+            </a:extLst>
+          </p:cNvPr>
+          <p:cNvSpPr>
+            <a:spLocks noGrp="1"/>
+          </p:cNvSpPr>
+          <p:nvPr>
+            <p:ph type="title"/>
+          </p:nvPr>
+        </p:nvSpPr>
+        <p:spPr/>
+        <p:txBody>
+          <a:bodyPr/>
+          <a:lstStyle/>
+          <a:p>
+            <a:r>
+              <a:rPr lang="en-GB" dirty="0"/>
+              <a:t>Contents</a:t>
+            </a:r>
+          </a:p>
+        </p:txBody>
+      </p:sp>
+      <p:sp>
+        <p:nvSpPr>
+          <p:cNvPr id="3" name="Content Placeholder 2">
+            <a:extLst>
+              <a:ext uri="{FF2B5EF4-FFF2-40B4-BE49-F238E27FC236}">
+                <a16:creationId xmlns:a16="http://schemas.microsoft.com/office/drawing/2014/main" id="{6507AB12-866C-4630-8EBA-A96761B739A0}"/>
+              </a:ext>
+            </a:extLst>
+          </p:cNvPr>
+          <p:cNvSpPr>
+            <a:spLocks noGrp="1"/>
+          </p:cNvSpPr>
+          <p:nvPr>
+            <p:ph idx="1"/>
+          </p:nvPr>
+        </p:nvSpPr>
+        <p:spPr/>
+        <p:txBody>
+          <a:bodyPr/>
+          <a:lstStyle/>
+          <a:p>
+            <a:pPr marL="514350" indent="-514350">
+              <a:buFont typeface="+mj-lt"/>
+              <a:buAutoNum type="arabicPeriod"/>
+            </a:pPr>
+            <a:r>
+              <a:rPr lang="en-GB" dirty="0"/>
+              <a:t>Introduction</a:t>
+            </a:r>
+          </a:p>
+          <a:p>
+            <a:pPr marL="514350" indent="-514350">
+              <a:buFont typeface="+mj-lt"/>
+              <a:buAutoNum type="arabicPeriod"/>
+            </a:pPr>
+            <a:r>
+              <a:rPr lang="en-GB" dirty="0"/>
+              <a:t>First Impressions</a:t>
+            </a:r>
+          </a:p>
+          <a:p>
+            <a:pPr marL="514350" indent="-514350">
+              <a:buFont typeface="+mj-lt"/>
+              <a:buAutoNum type="arabicPeriod"/>
+            </a:pPr>
+            <a:r>
+              <a:rPr lang="en-GB" dirty="0"/>
+              <a:t>5k Data</a:t>
+            </a:r>
+          </a:p>
+          <a:p>
+            <a:pPr marL="514350" indent="-514350">
+              <a:buFont typeface="+mj-lt"/>
+              <a:buAutoNum type="arabicPeriod"/>
+            </a:pPr>
+            <a:r>
+              <a:rPr lang="en-GB" dirty="0"/>
+              <a:t>10k Data</a:t>
+            </a:r>
+          </a:p>
+          <a:p>
+            <a:pPr marL="514350" indent="-514350">
+              <a:buFont typeface="+mj-lt"/>
+              <a:buAutoNum type="arabicPeriod"/>
+            </a:pPr>
+            <a:r>
+              <a:rPr lang="en-GB" dirty="0"/>
+              <a:t>Other</a:t>
+            </a:r>
+          </a:p>
+          <a:p>
+            <a:pPr marL="514350" indent="-514350">
+              <a:buFont typeface="+mj-lt"/>
+              <a:buAutoNum type="arabicPeriod"/>
+            </a:pPr>
+            <a:r>
+              <a:rPr lang="en-GB" dirty="0"/>
+              <a:t>Conclusion</a:t>
+            </a:r>
+          </a:p>
+        </p:txBody>
+      </p:sp>
+    </p:spTree>
+    <p:extLst>
+      <p:ext uri="{BB962C8B-B14F-4D97-AF65-F5344CB8AC3E}">
+        <p14:creationId xmlns:p14="http://schemas.microsoft.com/office/powerpoint/2010/main" val="4090212194"/>
+      </p:ext>
+    </p:extLst>
+  </p:cSld>
+  <p:clrMapOvr>
+    <a:masterClrMapping/>
+  </p:clrMapOvr>
+</p:sld>
+</file>
+
+<file path=ppt/slides/slide3.xml><?xml version="1.0" encoding="utf-8"?>
+<p:sld xmlns:a="http://schemas.openxmlformats.org/drawingml/2006/main" xmlns:r="http://schemas.openxmlformats.org/officeDocument/2006/relationships" xmlns:p="http://schemas.openxmlformats.org/presentationml/2006/main">
+  <p:cSld>
+    <p:spTree>
+      <p:nvGrpSpPr>
+        <p:cNvPr id="1" name=""/>
+        <p:cNvGrpSpPr/>
+        <p:nvPr/>
+      </p:nvGrpSpPr>
+      <p:grpSpPr>
+        <a:xfrm>
+          <a:off x="0" y="0"/>
+          <a:ext cx="0" cy="0"/>
+          <a:chOff x="0" y="0"/>
+          <a:chExt cx="0" cy="0"/>
+        </a:xfrm>
+      </p:grpSpPr>
+      <p:sp>
+        <p:nvSpPr>
+          <p:cNvPr id="2" name="Title 1">
+            <a:extLst>
+              <a:ext uri="{FF2B5EF4-FFF2-40B4-BE49-F238E27FC236}">
+                <a16:creationId xmlns:a16="http://schemas.microsoft.com/office/drawing/2014/main" id="{74E9F826-5C6E-4474-BE7E-DEC7BF10A7D7}"/>
+              </a:ext>
+            </a:extLst>
+          </p:cNvPr>
+          <p:cNvSpPr>
+            <a:spLocks noGrp="1"/>
+          </p:cNvSpPr>
+          <p:nvPr>
+            <p:ph type="title"/>
+          </p:nvPr>
+        </p:nvSpPr>
+        <p:spPr/>
+        <p:txBody>
+          <a:bodyPr/>
+          <a:lstStyle/>
+          <a:p>
+            <a:r>
+              <a:rPr lang="en-GB" dirty="0"/>
+              <a:t>Contents</a:t>
+            </a:r>
+          </a:p>
+        </p:txBody>
+      </p:sp>
+      <p:sp>
+        <p:nvSpPr>
+          <p:cNvPr id="3" name="Content Placeholder 2">
+            <a:extLst>
+              <a:ext uri="{FF2B5EF4-FFF2-40B4-BE49-F238E27FC236}">
+                <a16:creationId xmlns:a16="http://schemas.microsoft.com/office/drawing/2014/main" id="{6507AB12-866C-4630-8EBA-A96761B739A0}"/>
+              </a:ext>
+            </a:extLst>
+          </p:cNvPr>
+          <p:cNvSpPr>
+            <a:spLocks noGrp="1"/>
+          </p:cNvSpPr>
+          <p:nvPr>
+            <p:ph idx="1"/>
+          </p:nvPr>
+        </p:nvSpPr>
+        <p:spPr/>
+        <p:txBody>
+          <a:bodyPr/>
+          <a:lstStyle/>
+          <a:p>
+            <a:pPr marL="514350" indent="-514350">
+              <a:buFont typeface="+mj-lt"/>
+              <a:buAutoNum type="arabicPeriod"/>
+            </a:pPr>
+            <a:r>
+              <a:rPr lang="en-GB" b="1" dirty="0"/>
+              <a:t>Introduction</a:t>
+            </a:r>
+          </a:p>
+          <a:p>
+            <a:pPr marL="514350" indent="-514350">
+              <a:buFont typeface="+mj-lt"/>
+              <a:buAutoNum type="arabicPeriod"/>
+            </a:pPr>
+            <a:r>
+              <a:rPr lang="en-GB" dirty="0"/>
+              <a:t>5k Data</a:t>
+            </a:r>
+          </a:p>
+          <a:p>
+            <a:pPr marL="514350" indent="-514350">
+              <a:buFont typeface="+mj-lt"/>
+              <a:buAutoNum type="arabicPeriod"/>
+            </a:pPr>
+            <a:r>
+              <a:rPr lang="en-GB" dirty="0"/>
+              <a:t>10k Data</a:t>
+            </a:r>
+          </a:p>
+          <a:p>
+            <a:pPr marL="514350" indent="-514350">
+              <a:buFont typeface="+mj-lt"/>
+              <a:buAutoNum type="arabicPeriod"/>
+            </a:pPr>
+            <a:r>
+              <a:rPr lang="en-GB" dirty="0"/>
+              <a:t>Other</a:t>
+            </a:r>
+          </a:p>
+          <a:p>
+            <a:pPr marL="514350" indent="-514350">
+              <a:buFont typeface="+mj-lt"/>
+              <a:buAutoNum type="arabicPeriod"/>
+            </a:pPr>
+            <a:r>
+              <a:rPr lang="en-GB" dirty="0"/>
+              <a:t>Conclusion</a:t>
+            </a:r>
+          </a:p>
+        </p:txBody>
+      </p:sp>
+    </p:spTree>
+    <p:extLst>
+      <p:ext uri="{BB962C8B-B14F-4D97-AF65-F5344CB8AC3E}">
+        <p14:creationId xmlns:p14="http://schemas.microsoft.com/office/powerpoint/2010/main" val="1490033011"/>
+      </p:ext>
+    </p:extLst>
+  </p:cSld>
+  <p:clrMapOvr>
+    <a:masterClrMapping/>
+  </p:clrMapOvr>
+</p:sld>
+</file>
+
+<file path=ppt/slides/slide4.xml><?xml version="1.0" encoding="utf-8"?>
+<p:sld xmlns:a="http://schemas.openxmlformats.org/drawingml/2006/main" xmlns:r="http://schemas.openxmlformats.org/officeDocument/2006/relationships" xmlns:p="http://schemas.openxmlformats.org/presentationml/2006/main">
+  <p:cSld>
+    <p:spTree>
+      <p:nvGrpSpPr>
+        <p:cNvPr id="1" name=""/>
+        <p:cNvGrpSpPr/>
+        <p:nvPr/>
+      </p:nvGrpSpPr>
+      <p:grpSpPr>
+        <a:xfrm>
+          <a:off x="0" y="0"/>
+          <a:ext cx="0" cy="0"/>
+          <a:chOff x="0" y="0"/>
+          <a:chExt cx="0" cy="0"/>
+        </a:xfrm>
+      </p:grpSpPr>
+      <p:sp>
+        <p:nvSpPr>
+          <p:cNvPr id="2" name="Title 1">
+            <a:extLst>
+              <a:ext uri="{FF2B5EF4-FFF2-40B4-BE49-F238E27FC236}">
+                <a16:creationId xmlns:a16="http://schemas.microsoft.com/office/drawing/2014/main" id="{854C52A5-9E9A-44D7-B12E-0FD122D8A7A3}"/>
+              </a:ext>
+            </a:extLst>
+          </p:cNvPr>
+          <p:cNvSpPr>
+            <a:spLocks noGrp="1"/>
+          </p:cNvSpPr>
+          <p:nvPr>
+            <p:ph type="title"/>
+          </p:nvPr>
+        </p:nvSpPr>
+        <p:spPr/>
+        <p:txBody>
+          <a:bodyPr/>
+          <a:lstStyle/>
+          <a:p>
+            <a:r>
+              <a:rPr lang="en-GB" dirty="0"/>
+              <a:t>Introduction</a:t>
+            </a:r>
+          </a:p>
+        </p:txBody>
+      </p:sp>
+      <p:sp>
+        <p:nvSpPr>
+          <p:cNvPr id="3" name="Content Placeholder 2">
+            <a:extLst>
+              <a:ext uri="{FF2B5EF4-FFF2-40B4-BE49-F238E27FC236}">
+                <a16:creationId xmlns:a16="http://schemas.microsoft.com/office/drawing/2014/main" id="{5485ED19-43AA-4F1C-B23F-3D5812474831}"/>
+              </a:ext>
+            </a:extLst>
+          </p:cNvPr>
+          <p:cNvSpPr>
+            <a:spLocks noGrp="1"/>
+          </p:cNvSpPr>
+          <p:nvPr>
+            <p:ph idx="1"/>
+          </p:nvPr>
+        </p:nvSpPr>
+        <p:spPr/>
+        <p:txBody>
+          <a:bodyPr/>
+          <a:lstStyle/>
+          <a:p>
+            <a:endParaRPr lang="en-GB"/>
+          </a:p>
+        </p:txBody>
+      </p:sp>
+    </p:spTree>
+    <p:extLst>
+      <p:ext uri="{BB962C8B-B14F-4D97-AF65-F5344CB8AC3E}">
+        <p14:creationId xmlns:p14="http://schemas.microsoft.com/office/powerpoint/2010/main" val="1513206591"/>
+      </p:ext>
+    </p:extLst>
+  </p:cSld>
+  <p:clrMapOvr>
+    <a:masterClrMapping/>
+  </p:clrMapOvr>
+</p:sld>
+</file>
+
+<file path=ppt/slides/slide5.xml><?xml version="1.0" encoding="utf-8"?>
+<p:sld xmlns:a="http://schemas.openxmlformats.org/drawingml/2006/main" xmlns:r="http://schemas.openxmlformats.org/officeDocument/2006/relationships" xmlns:p="http://schemas.openxmlformats.org/presentationml/2006/main">
+  <p:cSld>
+    <p:spTree>
+      <p:nvGrpSpPr>
+        <p:cNvPr id="1" name=""/>
+        <p:cNvGrpSpPr/>
+        <p:nvPr/>
+      </p:nvGrpSpPr>
+      <p:grpSpPr>
+        <a:xfrm>
+          <a:off x="0" y="0"/>
+          <a:ext cx="0" cy="0"/>
+          <a:chOff x="0" y="0"/>
+          <a:chExt cx="0" cy="0"/>
+        </a:xfrm>
+      </p:grpSpPr>
+      <p:sp>
+        <p:nvSpPr>
+          <p:cNvPr id="2" name="Title 1">
+            <a:extLst>
+              <a:ext uri="{FF2B5EF4-FFF2-40B4-BE49-F238E27FC236}">
                 <a16:creationId xmlns:a16="http://schemas.microsoft.com/office/drawing/2014/main" id="{6480FB91-099A-4D54-B87A-E0E3056593EB}"/>
               </a:ext>
             </a:extLst>
@@ -3457,7 +5073,7 @@
           <a:p>
             <a:r>
               <a:rPr lang="en-GB" dirty="0"/>
-              <a:t>Data – First Impressions</a:t>
+              <a:t>First Impressions</a:t>
             </a:r>
           </a:p>
         </p:txBody>
@@ -3519,22 +5135,772 @@
           </a:p>
           <a:p>
             <a:r>
-              <a:rPr lang="en-GB"/>
+              <a:rPr lang="en-GB" dirty="0"/>
               <a:t>Dates: 03/12/2017 – 30/07/2019</a:t>
             </a:r>
+          </a:p>
+          <a:p>
             <a:endParaRPr lang="en-GB" dirty="0"/>
           </a:p>
-          <a:p>
-            <a:endParaRPr lang="en-GB" dirty="0"/>
-          </a:p>
-        </p:txBody>
-      </p:sp>
+        </p:txBody>
+      </p:sp>
+      <p:grpSp>
+        <p:nvGrpSpPr>
+          <p:cNvPr id="6" name="Group 5">
+            <a:extLst>
+              <a:ext uri="{FF2B5EF4-FFF2-40B4-BE49-F238E27FC236}">
+                <a16:creationId xmlns:a16="http://schemas.microsoft.com/office/drawing/2014/main" id="{9E899827-7A8F-4109-8DE7-38CE93A53D2E}"/>
+              </a:ext>
+            </a:extLst>
+          </p:cNvPr>
+          <p:cNvGrpSpPr/>
+          <p:nvPr/>
+        </p:nvGrpSpPr>
+        <p:grpSpPr>
+          <a:xfrm>
+            <a:off x="8565160" y="504685"/>
+            <a:ext cx="3003259" cy="6156173"/>
+            <a:chOff x="9678929" y="504686"/>
+            <a:chExt cx="2561867" cy="5807752"/>
+          </a:xfrm>
+        </p:grpSpPr>
+        <p:pic>
+          <p:nvPicPr>
+            <p:cNvPr id="4" name="Picture 3">
+              <a:extLst>
+                <a:ext uri="{FF2B5EF4-FFF2-40B4-BE49-F238E27FC236}">
+                  <a16:creationId xmlns:a16="http://schemas.microsoft.com/office/drawing/2014/main" id="{219E022A-5CBD-4579-891B-5A96A2DC8CB4}"/>
+                </a:ext>
+              </a:extLst>
+            </p:cNvPr>
+            <p:cNvPicPr>
+              <a:picLocks noChangeAspect="1"/>
+            </p:cNvPicPr>
+            <p:nvPr/>
+          </p:nvPicPr>
+          <p:blipFill rotWithShape="1">
+            <a:blip r:embed="rId2"/>
+            <a:srcRect t="4178" r="39572"/>
+            <a:stretch/>
+          </p:blipFill>
+          <p:spPr>
+            <a:xfrm>
+              <a:off x="9678929" y="1027906"/>
+              <a:ext cx="2141158" cy="5284532"/>
+            </a:xfrm>
+            <a:prstGeom prst="rect">
+              <a:avLst/>
+            </a:prstGeom>
+          </p:spPr>
+        </p:pic>
+        <p:sp>
+          <p:nvSpPr>
+            <p:cNvPr id="5" name="TextBox 4">
+              <a:extLst>
+                <a:ext uri="{FF2B5EF4-FFF2-40B4-BE49-F238E27FC236}">
+                  <a16:creationId xmlns:a16="http://schemas.microsoft.com/office/drawing/2014/main" id="{08CC70BD-552D-4927-B286-BE053E00677E}"/>
+                </a:ext>
+              </a:extLst>
+            </p:cNvPr>
+            <p:cNvSpPr txBox="1"/>
+            <p:nvPr/>
+          </p:nvSpPr>
+          <p:spPr>
+            <a:xfrm>
+              <a:off x="9990580" y="504686"/>
+              <a:ext cx="2250216" cy="493607"/>
+            </a:xfrm>
+            <a:prstGeom prst="rect">
+              <a:avLst/>
+            </a:prstGeom>
+            <a:noFill/>
+          </p:spPr>
+          <p:txBody>
+            <a:bodyPr wrap="square" rtlCol="0">
+              <a:spAutoFit/>
+            </a:bodyPr>
+            <a:lstStyle/>
+            <a:p>
+              <a:r>
+                <a:rPr lang="en-GB" sz="2800" u="sng" dirty="0"/>
+                <a:t>Attributes</a:t>
+              </a:r>
+            </a:p>
+          </p:txBody>
+        </p:sp>
+      </p:grpSp>
+    </p:spTree>
+    <p:extLst>
+      <p:ext uri="{BB962C8B-B14F-4D97-AF65-F5344CB8AC3E}">
+        <p14:creationId xmlns:p14="http://schemas.microsoft.com/office/powerpoint/2010/main" val="3391182616"/>
+      </p:ext>
+    </p:extLst>
+  </p:cSld>
+  <p:clrMapOvr>
+    <a:masterClrMapping/>
+  </p:clrMapOvr>
+</p:sld>
+</file>
+
+<file path=ppt/slides/slide6.xml><?xml version="1.0" encoding="utf-8"?>
+<p:sld xmlns:a="http://schemas.openxmlformats.org/drawingml/2006/main" xmlns:r="http://schemas.openxmlformats.org/officeDocument/2006/relationships" xmlns:p="http://schemas.openxmlformats.org/presentationml/2006/main">
+  <p:cSld>
+    <p:spTree>
+      <p:nvGrpSpPr>
+        <p:cNvPr id="1" name=""/>
+        <p:cNvGrpSpPr/>
+        <p:nvPr/>
+      </p:nvGrpSpPr>
+      <p:grpSpPr>
+        <a:xfrm>
+          <a:off x="0" y="0"/>
+          <a:ext cx="0" cy="0"/>
+          <a:chOff x="0" y="0"/>
+          <a:chExt cx="0" cy="0"/>
+        </a:xfrm>
+      </p:grpSpPr>
       <p:pic>
         <p:nvPicPr>
-          <p:cNvPr id="4" name="Picture 3">
-            <a:extLst>
-              <a:ext uri="{FF2B5EF4-FFF2-40B4-BE49-F238E27FC236}">
-                <a16:creationId xmlns:a16="http://schemas.microsoft.com/office/drawing/2014/main" id="{219E022A-5CBD-4579-891B-5A96A2DC8CB4}"/>
+          <p:cNvPr id="7" name="Picture 6">
+            <a:extLst>
+              <a:ext uri="{FF2B5EF4-FFF2-40B4-BE49-F238E27FC236}">
+                <a16:creationId xmlns:a16="http://schemas.microsoft.com/office/drawing/2014/main" id="{375D01F8-D5FD-45EE-B505-23D654F905DB}"/>
+              </a:ext>
+            </a:extLst>
+          </p:cNvPr>
+          <p:cNvPicPr>
+            <a:picLocks noChangeAspect="1"/>
+          </p:cNvPicPr>
+          <p:nvPr/>
+        </p:nvPicPr>
+        <p:blipFill>
+          <a:blip r:embed="rId2">
+            <a:extLst>
+              <a:ext uri="{28A0092B-C50C-407E-A947-70E740481C1C}">
+                <a14:useLocalDpi xmlns:a14="http://schemas.microsoft.com/office/drawing/2010/main" val="0"/>
+              </a:ext>
+            </a:extLst>
+          </a:blip>
+          <a:stretch>
+            <a:fillRect/>
+          </a:stretch>
+        </p:blipFill>
+        <p:spPr>
+          <a:xfrm>
+            <a:off x="1036662" y="0"/>
+            <a:ext cx="10118676" cy="6858000"/>
+          </a:xfrm>
+          <a:prstGeom prst="rect">
+            <a:avLst/>
+          </a:prstGeom>
+        </p:spPr>
+      </p:pic>
+    </p:spTree>
+    <p:extLst>
+      <p:ext uri="{BB962C8B-B14F-4D97-AF65-F5344CB8AC3E}">
+        <p14:creationId xmlns:p14="http://schemas.microsoft.com/office/powerpoint/2010/main" val="3459095460"/>
+      </p:ext>
+    </p:extLst>
+  </p:cSld>
+  <p:clrMapOvr>
+    <a:masterClrMapping/>
+  </p:clrMapOvr>
+</p:sld>
+</file>
+
+<file path=ppt/slides/slide7.xml><?xml version="1.0" encoding="utf-8"?>
+<p:sld xmlns:a="http://schemas.openxmlformats.org/drawingml/2006/main" xmlns:r="http://schemas.openxmlformats.org/officeDocument/2006/relationships" xmlns:p="http://schemas.openxmlformats.org/presentationml/2006/main">
+  <p:cSld>
+    <p:spTree>
+      <p:nvGrpSpPr>
+        <p:cNvPr id="1" name=""/>
+        <p:cNvGrpSpPr/>
+        <p:nvPr/>
+      </p:nvGrpSpPr>
+      <p:grpSpPr>
+        <a:xfrm>
+          <a:off x="0" y="0"/>
+          <a:ext cx="0" cy="0"/>
+          <a:chOff x="0" y="0"/>
+          <a:chExt cx="0" cy="0"/>
+        </a:xfrm>
+      </p:grpSpPr>
+      <p:pic>
+        <p:nvPicPr>
+          <p:cNvPr id="7" name="Picture 6">
+            <a:extLst>
+              <a:ext uri="{FF2B5EF4-FFF2-40B4-BE49-F238E27FC236}">
+                <a16:creationId xmlns:a16="http://schemas.microsoft.com/office/drawing/2014/main" id="{375D01F8-D5FD-45EE-B505-23D654F905DB}"/>
+              </a:ext>
+            </a:extLst>
+          </p:cNvPr>
+          <p:cNvPicPr>
+            <a:picLocks noChangeAspect="1"/>
+          </p:cNvPicPr>
+          <p:nvPr/>
+        </p:nvPicPr>
+        <p:blipFill>
+          <a:blip r:embed="rId2">
+            <a:extLst>
+              <a:ext uri="{28A0092B-C50C-407E-A947-70E740481C1C}">
+                <a14:useLocalDpi xmlns:a14="http://schemas.microsoft.com/office/drawing/2010/main" val="0"/>
+              </a:ext>
+            </a:extLst>
+          </a:blip>
+          <a:stretch>
+            <a:fillRect/>
+          </a:stretch>
+        </p:blipFill>
+        <p:spPr>
+          <a:xfrm>
+            <a:off x="1036662" y="0"/>
+            <a:ext cx="10118676" cy="6858000"/>
+          </a:xfrm>
+          <a:prstGeom prst="rect">
+            <a:avLst/>
+          </a:prstGeom>
+        </p:spPr>
+      </p:pic>
+      <p:sp>
+        <p:nvSpPr>
+          <p:cNvPr id="2" name="Oval 1">
+            <a:extLst>
+              <a:ext uri="{FF2B5EF4-FFF2-40B4-BE49-F238E27FC236}">
+                <a16:creationId xmlns:a16="http://schemas.microsoft.com/office/drawing/2014/main" id="{261AF0E6-D61A-4382-9668-412BA497D289}"/>
+              </a:ext>
+            </a:extLst>
+          </p:cNvPr>
+          <p:cNvSpPr/>
+          <p:nvPr/>
+        </p:nvSpPr>
+        <p:spPr>
+          <a:xfrm>
+            <a:off x="1510019" y="4018327"/>
+            <a:ext cx="4278386" cy="578840"/>
+          </a:xfrm>
+          <a:prstGeom prst="ellipse">
+            <a:avLst/>
+          </a:prstGeom>
+          <a:noFill/>
+          <a:ln>
+            <a:solidFill>
+              <a:srgbClr val="FF0000"/>
+            </a:solidFill>
+          </a:ln>
+        </p:spPr>
+        <p:style>
+          <a:lnRef idx="2">
+            <a:schemeClr val="accent1">
+              <a:shade val="50000"/>
+            </a:schemeClr>
+          </a:lnRef>
+          <a:fillRef idx="1">
+            <a:schemeClr val="accent1"/>
+          </a:fillRef>
+          <a:effectRef idx="0">
+            <a:schemeClr val="accent1"/>
+          </a:effectRef>
+          <a:fontRef idx="minor">
+            <a:schemeClr val="lt1"/>
+          </a:fontRef>
+        </p:style>
+        <p:txBody>
+          <a:bodyPr rtlCol="0" anchor="ctr"/>
+          <a:lstStyle/>
+          <a:p>
+            <a:pPr algn="ctr"/>
+            <a:endParaRPr lang="en-GB"/>
+          </a:p>
+        </p:txBody>
+      </p:sp>
+      <p:sp>
+        <p:nvSpPr>
+          <p:cNvPr id="4" name="Oval 3">
+            <a:extLst>
+              <a:ext uri="{FF2B5EF4-FFF2-40B4-BE49-F238E27FC236}">
+                <a16:creationId xmlns:a16="http://schemas.microsoft.com/office/drawing/2014/main" id="{CAF24310-5315-4CD7-A152-6E6475CD40C7}"/>
+              </a:ext>
+            </a:extLst>
+          </p:cNvPr>
+          <p:cNvSpPr/>
+          <p:nvPr/>
+        </p:nvSpPr>
+        <p:spPr>
+          <a:xfrm rot="161983">
+            <a:off x="6758137" y="5335209"/>
+            <a:ext cx="4381074" cy="572980"/>
+          </a:xfrm>
+          <a:prstGeom prst="ellipse">
+            <a:avLst/>
+          </a:prstGeom>
+          <a:noFill/>
+          <a:ln>
+            <a:solidFill>
+              <a:srgbClr val="FF0000"/>
+            </a:solidFill>
+          </a:ln>
+        </p:spPr>
+        <p:style>
+          <a:lnRef idx="2">
+            <a:schemeClr val="accent1">
+              <a:shade val="50000"/>
+            </a:schemeClr>
+          </a:lnRef>
+          <a:fillRef idx="1">
+            <a:schemeClr val="accent1"/>
+          </a:fillRef>
+          <a:effectRef idx="0">
+            <a:schemeClr val="accent1"/>
+          </a:effectRef>
+          <a:fontRef idx="minor">
+            <a:schemeClr val="lt1"/>
+          </a:fontRef>
+        </p:style>
+        <p:txBody>
+          <a:bodyPr rtlCol="0" anchor="ctr"/>
+          <a:lstStyle/>
+          <a:p>
+            <a:pPr algn="ctr"/>
+            <a:endParaRPr lang="en-GB"/>
+          </a:p>
+        </p:txBody>
+      </p:sp>
+      <p:sp>
+        <p:nvSpPr>
+          <p:cNvPr id="5" name="Oval 4">
+            <a:extLst>
+              <a:ext uri="{FF2B5EF4-FFF2-40B4-BE49-F238E27FC236}">
+                <a16:creationId xmlns:a16="http://schemas.microsoft.com/office/drawing/2014/main" id="{8D9DFC24-1F65-4D92-A1B2-03BD7D3BB95C}"/>
+              </a:ext>
+            </a:extLst>
+          </p:cNvPr>
+          <p:cNvSpPr/>
+          <p:nvPr/>
+        </p:nvSpPr>
+        <p:spPr>
+          <a:xfrm>
+            <a:off x="1817614" y="1872143"/>
+            <a:ext cx="4278386" cy="578840"/>
+          </a:xfrm>
+          <a:prstGeom prst="ellipse">
+            <a:avLst/>
+          </a:prstGeom>
+          <a:noFill/>
+          <a:ln>
+            <a:solidFill>
+              <a:srgbClr val="92D050"/>
+            </a:solidFill>
+          </a:ln>
+        </p:spPr>
+        <p:style>
+          <a:lnRef idx="2">
+            <a:schemeClr val="accent1">
+              <a:shade val="50000"/>
+            </a:schemeClr>
+          </a:lnRef>
+          <a:fillRef idx="1">
+            <a:schemeClr val="accent1"/>
+          </a:fillRef>
+          <a:effectRef idx="0">
+            <a:schemeClr val="accent1"/>
+          </a:effectRef>
+          <a:fontRef idx="minor">
+            <a:schemeClr val="lt1"/>
+          </a:fontRef>
+        </p:style>
+        <p:txBody>
+          <a:bodyPr rtlCol="0" anchor="ctr"/>
+          <a:lstStyle/>
+          <a:p>
+            <a:pPr algn="ctr"/>
+            <a:endParaRPr lang="en-GB"/>
+          </a:p>
+        </p:txBody>
+      </p:sp>
+      <p:sp>
+        <p:nvSpPr>
+          <p:cNvPr id="6" name="Oval 5">
+            <a:extLst>
+              <a:ext uri="{FF2B5EF4-FFF2-40B4-BE49-F238E27FC236}">
+                <a16:creationId xmlns:a16="http://schemas.microsoft.com/office/drawing/2014/main" id="{8DE0FC48-06F6-4822-97AF-247343AEDEF6}"/>
+              </a:ext>
+            </a:extLst>
+          </p:cNvPr>
+          <p:cNvSpPr/>
+          <p:nvPr/>
+        </p:nvSpPr>
+        <p:spPr>
+          <a:xfrm rot="338857">
+            <a:off x="7596526" y="3952497"/>
+            <a:ext cx="3403291" cy="578840"/>
+          </a:xfrm>
+          <a:prstGeom prst="ellipse">
+            <a:avLst/>
+          </a:prstGeom>
+          <a:noFill/>
+          <a:ln>
+            <a:solidFill>
+              <a:srgbClr val="92D050"/>
+            </a:solidFill>
+          </a:ln>
+        </p:spPr>
+        <p:style>
+          <a:lnRef idx="2">
+            <a:schemeClr val="accent1">
+              <a:shade val="50000"/>
+            </a:schemeClr>
+          </a:lnRef>
+          <a:fillRef idx="1">
+            <a:schemeClr val="accent1"/>
+          </a:fillRef>
+          <a:effectRef idx="0">
+            <a:schemeClr val="accent1"/>
+          </a:effectRef>
+          <a:fontRef idx="minor">
+            <a:schemeClr val="lt1"/>
+          </a:fontRef>
+        </p:style>
+        <p:txBody>
+          <a:bodyPr rtlCol="0" anchor="ctr"/>
+          <a:lstStyle/>
+          <a:p>
+            <a:pPr algn="ctr"/>
+            <a:endParaRPr lang="en-GB"/>
+          </a:p>
+        </p:txBody>
+      </p:sp>
+      <p:sp>
+        <p:nvSpPr>
+          <p:cNvPr id="3" name="TextBox 2">
+            <a:extLst>
+              <a:ext uri="{FF2B5EF4-FFF2-40B4-BE49-F238E27FC236}">
+                <a16:creationId xmlns:a16="http://schemas.microsoft.com/office/drawing/2014/main" id="{2F832A2E-4CCA-4CB0-8496-A10C798CA0D0}"/>
+              </a:ext>
+            </a:extLst>
+          </p:cNvPr>
+          <p:cNvSpPr txBox="1"/>
+          <p:nvPr/>
+        </p:nvSpPr>
+        <p:spPr>
+          <a:xfrm>
+            <a:off x="6536069" y="2605154"/>
+            <a:ext cx="1040235" cy="646331"/>
+          </a:xfrm>
+          <a:prstGeom prst="rect">
+            <a:avLst/>
+          </a:prstGeom>
+          <a:solidFill>
+            <a:schemeClr val="bg1"/>
+          </a:solidFill>
+          <a:ln>
+            <a:solidFill>
+              <a:srgbClr val="92D050"/>
+            </a:solidFill>
+          </a:ln>
+        </p:spPr>
+        <p:txBody>
+          <a:bodyPr wrap="square" rtlCol="0">
+            <a:spAutoFit/>
+          </a:bodyPr>
+          <a:lstStyle/>
+          <a:p>
+            <a:r>
+              <a:rPr lang="en-GB" dirty="0"/>
+              <a:t>Set of 10k Runs</a:t>
+            </a:r>
+          </a:p>
+        </p:txBody>
+      </p:sp>
+      <p:cxnSp>
+        <p:nvCxnSpPr>
+          <p:cNvPr id="9" name="Straight Arrow Connector 8">
+            <a:extLst>
+              <a:ext uri="{FF2B5EF4-FFF2-40B4-BE49-F238E27FC236}">
+                <a16:creationId xmlns:a16="http://schemas.microsoft.com/office/drawing/2014/main" id="{BEA23364-6F6D-4F82-9B9A-4C1CAB65AF7A}"/>
+              </a:ext>
+            </a:extLst>
+          </p:cNvPr>
+          <p:cNvCxnSpPr>
+            <a:stCxn id="3" idx="1"/>
+          </p:cNvCxnSpPr>
+          <p:nvPr/>
+        </p:nvCxnSpPr>
+        <p:spPr>
+          <a:xfrm flipH="1" flipV="1">
+            <a:off x="5696125" y="2390862"/>
+            <a:ext cx="839944" cy="537458"/>
+          </a:xfrm>
+          <a:prstGeom prst="straightConnector1">
+            <a:avLst/>
+          </a:prstGeom>
+          <a:ln>
+            <a:solidFill>
+              <a:srgbClr val="92D050"/>
+            </a:solidFill>
+            <a:tailEnd type="triangle"/>
+          </a:ln>
+        </p:spPr>
+        <p:style>
+          <a:lnRef idx="1">
+            <a:schemeClr val="accent1"/>
+          </a:lnRef>
+          <a:fillRef idx="0">
+            <a:schemeClr val="accent1"/>
+          </a:fillRef>
+          <a:effectRef idx="0">
+            <a:schemeClr val="accent1"/>
+          </a:effectRef>
+          <a:fontRef idx="minor">
+            <a:schemeClr val="tx1"/>
+          </a:fontRef>
+        </p:style>
+      </p:cxnSp>
+      <p:cxnSp>
+        <p:nvCxnSpPr>
+          <p:cNvPr id="11" name="Straight Arrow Connector 10">
+            <a:extLst>
+              <a:ext uri="{FF2B5EF4-FFF2-40B4-BE49-F238E27FC236}">
+                <a16:creationId xmlns:a16="http://schemas.microsoft.com/office/drawing/2014/main" id="{25A90FC7-E60F-4CEE-84D4-4FA89F202C81}"/>
+              </a:ext>
+            </a:extLst>
+          </p:cNvPr>
+          <p:cNvCxnSpPr>
+            <a:stCxn id="3" idx="3"/>
+          </p:cNvCxnSpPr>
+          <p:nvPr/>
+        </p:nvCxnSpPr>
+        <p:spPr>
+          <a:xfrm>
+            <a:off x="7576304" y="2928320"/>
+            <a:ext cx="493905" cy="858122"/>
+          </a:xfrm>
+          <a:prstGeom prst="straightConnector1">
+            <a:avLst/>
+          </a:prstGeom>
+          <a:ln>
+            <a:solidFill>
+              <a:srgbClr val="92D050"/>
+            </a:solidFill>
+            <a:tailEnd type="triangle"/>
+          </a:ln>
+        </p:spPr>
+        <p:style>
+          <a:lnRef idx="1">
+            <a:schemeClr val="accent1"/>
+          </a:lnRef>
+          <a:fillRef idx="0">
+            <a:schemeClr val="accent1"/>
+          </a:fillRef>
+          <a:effectRef idx="0">
+            <a:schemeClr val="accent1"/>
+          </a:effectRef>
+          <a:fontRef idx="minor">
+            <a:schemeClr val="tx1"/>
+          </a:fontRef>
+        </p:style>
+      </p:cxnSp>
+      <p:sp>
+        <p:nvSpPr>
+          <p:cNvPr id="12" name="TextBox 11">
+            <a:extLst>
+              <a:ext uri="{FF2B5EF4-FFF2-40B4-BE49-F238E27FC236}">
+                <a16:creationId xmlns:a16="http://schemas.microsoft.com/office/drawing/2014/main" id="{5EBC7A7D-8E5E-46C8-97DB-AE9EF2A5ADFD}"/>
+              </a:ext>
+            </a:extLst>
+          </p:cNvPr>
+          <p:cNvSpPr txBox="1"/>
+          <p:nvPr/>
+        </p:nvSpPr>
+        <p:spPr>
+          <a:xfrm>
+            <a:off x="6226956" y="4228170"/>
+            <a:ext cx="1040235" cy="646331"/>
+          </a:xfrm>
+          <a:prstGeom prst="rect">
+            <a:avLst/>
+          </a:prstGeom>
+          <a:solidFill>
+            <a:schemeClr val="bg1"/>
+          </a:solidFill>
+          <a:ln>
+            <a:solidFill>
+              <a:srgbClr val="FF0000"/>
+            </a:solidFill>
+          </a:ln>
+        </p:spPr>
+        <p:txBody>
+          <a:bodyPr wrap="square" rtlCol="0">
+            <a:spAutoFit/>
+          </a:bodyPr>
+          <a:lstStyle/>
+          <a:p>
+            <a:r>
+              <a:rPr lang="en-GB" dirty="0"/>
+              <a:t>Set of 5k Runs</a:t>
+            </a:r>
+          </a:p>
+        </p:txBody>
+      </p:sp>
+      <p:cxnSp>
+        <p:nvCxnSpPr>
+          <p:cNvPr id="13" name="Straight Arrow Connector 12">
+            <a:extLst>
+              <a:ext uri="{FF2B5EF4-FFF2-40B4-BE49-F238E27FC236}">
+                <a16:creationId xmlns:a16="http://schemas.microsoft.com/office/drawing/2014/main" id="{8E384896-0A19-4E61-97A4-DF5D86397E67}"/>
+              </a:ext>
+            </a:extLst>
+          </p:cNvPr>
+          <p:cNvCxnSpPr>
+            <a:cxnSpLocks/>
+          </p:cNvCxnSpPr>
+          <p:nvPr/>
+        </p:nvCxnSpPr>
+        <p:spPr>
+          <a:xfrm>
+            <a:off x="7267191" y="4579067"/>
+            <a:ext cx="803018" cy="681013"/>
+          </a:xfrm>
+          <a:prstGeom prst="straightConnector1">
+            <a:avLst/>
+          </a:prstGeom>
+          <a:ln>
+            <a:solidFill>
+              <a:srgbClr val="FF0000"/>
+            </a:solidFill>
+            <a:tailEnd type="triangle"/>
+          </a:ln>
+        </p:spPr>
+        <p:style>
+          <a:lnRef idx="1">
+            <a:schemeClr val="accent1"/>
+          </a:lnRef>
+          <a:fillRef idx="0">
+            <a:schemeClr val="accent1"/>
+          </a:fillRef>
+          <a:effectRef idx="0">
+            <a:schemeClr val="accent1"/>
+          </a:effectRef>
+          <a:fontRef idx="minor">
+            <a:schemeClr val="tx1"/>
+          </a:fontRef>
+        </p:style>
+      </p:cxnSp>
+      <p:cxnSp>
+        <p:nvCxnSpPr>
+          <p:cNvPr id="15" name="Straight Arrow Connector 14">
+            <a:extLst>
+              <a:ext uri="{FF2B5EF4-FFF2-40B4-BE49-F238E27FC236}">
+                <a16:creationId xmlns:a16="http://schemas.microsoft.com/office/drawing/2014/main" id="{A9242FD3-41FD-467E-B055-D7AD8A980B27}"/>
+              </a:ext>
+            </a:extLst>
+          </p:cNvPr>
+          <p:cNvCxnSpPr>
+            <a:cxnSpLocks/>
+          </p:cNvCxnSpPr>
+          <p:nvPr/>
+        </p:nvCxnSpPr>
+        <p:spPr>
+          <a:xfrm flipH="1" flipV="1">
+            <a:off x="5788405" y="4323126"/>
+            <a:ext cx="455447" cy="228209"/>
+          </a:xfrm>
+          <a:prstGeom prst="straightConnector1">
+            <a:avLst/>
+          </a:prstGeom>
+          <a:ln>
+            <a:solidFill>
+              <a:srgbClr val="FF0000"/>
+            </a:solidFill>
+            <a:tailEnd type="triangle"/>
+          </a:ln>
+        </p:spPr>
+        <p:style>
+          <a:lnRef idx="1">
+            <a:schemeClr val="accent1"/>
+          </a:lnRef>
+          <a:fillRef idx="0">
+            <a:schemeClr val="accent1"/>
+          </a:fillRef>
+          <a:effectRef idx="0">
+            <a:schemeClr val="accent1"/>
+          </a:effectRef>
+          <a:fontRef idx="minor">
+            <a:schemeClr val="tx1"/>
+          </a:fontRef>
+        </p:style>
+      </p:cxnSp>
+    </p:spTree>
+    <p:extLst>
+      <p:ext uri="{BB962C8B-B14F-4D97-AF65-F5344CB8AC3E}">
+        <p14:creationId xmlns:p14="http://schemas.microsoft.com/office/powerpoint/2010/main" val="3527895599"/>
+      </p:ext>
+    </p:extLst>
+  </p:cSld>
+  <p:clrMapOvr>
+    <a:masterClrMapping/>
+  </p:clrMapOvr>
+</p:sld>
+</file>
+
+<file path=ppt/slides/slide8.xml><?xml version="1.0" encoding="utf-8"?>
+<p:sld xmlns:a="http://schemas.openxmlformats.org/drawingml/2006/main" xmlns:r="http://schemas.openxmlformats.org/officeDocument/2006/relationships" xmlns:p="http://schemas.openxmlformats.org/presentationml/2006/main">
+  <p:cSld>
+    <p:spTree>
+      <p:nvGrpSpPr>
+        <p:cNvPr id="1" name=""/>
+        <p:cNvGrpSpPr/>
+        <p:nvPr/>
+      </p:nvGrpSpPr>
+      <p:grpSpPr>
+        <a:xfrm>
+          <a:off x="0" y="0"/>
+          <a:ext cx="0" cy="0"/>
+          <a:chOff x="0" y="0"/>
+          <a:chExt cx="0" cy="0"/>
+        </a:xfrm>
+      </p:grpSpPr>
+      <p:pic>
+        <p:nvPicPr>
+          <p:cNvPr id="5" name="Picture 4" descr="A close up of text on a white background&#10;&#10;Description automatically generated">
+            <a:extLst>
+              <a:ext uri="{FF2B5EF4-FFF2-40B4-BE49-F238E27FC236}">
+                <a16:creationId xmlns:a16="http://schemas.microsoft.com/office/drawing/2014/main" id="{9CC5C397-D137-4DC7-A476-8322CFD76648}"/>
+              </a:ext>
+            </a:extLst>
+          </p:cNvPr>
+          <p:cNvPicPr>
+            <a:picLocks noChangeAspect="1"/>
+          </p:cNvPicPr>
+          <p:nvPr/>
+        </p:nvPicPr>
+        <p:blipFill>
+          <a:blip r:embed="rId2">
+            <a:extLst>
+              <a:ext uri="{28A0092B-C50C-407E-A947-70E740481C1C}">
+                <a14:useLocalDpi xmlns:a14="http://schemas.microsoft.com/office/drawing/2010/main" val="0"/>
+              </a:ext>
+            </a:extLst>
+          </a:blip>
+          <a:stretch>
+            <a:fillRect/>
+          </a:stretch>
+        </p:blipFill>
+        <p:spPr>
+          <a:xfrm>
+            <a:off x="691512" y="77598"/>
+            <a:ext cx="6513992" cy="6702804"/>
+          </a:xfrm>
+          <a:prstGeom prst="rect">
+            <a:avLst/>
+          </a:prstGeom>
+        </p:spPr>
+      </p:pic>
+      <p:pic>
+        <p:nvPicPr>
+          <p:cNvPr id="8" name="Picture 7">
+            <a:extLst>
+              <a:ext uri="{FF2B5EF4-FFF2-40B4-BE49-F238E27FC236}">
+                <a16:creationId xmlns:a16="http://schemas.microsoft.com/office/drawing/2014/main" id="{CD704AC3-7BAB-4499-8FC9-7258455543FF}"/>
               </a:ext>
             </a:extLst>
           </p:cNvPr>
@@ -3544,14 +5910,14 @@
           <p:nvPr/>
         </p:nvPicPr>
         <p:blipFill rotWithShape="1">
-          <a:blip r:embed="rId2"/>
-          <a:srcRect t="4178" r="39572"/>
+          <a:blip r:embed="rId3"/>
+          <a:srcRect t="5795"/>
           <a:stretch/>
         </p:blipFill>
         <p:spPr>
           <a:xfrm>
-            <a:off x="9678929" y="1027906"/>
-            <a:ext cx="2141158" cy="5284532"/>
+            <a:off x="7205504" y="729842"/>
+            <a:ext cx="3078355" cy="5591120"/>
           </a:xfrm>
           <a:prstGeom prst="rect">
             <a:avLst/>
@@ -3560,10 +5926,68 @@
       </p:pic>
       <p:sp>
         <p:nvSpPr>
-          <p:cNvPr id="5" name="TextBox 4">
-            <a:extLst>
-              <a:ext uri="{FF2B5EF4-FFF2-40B4-BE49-F238E27FC236}">
-                <a16:creationId xmlns:a16="http://schemas.microsoft.com/office/drawing/2014/main" id="{08CC70BD-552D-4927-B286-BE053E00677E}"/>
+          <p:cNvPr id="9" name="Right Brace 8">
+            <a:extLst>
+              <a:ext uri="{FF2B5EF4-FFF2-40B4-BE49-F238E27FC236}">
+                <a16:creationId xmlns:a16="http://schemas.microsoft.com/office/drawing/2014/main" id="{FE47171D-6F90-4225-8A39-EB99B50E1CF5}"/>
+              </a:ext>
+            </a:extLst>
+          </p:cNvPr>
+          <p:cNvSpPr/>
+          <p:nvPr/>
+        </p:nvSpPr>
+        <p:spPr>
+          <a:xfrm>
+            <a:off x="10284902" y="3724712"/>
+            <a:ext cx="486562" cy="2357306"/>
+          </a:xfrm>
+          <a:prstGeom prst="rightBrace">
+            <a:avLst/>
+          </a:prstGeom>
+          <a:ln w="28575">
+            <a:solidFill>
+              <a:schemeClr val="tx1"/>
+            </a:solidFill>
+          </a:ln>
+        </p:spPr>
+        <p:style>
+          <a:lnRef idx="1">
+            <a:schemeClr val="accent1"/>
+          </a:lnRef>
+          <a:fillRef idx="0">
+            <a:schemeClr val="accent1"/>
+          </a:fillRef>
+          <a:effectRef idx="0">
+            <a:schemeClr val="accent1"/>
+          </a:effectRef>
+          <a:fontRef idx="minor">
+            <a:schemeClr val="tx1"/>
+          </a:fontRef>
+        </p:style>
+        <p:txBody>
+          <a:bodyPr rtlCol="0" anchor="ctr"/>
+          <a:lstStyle/>
+          <a:p>
+            <a:pPr algn="ctr"/>
+            <a:endParaRPr lang="en-GB">
+              <a:ln w="0"/>
+              <a:effectLst>
+                <a:outerShdw blurRad="38100" dist="19050" dir="2700000" algn="tl" rotWithShape="0">
+                  <a:schemeClr val="dk1">
+                    <a:alpha val="40000"/>
+                  </a:schemeClr>
+                </a:outerShdw>
+              </a:effectLst>
+            </a:endParaRPr>
+          </a:p>
+        </p:txBody>
+      </p:sp>
+      <p:sp>
+        <p:nvSpPr>
+          <p:cNvPr id="10" name="TextBox 9">
+            <a:extLst>
+              <a:ext uri="{FF2B5EF4-FFF2-40B4-BE49-F238E27FC236}">
+                <a16:creationId xmlns:a16="http://schemas.microsoft.com/office/drawing/2014/main" id="{2BE56A75-69C6-4147-8BDA-44D4B91F9E39}"/>
               </a:ext>
             </a:extLst>
           </p:cNvPr>
@@ -3572,8 +5996,8 @@
         </p:nvSpPr>
         <p:spPr>
           <a:xfrm>
-            <a:off x="9754430" y="504686"/>
-            <a:ext cx="2250216" cy="523220"/>
+            <a:off x="10887682" y="4630722"/>
+            <a:ext cx="1242390" cy="523220"/>
           </a:xfrm>
           <a:prstGeom prst="rect">
             <a:avLst/>
@@ -3588,7 +6012,7 @@
           <a:p>
             <a:r>
               <a:rPr lang="en-GB" sz="2800" dirty="0"/>
-              <a:t>Attributes</a:t>
+              <a:t>‘Other’</a:t>
             </a:r>
           </a:p>
         </p:txBody>
@@ -3596,7 +6020,73 @@
     </p:spTree>
     <p:extLst>
       <p:ext uri="{BB962C8B-B14F-4D97-AF65-F5344CB8AC3E}">
-        <p14:creationId xmlns:p14="http://schemas.microsoft.com/office/powerpoint/2010/main" val="3391182616"/>
+        <p14:creationId xmlns:p14="http://schemas.microsoft.com/office/powerpoint/2010/main" val="948984616"/>
+      </p:ext>
+    </p:extLst>
+  </p:cSld>
+  <p:clrMapOvr>
+    <a:masterClrMapping/>
+  </p:clrMapOvr>
+</p:sld>
+</file>
+
+<file path=ppt/slides/slide9.xml><?xml version="1.0" encoding="utf-8"?>
+<p:sld xmlns:a="http://schemas.openxmlformats.org/drawingml/2006/main" xmlns:r="http://schemas.openxmlformats.org/officeDocument/2006/relationships" xmlns:p="http://schemas.openxmlformats.org/presentationml/2006/main">
+  <p:cSld>
+    <p:spTree>
+      <p:nvGrpSpPr>
+        <p:cNvPr id="1" name=""/>
+        <p:cNvGrpSpPr/>
+        <p:nvPr/>
+      </p:nvGrpSpPr>
+      <p:grpSpPr>
+        <a:xfrm>
+          <a:off x="0" y="0"/>
+          <a:ext cx="0" cy="0"/>
+          <a:chOff x="0" y="0"/>
+          <a:chExt cx="0" cy="0"/>
+        </a:xfrm>
+      </p:grpSpPr>
+      <p:pic>
+        <p:nvPicPr>
+          <p:cNvPr id="7" name="Picture 6" descr="A screenshot of a social media post&#10;&#10;Description automatically generated">
+            <a:extLst>
+              <a:ext uri="{FF2B5EF4-FFF2-40B4-BE49-F238E27FC236}">
+                <a16:creationId xmlns:a16="http://schemas.microsoft.com/office/drawing/2014/main" id="{5861CA30-3FA2-4EC2-8604-83F1A02EF719}"/>
+              </a:ext>
+            </a:extLst>
+          </p:cNvPr>
+          <p:cNvPicPr>
+            <a:picLocks noChangeAspect="1"/>
+          </p:cNvPicPr>
+          <p:nvPr/>
+        </p:nvPicPr>
+        <p:blipFill>
+          <a:blip r:embed="rId2">
+            <a:extLst>
+              <a:ext uri="{28A0092B-C50C-407E-A947-70E740481C1C}">
+                <a14:useLocalDpi xmlns:a14="http://schemas.microsoft.com/office/drawing/2010/main" val="0"/>
+              </a:ext>
+            </a:extLst>
+          </a:blip>
+          <a:stretch>
+            <a:fillRect/>
+          </a:stretch>
+        </p:blipFill>
+        <p:spPr>
+          <a:xfrm>
+            <a:off x="1446741" y="278682"/>
+            <a:ext cx="9298518" cy="6300635"/>
+          </a:xfrm>
+          <a:prstGeom prst="rect">
+            <a:avLst/>
+          </a:prstGeom>
+        </p:spPr>
+      </p:pic>
+    </p:spTree>
+    <p:extLst>
+      <p:ext uri="{BB962C8B-B14F-4D97-AF65-F5344CB8AC3E}">
+        <p14:creationId xmlns:p14="http://schemas.microsoft.com/office/powerpoint/2010/main" val="1125721984"/>
       </p:ext>
     </p:extLst>
   </p:cSld>

</xml_diff>

<commit_message>
Complete 5K section of summary
Complete 5K section of summary and add 3 figures to directory.
</commit_message>
<xml_diff>
--- a/Data_Summary.pptx
+++ b/Data_Summary.pptx
@@ -21,6 +21,15 @@
     <p:sldId id="269" r:id="rId15"/>
     <p:sldId id="270" r:id="rId16"/>
     <p:sldId id="271" r:id="rId17"/>
+    <p:sldId id="275" r:id="rId18"/>
+    <p:sldId id="273" r:id="rId19"/>
+    <p:sldId id="278" r:id="rId20"/>
+    <p:sldId id="274" r:id="rId21"/>
+    <p:sldId id="279" r:id="rId22"/>
+    <p:sldId id="277" r:id="rId23"/>
+    <p:sldId id="280" r:id="rId24"/>
+    <p:sldId id="276" r:id="rId25"/>
+    <p:sldId id="272" r:id="rId26"/>
   </p:sldIdLst>
   <p:sldSz cx="12192000" cy="6858000"/>
   <p:notesSz cx="6858000" cy="9144000"/>
@@ -276,7 +285,7 @@
           <a:p>
             <a:fld id="{F18657CB-3368-41A4-98BC-B65A2BA16C04}" type="datetimeFigureOut">
               <a:rPr lang="en-GB" smtClean="0"/>
-              <a:t>04/05/2020</a:t>
+              <a:t>07/05/2020</a:t>
             </a:fld>
             <a:endParaRPr lang="en-GB"/>
           </a:p>
@@ -476,7 +485,7 @@
           <a:p>
             <a:fld id="{F18657CB-3368-41A4-98BC-B65A2BA16C04}" type="datetimeFigureOut">
               <a:rPr lang="en-GB" smtClean="0"/>
-              <a:t>04/05/2020</a:t>
+              <a:t>07/05/2020</a:t>
             </a:fld>
             <a:endParaRPr lang="en-GB"/>
           </a:p>
@@ -686,7 +695,7 @@
           <a:p>
             <a:fld id="{F18657CB-3368-41A4-98BC-B65A2BA16C04}" type="datetimeFigureOut">
               <a:rPr lang="en-GB" smtClean="0"/>
-              <a:t>04/05/2020</a:t>
+              <a:t>07/05/2020</a:t>
             </a:fld>
             <a:endParaRPr lang="en-GB"/>
           </a:p>
@@ -886,7 +895,7 @@
           <a:p>
             <a:fld id="{F18657CB-3368-41A4-98BC-B65A2BA16C04}" type="datetimeFigureOut">
               <a:rPr lang="en-GB" smtClean="0"/>
-              <a:t>04/05/2020</a:t>
+              <a:t>07/05/2020</a:t>
             </a:fld>
             <a:endParaRPr lang="en-GB"/>
           </a:p>
@@ -1162,7 +1171,7 @@
           <a:p>
             <a:fld id="{F18657CB-3368-41A4-98BC-B65A2BA16C04}" type="datetimeFigureOut">
               <a:rPr lang="en-GB" smtClean="0"/>
-              <a:t>04/05/2020</a:t>
+              <a:t>07/05/2020</a:t>
             </a:fld>
             <a:endParaRPr lang="en-GB"/>
           </a:p>
@@ -1430,7 +1439,7 @@
           <a:p>
             <a:fld id="{F18657CB-3368-41A4-98BC-B65A2BA16C04}" type="datetimeFigureOut">
               <a:rPr lang="en-GB" smtClean="0"/>
-              <a:t>04/05/2020</a:t>
+              <a:t>07/05/2020</a:t>
             </a:fld>
             <a:endParaRPr lang="en-GB"/>
           </a:p>
@@ -1845,7 +1854,7 @@
           <a:p>
             <a:fld id="{F18657CB-3368-41A4-98BC-B65A2BA16C04}" type="datetimeFigureOut">
               <a:rPr lang="en-GB" smtClean="0"/>
-              <a:t>04/05/2020</a:t>
+              <a:t>07/05/2020</a:t>
             </a:fld>
             <a:endParaRPr lang="en-GB"/>
           </a:p>
@@ -1987,7 +1996,7 @@
           <a:p>
             <a:fld id="{F18657CB-3368-41A4-98BC-B65A2BA16C04}" type="datetimeFigureOut">
               <a:rPr lang="en-GB" smtClean="0"/>
-              <a:t>04/05/2020</a:t>
+              <a:t>07/05/2020</a:t>
             </a:fld>
             <a:endParaRPr lang="en-GB"/>
           </a:p>
@@ -2100,7 +2109,7 @@
           <a:p>
             <a:fld id="{F18657CB-3368-41A4-98BC-B65A2BA16C04}" type="datetimeFigureOut">
               <a:rPr lang="en-GB" smtClean="0"/>
-              <a:t>04/05/2020</a:t>
+              <a:t>07/05/2020</a:t>
             </a:fld>
             <a:endParaRPr lang="en-GB"/>
           </a:p>
@@ -2413,7 +2422,7 @@
           <a:p>
             <a:fld id="{F18657CB-3368-41A4-98BC-B65A2BA16C04}" type="datetimeFigureOut">
               <a:rPr lang="en-GB" smtClean="0"/>
-              <a:t>04/05/2020</a:t>
+              <a:t>07/05/2020</a:t>
             </a:fld>
             <a:endParaRPr lang="en-GB"/>
           </a:p>
@@ -2702,7 +2711,7 @@
           <a:p>
             <a:fld id="{F18657CB-3368-41A4-98BC-B65A2BA16C04}" type="datetimeFigureOut">
               <a:rPr lang="en-GB" smtClean="0"/>
-              <a:t>04/05/2020</a:t>
+              <a:t>07/05/2020</a:t>
             </a:fld>
             <a:endParaRPr lang="en-GB"/>
           </a:p>
@@ -2945,7 +2954,7 @@
           <a:p>
             <a:fld id="{F18657CB-3368-41A4-98BC-B65A2BA16C04}" type="datetimeFigureOut">
               <a:rPr lang="en-GB" smtClean="0"/>
-              <a:t>04/05/2020</a:t>
+              <a:t>07/05/2020</a:t>
             </a:fld>
             <a:endParaRPr lang="en-GB"/>
           </a:p>
@@ -4542,7 +4551,7 @@
           <a:p>
             <a:r>
               <a:rPr lang="en-GB" dirty="0"/>
-              <a:t>Lovely downward trend! </a:t>
+              <a:t>Lovely negative trend! </a:t>
             </a:r>
           </a:p>
         </p:txBody>
@@ -4680,6 +4689,1247 @@
 </p:sld>
 </file>
 
+<file path=ppt/slides/slide17.xml><?xml version="1.0" encoding="utf-8"?>
+<p:sld xmlns:a="http://schemas.openxmlformats.org/drawingml/2006/main" xmlns:r="http://schemas.openxmlformats.org/officeDocument/2006/relationships" xmlns:p="http://schemas.openxmlformats.org/presentationml/2006/main">
+  <p:cSld>
+    <p:spTree>
+      <p:nvGrpSpPr>
+        <p:cNvPr id="1" name=""/>
+        <p:cNvGrpSpPr/>
+        <p:nvPr/>
+      </p:nvGrpSpPr>
+      <p:grpSpPr>
+        <a:xfrm>
+          <a:off x="0" y="0"/>
+          <a:ext cx="0" cy="0"/>
+          <a:chOff x="0" y="0"/>
+          <a:chExt cx="0" cy="0"/>
+        </a:xfrm>
+      </p:grpSpPr>
+      <p:pic>
+        <p:nvPicPr>
+          <p:cNvPr id="7" name="Picture 6">
+            <a:extLst>
+              <a:ext uri="{FF2B5EF4-FFF2-40B4-BE49-F238E27FC236}">
+                <a16:creationId xmlns:a16="http://schemas.microsoft.com/office/drawing/2014/main" id="{EBD6405E-A468-4013-9D2E-A5D59DBEA28D}"/>
+              </a:ext>
+            </a:extLst>
+          </p:cNvPr>
+          <p:cNvPicPr>
+            <a:picLocks noChangeAspect="1"/>
+          </p:cNvPicPr>
+          <p:nvPr/>
+        </p:nvPicPr>
+        <p:blipFill rotWithShape="1">
+          <a:blip r:embed="rId2"/>
+          <a:srcRect b="1992"/>
+          <a:stretch/>
+        </p:blipFill>
+        <p:spPr>
+          <a:xfrm>
+            <a:off x="6813143" y="1988989"/>
+            <a:ext cx="4130486" cy="4587980"/>
+          </a:xfrm>
+          <a:prstGeom prst="rect">
+            <a:avLst/>
+          </a:prstGeom>
+        </p:spPr>
+      </p:pic>
+      <p:sp>
+        <p:nvSpPr>
+          <p:cNvPr id="2" name="Title 1">
+            <a:extLst>
+              <a:ext uri="{FF2B5EF4-FFF2-40B4-BE49-F238E27FC236}">
+                <a16:creationId xmlns:a16="http://schemas.microsoft.com/office/drawing/2014/main" id="{6065471C-B202-46C2-899B-28B20C87774A}"/>
+              </a:ext>
+            </a:extLst>
+          </p:cNvPr>
+          <p:cNvSpPr>
+            <a:spLocks noGrp="1"/>
+          </p:cNvSpPr>
+          <p:nvPr>
+            <p:ph type="title"/>
+          </p:nvPr>
+        </p:nvSpPr>
+        <p:spPr/>
+        <p:txBody>
+          <a:bodyPr/>
+          <a:lstStyle/>
+          <a:p>
+            <a:r>
+              <a:rPr lang="en-GB" dirty="0"/>
+              <a:t>So how do other features relate to Time? </a:t>
+            </a:r>
+          </a:p>
+        </p:txBody>
+      </p:sp>
+      <p:sp>
+        <p:nvSpPr>
+          <p:cNvPr id="3" name="Content Placeholder 2">
+            <a:extLst>
+              <a:ext uri="{FF2B5EF4-FFF2-40B4-BE49-F238E27FC236}">
+                <a16:creationId xmlns:a16="http://schemas.microsoft.com/office/drawing/2014/main" id="{01393760-D529-4A02-ACB7-E651183798A3}"/>
+              </a:ext>
+            </a:extLst>
+          </p:cNvPr>
+          <p:cNvSpPr>
+            <a:spLocks noGrp="1"/>
+          </p:cNvSpPr>
+          <p:nvPr>
+            <p:ph idx="1"/>
+          </p:nvPr>
+        </p:nvSpPr>
+        <p:spPr>
+          <a:xfrm>
+            <a:off x="838200" y="1825625"/>
+            <a:ext cx="5257800" cy="4351338"/>
+          </a:xfrm>
+        </p:spPr>
+        <p:txBody>
+          <a:bodyPr>
+            <a:normAutofit fontScale="92500" lnSpcReduction="20000"/>
+          </a:bodyPr>
+          <a:lstStyle/>
+          <a:p>
+            <a:r>
+              <a:rPr lang="en-GB" sz="2400" dirty="0"/>
+              <a:t>R value is the ‘standard correlation coefficient’. </a:t>
+            </a:r>
+          </a:p>
+          <a:p>
+            <a:r>
+              <a:rPr lang="en-GB" sz="2400" dirty="0"/>
+              <a:t>Statistical measure of the strength of the linear relationship between two variables. </a:t>
+            </a:r>
+          </a:p>
+          <a:p>
+            <a:r>
+              <a:rPr lang="en-GB" sz="2400" dirty="0"/>
+              <a:t>1 is a perfect positive correlation, -1 is a perfect negative correlation, 0 is no correlation. </a:t>
+            </a:r>
+          </a:p>
+          <a:p>
+            <a:r>
+              <a:rPr lang="en-GB" sz="2400" dirty="0"/>
+              <a:t>The next slides cross plot selected features (red arrows) with Time (decimal minutes). </a:t>
+            </a:r>
+          </a:p>
+          <a:p>
+            <a:r>
+              <a:rPr lang="en-GB" sz="2400" dirty="0"/>
+              <a:t>However, ‘Delta Day’ has by far the strongest negative relationship. ‘Delta Day’ is the number of days since the first day in the dataset (in this case, </a:t>
+            </a:r>
+            <a:r>
+              <a:rPr lang="en-GB" sz="2200" dirty="0"/>
+              <a:t>03/12/2017</a:t>
+            </a:r>
+            <a:r>
+              <a:rPr lang="en-GB" sz="2400" dirty="0"/>
+              <a:t>)</a:t>
+            </a:r>
+          </a:p>
+        </p:txBody>
+      </p:sp>
+      <p:sp>
+        <p:nvSpPr>
+          <p:cNvPr id="5" name="TextBox 4">
+            <a:extLst>
+              <a:ext uri="{FF2B5EF4-FFF2-40B4-BE49-F238E27FC236}">
+                <a16:creationId xmlns:a16="http://schemas.microsoft.com/office/drawing/2014/main" id="{6E06E83A-6FE3-4DD5-B263-37C6BB5B2385}"/>
+              </a:ext>
+            </a:extLst>
+          </p:cNvPr>
+          <p:cNvSpPr txBox="1"/>
+          <p:nvPr/>
+        </p:nvSpPr>
+        <p:spPr>
+          <a:xfrm>
+            <a:off x="7217568" y="1527323"/>
+            <a:ext cx="1459707" cy="461665"/>
+          </a:xfrm>
+          <a:prstGeom prst="rect">
+            <a:avLst/>
+          </a:prstGeom>
+          <a:noFill/>
+        </p:spPr>
+        <p:txBody>
+          <a:bodyPr wrap="square" rtlCol="0">
+            <a:spAutoFit/>
+          </a:bodyPr>
+          <a:lstStyle/>
+          <a:p>
+            <a:r>
+              <a:rPr lang="en-GB" sz="2400" dirty="0"/>
+              <a:t>Features</a:t>
+            </a:r>
+          </a:p>
+        </p:txBody>
+      </p:sp>
+      <p:sp>
+        <p:nvSpPr>
+          <p:cNvPr id="6" name="TextBox 5">
+            <a:extLst>
+              <a:ext uri="{FF2B5EF4-FFF2-40B4-BE49-F238E27FC236}">
+                <a16:creationId xmlns:a16="http://schemas.microsoft.com/office/drawing/2014/main" id="{8B278B0E-5137-4874-BC3F-6E5780C8CEF3}"/>
+              </a:ext>
+            </a:extLst>
+          </p:cNvPr>
+          <p:cNvSpPr txBox="1"/>
+          <p:nvPr/>
+        </p:nvSpPr>
+        <p:spPr>
+          <a:xfrm>
+            <a:off x="9711331" y="1527324"/>
+            <a:ext cx="1232298" cy="461665"/>
+          </a:xfrm>
+          <a:prstGeom prst="rect">
+            <a:avLst/>
+          </a:prstGeom>
+          <a:noFill/>
+        </p:spPr>
+        <p:txBody>
+          <a:bodyPr wrap="square" rtlCol="0">
+            <a:spAutoFit/>
+          </a:bodyPr>
+          <a:lstStyle/>
+          <a:p>
+            <a:r>
+              <a:rPr lang="en-GB" sz="2400" dirty="0"/>
+              <a:t>R Value</a:t>
+            </a:r>
+          </a:p>
+        </p:txBody>
+      </p:sp>
+      <p:cxnSp>
+        <p:nvCxnSpPr>
+          <p:cNvPr id="8" name="Straight Arrow Connector 7">
+            <a:extLst>
+              <a:ext uri="{FF2B5EF4-FFF2-40B4-BE49-F238E27FC236}">
+                <a16:creationId xmlns:a16="http://schemas.microsoft.com/office/drawing/2014/main" id="{A7CD9B6E-A423-4FE6-99F6-DF3E2C2F0BF4}"/>
+              </a:ext>
+            </a:extLst>
+          </p:cNvPr>
+          <p:cNvCxnSpPr/>
+          <p:nvPr/>
+        </p:nvCxnSpPr>
+        <p:spPr>
+          <a:xfrm flipH="1">
+            <a:off x="10943629" y="2768367"/>
+            <a:ext cx="587229" cy="0"/>
+          </a:xfrm>
+          <a:prstGeom prst="straightConnector1">
+            <a:avLst/>
+          </a:prstGeom>
+          <a:ln w="38100">
+            <a:solidFill>
+              <a:srgbClr val="FF0000"/>
+            </a:solidFill>
+            <a:tailEnd type="triangle"/>
+          </a:ln>
+        </p:spPr>
+        <p:style>
+          <a:lnRef idx="1">
+            <a:schemeClr val="accent1"/>
+          </a:lnRef>
+          <a:fillRef idx="0">
+            <a:schemeClr val="accent1"/>
+          </a:fillRef>
+          <a:effectRef idx="0">
+            <a:schemeClr val="accent1"/>
+          </a:effectRef>
+          <a:fontRef idx="minor">
+            <a:schemeClr val="tx1"/>
+          </a:fontRef>
+        </p:style>
+      </p:cxnSp>
+      <p:cxnSp>
+        <p:nvCxnSpPr>
+          <p:cNvPr id="9" name="Straight Arrow Connector 8">
+            <a:extLst>
+              <a:ext uri="{FF2B5EF4-FFF2-40B4-BE49-F238E27FC236}">
+                <a16:creationId xmlns:a16="http://schemas.microsoft.com/office/drawing/2014/main" id="{D552E57B-D36D-4097-8AC9-26172F479A7D}"/>
+              </a:ext>
+            </a:extLst>
+          </p:cNvPr>
+          <p:cNvCxnSpPr/>
+          <p:nvPr/>
+        </p:nvCxnSpPr>
+        <p:spPr>
+          <a:xfrm flipH="1">
+            <a:off x="10943629" y="3071769"/>
+            <a:ext cx="587229" cy="0"/>
+          </a:xfrm>
+          <a:prstGeom prst="straightConnector1">
+            <a:avLst/>
+          </a:prstGeom>
+          <a:ln w="38100">
+            <a:solidFill>
+              <a:srgbClr val="FF0000"/>
+            </a:solidFill>
+            <a:tailEnd type="triangle"/>
+          </a:ln>
+        </p:spPr>
+        <p:style>
+          <a:lnRef idx="1">
+            <a:schemeClr val="accent1"/>
+          </a:lnRef>
+          <a:fillRef idx="0">
+            <a:schemeClr val="accent1"/>
+          </a:fillRef>
+          <a:effectRef idx="0">
+            <a:schemeClr val="accent1"/>
+          </a:effectRef>
+          <a:fontRef idx="minor">
+            <a:schemeClr val="tx1"/>
+          </a:fontRef>
+        </p:style>
+      </p:cxnSp>
+      <p:cxnSp>
+        <p:nvCxnSpPr>
+          <p:cNvPr id="10" name="Straight Arrow Connector 9">
+            <a:extLst>
+              <a:ext uri="{FF2B5EF4-FFF2-40B4-BE49-F238E27FC236}">
+                <a16:creationId xmlns:a16="http://schemas.microsoft.com/office/drawing/2014/main" id="{75594942-E1FB-48ED-B81E-F11177FDBF95}"/>
+              </a:ext>
+            </a:extLst>
+          </p:cNvPr>
+          <p:cNvCxnSpPr/>
+          <p:nvPr/>
+        </p:nvCxnSpPr>
+        <p:spPr>
+          <a:xfrm flipH="1">
+            <a:off x="10943629" y="3389852"/>
+            <a:ext cx="587229" cy="0"/>
+          </a:xfrm>
+          <a:prstGeom prst="straightConnector1">
+            <a:avLst/>
+          </a:prstGeom>
+          <a:ln w="38100">
+            <a:solidFill>
+              <a:srgbClr val="FF0000"/>
+            </a:solidFill>
+            <a:tailEnd type="triangle"/>
+          </a:ln>
+        </p:spPr>
+        <p:style>
+          <a:lnRef idx="1">
+            <a:schemeClr val="accent1"/>
+          </a:lnRef>
+          <a:fillRef idx="0">
+            <a:schemeClr val="accent1"/>
+          </a:fillRef>
+          <a:effectRef idx="0">
+            <a:schemeClr val="accent1"/>
+          </a:effectRef>
+          <a:fontRef idx="minor">
+            <a:schemeClr val="tx1"/>
+          </a:fontRef>
+        </p:style>
+      </p:cxnSp>
+      <p:cxnSp>
+        <p:nvCxnSpPr>
+          <p:cNvPr id="11" name="Straight Arrow Connector 10">
+            <a:extLst>
+              <a:ext uri="{FF2B5EF4-FFF2-40B4-BE49-F238E27FC236}">
+                <a16:creationId xmlns:a16="http://schemas.microsoft.com/office/drawing/2014/main" id="{8326F180-55F7-4C11-87F1-BB5C2BD546F8}"/>
+              </a:ext>
+            </a:extLst>
+          </p:cNvPr>
+          <p:cNvCxnSpPr/>
+          <p:nvPr/>
+        </p:nvCxnSpPr>
+        <p:spPr>
+          <a:xfrm flipH="1">
+            <a:off x="10943629" y="3701643"/>
+            <a:ext cx="587229" cy="0"/>
+          </a:xfrm>
+          <a:prstGeom prst="straightConnector1">
+            <a:avLst/>
+          </a:prstGeom>
+          <a:ln w="38100">
+            <a:solidFill>
+              <a:srgbClr val="FF0000"/>
+            </a:solidFill>
+            <a:tailEnd type="triangle"/>
+          </a:ln>
+        </p:spPr>
+        <p:style>
+          <a:lnRef idx="1">
+            <a:schemeClr val="accent1"/>
+          </a:lnRef>
+          <a:fillRef idx="0">
+            <a:schemeClr val="accent1"/>
+          </a:fillRef>
+          <a:effectRef idx="0">
+            <a:schemeClr val="accent1"/>
+          </a:effectRef>
+          <a:fontRef idx="minor">
+            <a:schemeClr val="tx1"/>
+          </a:fontRef>
+        </p:style>
+      </p:cxnSp>
+      <p:cxnSp>
+        <p:nvCxnSpPr>
+          <p:cNvPr id="12" name="Straight Arrow Connector 11">
+            <a:extLst>
+              <a:ext uri="{FF2B5EF4-FFF2-40B4-BE49-F238E27FC236}">
+                <a16:creationId xmlns:a16="http://schemas.microsoft.com/office/drawing/2014/main" id="{EB0A1A9E-C5C1-4D91-AAAE-7BC0C963C3D2}"/>
+              </a:ext>
+            </a:extLst>
+          </p:cNvPr>
+          <p:cNvCxnSpPr/>
+          <p:nvPr/>
+        </p:nvCxnSpPr>
+        <p:spPr>
+          <a:xfrm flipH="1">
+            <a:off x="10943629" y="4936223"/>
+            <a:ext cx="587229" cy="0"/>
+          </a:xfrm>
+          <a:prstGeom prst="straightConnector1">
+            <a:avLst/>
+          </a:prstGeom>
+          <a:ln w="38100">
+            <a:solidFill>
+              <a:srgbClr val="FF0000"/>
+            </a:solidFill>
+            <a:tailEnd type="triangle"/>
+          </a:ln>
+        </p:spPr>
+        <p:style>
+          <a:lnRef idx="1">
+            <a:schemeClr val="accent1"/>
+          </a:lnRef>
+          <a:fillRef idx="0">
+            <a:schemeClr val="accent1"/>
+          </a:fillRef>
+          <a:effectRef idx="0">
+            <a:schemeClr val="accent1"/>
+          </a:effectRef>
+          <a:fontRef idx="minor">
+            <a:schemeClr val="tx1"/>
+          </a:fontRef>
+        </p:style>
+      </p:cxnSp>
+      <p:cxnSp>
+        <p:nvCxnSpPr>
+          <p:cNvPr id="13" name="Straight Arrow Connector 12">
+            <a:extLst>
+              <a:ext uri="{FF2B5EF4-FFF2-40B4-BE49-F238E27FC236}">
+                <a16:creationId xmlns:a16="http://schemas.microsoft.com/office/drawing/2014/main" id="{F941016F-B166-4519-82CB-28CB27E4861A}"/>
+              </a:ext>
+            </a:extLst>
+          </p:cNvPr>
+          <p:cNvCxnSpPr/>
+          <p:nvPr/>
+        </p:nvCxnSpPr>
+        <p:spPr>
+          <a:xfrm flipH="1">
+            <a:off x="10943629" y="5256403"/>
+            <a:ext cx="587229" cy="0"/>
+          </a:xfrm>
+          <a:prstGeom prst="straightConnector1">
+            <a:avLst/>
+          </a:prstGeom>
+          <a:ln w="38100">
+            <a:solidFill>
+              <a:srgbClr val="FF0000"/>
+            </a:solidFill>
+            <a:tailEnd type="triangle"/>
+          </a:ln>
+        </p:spPr>
+        <p:style>
+          <a:lnRef idx="1">
+            <a:schemeClr val="accent1"/>
+          </a:lnRef>
+          <a:fillRef idx="0">
+            <a:schemeClr val="accent1"/>
+          </a:fillRef>
+          <a:effectRef idx="0">
+            <a:schemeClr val="accent1"/>
+          </a:effectRef>
+          <a:fontRef idx="minor">
+            <a:schemeClr val="tx1"/>
+          </a:fontRef>
+        </p:style>
+      </p:cxnSp>
+      <p:cxnSp>
+        <p:nvCxnSpPr>
+          <p:cNvPr id="14" name="Straight Arrow Connector 13">
+            <a:extLst>
+              <a:ext uri="{FF2B5EF4-FFF2-40B4-BE49-F238E27FC236}">
+                <a16:creationId xmlns:a16="http://schemas.microsoft.com/office/drawing/2014/main" id="{A118D8B8-3069-4AFA-85C5-2A44057F7F41}"/>
+              </a:ext>
+            </a:extLst>
+          </p:cNvPr>
+          <p:cNvCxnSpPr/>
+          <p:nvPr/>
+        </p:nvCxnSpPr>
+        <p:spPr>
+          <a:xfrm flipH="1">
+            <a:off x="10943629" y="5861809"/>
+            <a:ext cx="587229" cy="0"/>
+          </a:xfrm>
+          <a:prstGeom prst="straightConnector1">
+            <a:avLst/>
+          </a:prstGeom>
+          <a:ln w="38100">
+            <a:solidFill>
+              <a:srgbClr val="FF0000"/>
+            </a:solidFill>
+            <a:tailEnd type="triangle"/>
+          </a:ln>
+        </p:spPr>
+        <p:style>
+          <a:lnRef idx="1">
+            <a:schemeClr val="accent1"/>
+          </a:lnRef>
+          <a:fillRef idx="0">
+            <a:schemeClr val="accent1"/>
+          </a:fillRef>
+          <a:effectRef idx="0">
+            <a:schemeClr val="accent1"/>
+          </a:effectRef>
+          <a:fontRef idx="minor">
+            <a:schemeClr val="tx1"/>
+          </a:fontRef>
+        </p:style>
+      </p:cxnSp>
+      <p:cxnSp>
+        <p:nvCxnSpPr>
+          <p:cNvPr id="15" name="Straight Arrow Connector 14">
+            <a:extLst>
+              <a:ext uri="{FF2B5EF4-FFF2-40B4-BE49-F238E27FC236}">
+                <a16:creationId xmlns:a16="http://schemas.microsoft.com/office/drawing/2014/main" id="{28A0AE86-BADA-4D39-AA70-C6F792611306}"/>
+              </a:ext>
+            </a:extLst>
+          </p:cNvPr>
+          <p:cNvCxnSpPr/>
+          <p:nvPr/>
+        </p:nvCxnSpPr>
+        <p:spPr>
+          <a:xfrm flipH="1">
+            <a:off x="10943629" y="6176963"/>
+            <a:ext cx="587229" cy="0"/>
+          </a:xfrm>
+          <a:prstGeom prst="straightConnector1">
+            <a:avLst/>
+          </a:prstGeom>
+          <a:ln w="38100">
+            <a:solidFill>
+              <a:srgbClr val="FF0000"/>
+            </a:solidFill>
+            <a:tailEnd type="triangle"/>
+          </a:ln>
+        </p:spPr>
+        <p:style>
+          <a:lnRef idx="1">
+            <a:schemeClr val="accent1"/>
+          </a:lnRef>
+          <a:fillRef idx="0">
+            <a:schemeClr val="accent1"/>
+          </a:fillRef>
+          <a:effectRef idx="0">
+            <a:schemeClr val="accent1"/>
+          </a:effectRef>
+          <a:fontRef idx="minor">
+            <a:schemeClr val="tx1"/>
+          </a:fontRef>
+        </p:style>
+      </p:cxnSp>
+      <p:cxnSp>
+        <p:nvCxnSpPr>
+          <p:cNvPr id="17" name="Straight Arrow Connector 16">
+            <a:extLst>
+              <a:ext uri="{FF2B5EF4-FFF2-40B4-BE49-F238E27FC236}">
+                <a16:creationId xmlns:a16="http://schemas.microsoft.com/office/drawing/2014/main" id="{6E8BCE9D-AE74-49A2-BB28-D902AFB881C9}"/>
+              </a:ext>
+            </a:extLst>
+          </p:cNvPr>
+          <p:cNvCxnSpPr/>
+          <p:nvPr/>
+        </p:nvCxnSpPr>
+        <p:spPr>
+          <a:xfrm>
+            <a:off x="4924338" y="5469622"/>
+            <a:ext cx="1719743" cy="897622"/>
+          </a:xfrm>
+          <a:prstGeom prst="straightConnector1">
+            <a:avLst/>
+          </a:prstGeom>
+          <a:ln w="57150">
+            <a:solidFill>
+              <a:srgbClr val="00B050"/>
+            </a:solidFill>
+            <a:tailEnd type="triangle"/>
+          </a:ln>
+        </p:spPr>
+        <p:style>
+          <a:lnRef idx="1">
+            <a:schemeClr val="accent1"/>
+          </a:lnRef>
+          <a:fillRef idx="0">
+            <a:schemeClr val="accent1"/>
+          </a:fillRef>
+          <a:effectRef idx="0">
+            <a:schemeClr val="accent1"/>
+          </a:effectRef>
+          <a:fontRef idx="minor">
+            <a:schemeClr val="tx1"/>
+          </a:fontRef>
+        </p:style>
+      </p:cxnSp>
+    </p:spTree>
+    <p:extLst>
+      <p:ext uri="{BB962C8B-B14F-4D97-AF65-F5344CB8AC3E}">
+        <p14:creationId xmlns:p14="http://schemas.microsoft.com/office/powerpoint/2010/main" val="2264494474"/>
+      </p:ext>
+    </p:extLst>
+  </p:cSld>
+  <p:clrMapOvr>
+    <a:masterClrMapping/>
+  </p:clrMapOvr>
+</p:sld>
+</file>
+
+<file path=ppt/slides/slide18.xml><?xml version="1.0" encoding="utf-8"?>
+<p:sld xmlns:a="http://schemas.openxmlformats.org/drawingml/2006/main" xmlns:r="http://schemas.openxmlformats.org/officeDocument/2006/relationships" xmlns:p="http://schemas.openxmlformats.org/presentationml/2006/main">
+  <p:cSld>
+    <p:spTree>
+      <p:nvGrpSpPr>
+        <p:cNvPr id="1" name=""/>
+        <p:cNvGrpSpPr/>
+        <p:nvPr/>
+      </p:nvGrpSpPr>
+      <p:grpSpPr>
+        <a:xfrm>
+          <a:off x="0" y="0"/>
+          <a:ext cx="0" cy="0"/>
+          <a:chOff x="0" y="0"/>
+          <a:chExt cx="0" cy="0"/>
+        </a:xfrm>
+      </p:grpSpPr>
+      <p:grpSp>
+        <p:nvGrpSpPr>
+          <p:cNvPr id="8" name="Group 7">
+            <a:extLst>
+              <a:ext uri="{FF2B5EF4-FFF2-40B4-BE49-F238E27FC236}">
+                <a16:creationId xmlns:a16="http://schemas.microsoft.com/office/drawing/2014/main" id="{587C13FB-8839-4619-9A20-8063E6844B02}"/>
+              </a:ext>
+            </a:extLst>
+          </p:cNvPr>
+          <p:cNvGrpSpPr/>
+          <p:nvPr/>
+        </p:nvGrpSpPr>
+        <p:grpSpPr>
+          <a:xfrm>
+            <a:off x="1130253" y="172401"/>
+            <a:ext cx="10053670" cy="6555570"/>
+            <a:chOff x="1130253" y="172401"/>
+            <a:chExt cx="10053670" cy="6555570"/>
+          </a:xfrm>
+        </p:grpSpPr>
+        <p:pic>
+          <p:nvPicPr>
+            <p:cNvPr id="3" name="Picture 2" descr="A screenshot of a cell phone&#10;&#10;Description automatically generated">
+              <a:extLst>
+                <a:ext uri="{FF2B5EF4-FFF2-40B4-BE49-F238E27FC236}">
+                  <a16:creationId xmlns:a16="http://schemas.microsoft.com/office/drawing/2014/main" id="{969829A6-0540-4331-A7AC-EBB26CFEA242}"/>
+                </a:ext>
+              </a:extLst>
+            </p:cNvPr>
+            <p:cNvPicPr>
+              <a:picLocks noChangeAspect="1"/>
+            </p:cNvPicPr>
+            <p:nvPr/>
+          </p:nvPicPr>
+          <p:blipFill>
+            <a:blip r:embed="rId2">
+              <a:extLst>
+                <a:ext uri="{28A0092B-C50C-407E-A947-70E740481C1C}">
+                  <a14:useLocalDpi xmlns:a14="http://schemas.microsoft.com/office/drawing/2010/main" val="0"/>
+                </a:ext>
+              </a:extLst>
+            </a:blip>
+            <a:stretch>
+              <a:fillRect/>
+            </a:stretch>
+          </p:blipFill>
+          <p:spPr>
+            <a:xfrm>
+              <a:off x="1130253" y="172401"/>
+              <a:ext cx="9867714" cy="6555570"/>
+            </a:xfrm>
+            <a:prstGeom prst="rect">
+              <a:avLst/>
+            </a:prstGeom>
+          </p:spPr>
+        </p:pic>
+        <p:sp>
+          <p:nvSpPr>
+            <p:cNvPr id="4" name="TextBox 3">
+              <a:extLst>
+                <a:ext uri="{FF2B5EF4-FFF2-40B4-BE49-F238E27FC236}">
+                  <a16:creationId xmlns:a16="http://schemas.microsoft.com/office/drawing/2014/main" id="{01F8070B-2E6F-4DCC-941C-0D6ACAA3F9FD}"/>
+                </a:ext>
+              </a:extLst>
+            </p:cNvPr>
+            <p:cNvSpPr txBox="1"/>
+            <p:nvPr/>
+          </p:nvSpPr>
+          <p:spPr>
+            <a:xfrm>
+              <a:off x="1912690" y="1098958"/>
+              <a:ext cx="1249960" cy="369332"/>
+            </a:xfrm>
+            <a:prstGeom prst="rect">
+              <a:avLst/>
+            </a:prstGeom>
+            <a:noFill/>
+          </p:spPr>
+          <p:txBody>
+            <a:bodyPr wrap="square" rtlCol="0">
+              <a:spAutoFit/>
+            </a:bodyPr>
+            <a:lstStyle/>
+            <a:p>
+              <a:r>
+                <a:rPr lang="en-GB" dirty="0"/>
+                <a:t>R = 0.96</a:t>
+              </a:r>
+            </a:p>
+          </p:txBody>
+        </p:sp>
+        <p:sp>
+          <p:nvSpPr>
+            <p:cNvPr id="5" name="TextBox 4">
+              <a:extLst>
+                <a:ext uri="{FF2B5EF4-FFF2-40B4-BE49-F238E27FC236}">
+                  <a16:creationId xmlns:a16="http://schemas.microsoft.com/office/drawing/2014/main" id="{179D9590-D52F-4665-ACEE-709AA7C6B519}"/>
+                </a:ext>
+              </a:extLst>
+            </p:cNvPr>
+            <p:cNvSpPr txBox="1"/>
+            <p:nvPr/>
+          </p:nvSpPr>
+          <p:spPr>
+            <a:xfrm>
+              <a:off x="6855203" y="1098958"/>
+              <a:ext cx="1249960" cy="369332"/>
+            </a:xfrm>
+            <a:prstGeom prst="rect">
+              <a:avLst/>
+            </a:prstGeom>
+            <a:noFill/>
+          </p:spPr>
+          <p:txBody>
+            <a:bodyPr wrap="square" rtlCol="0">
+              <a:spAutoFit/>
+            </a:bodyPr>
+            <a:lstStyle/>
+            <a:p>
+              <a:r>
+                <a:rPr lang="en-GB" dirty="0"/>
+                <a:t>R = 0.15</a:t>
+              </a:r>
+            </a:p>
+          </p:txBody>
+        </p:sp>
+        <p:sp>
+          <p:nvSpPr>
+            <p:cNvPr id="6" name="TextBox 5">
+              <a:extLst>
+                <a:ext uri="{FF2B5EF4-FFF2-40B4-BE49-F238E27FC236}">
+                  <a16:creationId xmlns:a16="http://schemas.microsoft.com/office/drawing/2014/main" id="{B20A5690-CF29-4AD8-8139-3154CD7DC47A}"/>
+                </a:ext>
+              </a:extLst>
+            </p:cNvPr>
+            <p:cNvSpPr txBox="1"/>
+            <p:nvPr/>
+          </p:nvSpPr>
+          <p:spPr>
+            <a:xfrm>
+              <a:off x="1912690" y="3913464"/>
+              <a:ext cx="1249960" cy="369332"/>
+            </a:xfrm>
+            <a:prstGeom prst="rect">
+              <a:avLst/>
+            </a:prstGeom>
+            <a:noFill/>
+          </p:spPr>
+          <p:txBody>
+            <a:bodyPr wrap="square" rtlCol="0">
+              <a:spAutoFit/>
+            </a:bodyPr>
+            <a:lstStyle/>
+            <a:p>
+              <a:r>
+                <a:rPr lang="en-GB" dirty="0"/>
+                <a:t>R = 0.3</a:t>
+              </a:r>
+            </a:p>
+          </p:txBody>
+        </p:sp>
+        <p:sp>
+          <p:nvSpPr>
+            <p:cNvPr id="7" name="TextBox 6">
+              <a:extLst>
+                <a:ext uri="{FF2B5EF4-FFF2-40B4-BE49-F238E27FC236}">
+                  <a16:creationId xmlns:a16="http://schemas.microsoft.com/office/drawing/2014/main" id="{3CEAFA84-EC03-42A9-ADC9-85F348C1E0FE}"/>
+                </a:ext>
+              </a:extLst>
+            </p:cNvPr>
+            <p:cNvSpPr txBox="1"/>
+            <p:nvPr/>
+          </p:nvSpPr>
+          <p:spPr>
+            <a:xfrm>
+              <a:off x="9933963" y="3913464"/>
+              <a:ext cx="1249960" cy="369332"/>
+            </a:xfrm>
+            <a:prstGeom prst="rect">
+              <a:avLst/>
+            </a:prstGeom>
+            <a:noFill/>
+          </p:spPr>
+          <p:txBody>
+            <a:bodyPr wrap="square" rtlCol="0">
+              <a:spAutoFit/>
+            </a:bodyPr>
+            <a:lstStyle/>
+            <a:p>
+              <a:r>
+                <a:rPr lang="en-GB" dirty="0"/>
+                <a:t>R = 0.03</a:t>
+              </a:r>
+            </a:p>
+          </p:txBody>
+        </p:sp>
+      </p:grpSp>
+    </p:spTree>
+    <p:extLst>
+      <p:ext uri="{BB962C8B-B14F-4D97-AF65-F5344CB8AC3E}">
+        <p14:creationId xmlns:p14="http://schemas.microsoft.com/office/powerpoint/2010/main" val="4111781654"/>
+      </p:ext>
+    </p:extLst>
+  </p:cSld>
+  <p:clrMapOvr>
+    <a:masterClrMapping/>
+  </p:clrMapOvr>
+</p:sld>
+</file>
+
+<file path=ppt/slides/slide19.xml><?xml version="1.0" encoding="utf-8"?>
+<p:sld xmlns:a="http://schemas.openxmlformats.org/drawingml/2006/main" xmlns:r="http://schemas.openxmlformats.org/officeDocument/2006/relationships" xmlns:p="http://schemas.openxmlformats.org/presentationml/2006/main">
+  <p:cSld>
+    <p:spTree>
+      <p:nvGrpSpPr>
+        <p:cNvPr id="1" name=""/>
+        <p:cNvGrpSpPr/>
+        <p:nvPr/>
+      </p:nvGrpSpPr>
+      <p:grpSpPr>
+        <a:xfrm>
+          <a:off x="0" y="0"/>
+          <a:ext cx="0" cy="0"/>
+          <a:chOff x="0" y="0"/>
+          <a:chExt cx="0" cy="0"/>
+        </a:xfrm>
+      </p:grpSpPr>
+      <p:grpSp>
+        <p:nvGrpSpPr>
+          <p:cNvPr id="8" name="Group 7">
+            <a:extLst>
+              <a:ext uri="{FF2B5EF4-FFF2-40B4-BE49-F238E27FC236}">
+                <a16:creationId xmlns:a16="http://schemas.microsoft.com/office/drawing/2014/main" id="{587C13FB-8839-4619-9A20-8063E6844B02}"/>
+              </a:ext>
+            </a:extLst>
+          </p:cNvPr>
+          <p:cNvGrpSpPr/>
+          <p:nvPr/>
+        </p:nvGrpSpPr>
+        <p:grpSpPr>
+          <a:xfrm>
+            <a:off x="1130253" y="172401"/>
+            <a:ext cx="10053670" cy="6555570"/>
+            <a:chOff x="1130253" y="172401"/>
+            <a:chExt cx="10053670" cy="6555570"/>
+          </a:xfrm>
+        </p:grpSpPr>
+        <p:pic>
+          <p:nvPicPr>
+            <p:cNvPr id="3" name="Picture 2" descr="A screenshot of a cell phone&#10;&#10;Description automatically generated">
+              <a:extLst>
+                <a:ext uri="{FF2B5EF4-FFF2-40B4-BE49-F238E27FC236}">
+                  <a16:creationId xmlns:a16="http://schemas.microsoft.com/office/drawing/2014/main" id="{969829A6-0540-4331-A7AC-EBB26CFEA242}"/>
+                </a:ext>
+              </a:extLst>
+            </p:cNvPr>
+            <p:cNvPicPr>
+              <a:picLocks noChangeAspect="1"/>
+            </p:cNvPicPr>
+            <p:nvPr/>
+          </p:nvPicPr>
+          <p:blipFill>
+            <a:blip r:embed="rId2">
+              <a:extLst>
+                <a:ext uri="{28A0092B-C50C-407E-A947-70E740481C1C}">
+                  <a14:useLocalDpi xmlns:a14="http://schemas.microsoft.com/office/drawing/2010/main" val="0"/>
+                </a:ext>
+              </a:extLst>
+            </a:blip>
+            <a:stretch>
+              <a:fillRect/>
+            </a:stretch>
+          </p:blipFill>
+          <p:spPr>
+            <a:xfrm>
+              <a:off x="1130253" y="172401"/>
+              <a:ext cx="9867714" cy="6555570"/>
+            </a:xfrm>
+            <a:prstGeom prst="rect">
+              <a:avLst/>
+            </a:prstGeom>
+          </p:spPr>
+        </p:pic>
+        <p:sp>
+          <p:nvSpPr>
+            <p:cNvPr id="4" name="TextBox 3">
+              <a:extLst>
+                <a:ext uri="{FF2B5EF4-FFF2-40B4-BE49-F238E27FC236}">
+                  <a16:creationId xmlns:a16="http://schemas.microsoft.com/office/drawing/2014/main" id="{01F8070B-2E6F-4DCC-941C-0D6ACAA3F9FD}"/>
+                </a:ext>
+              </a:extLst>
+            </p:cNvPr>
+            <p:cNvSpPr txBox="1"/>
+            <p:nvPr/>
+          </p:nvSpPr>
+          <p:spPr>
+            <a:xfrm>
+              <a:off x="1912690" y="1098958"/>
+              <a:ext cx="1249960" cy="369332"/>
+            </a:xfrm>
+            <a:prstGeom prst="rect">
+              <a:avLst/>
+            </a:prstGeom>
+            <a:noFill/>
+          </p:spPr>
+          <p:txBody>
+            <a:bodyPr wrap="square" rtlCol="0">
+              <a:spAutoFit/>
+            </a:bodyPr>
+            <a:lstStyle/>
+            <a:p>
+              <a:r>
+                <a:rPr lang="en-GB" dirty="0"/>
+                <a:t>R = 0.96</a:t>
+              </a:r>
+            </a:p>
+          </p:txBody>
+        </p:sp>
+        <p:sp>
+          <p:nvSpPr>
+            <p:cNvPr id="5" name="TextBox 4">
+              <a:extLst>
+                <a:ext uri="{FF2B5EF4-FFF2-40B4-BE49-F238E27FC236}">
+                  <a16:creationId xmlns:a16="http://schemas.microsoft.com/office/drawing/2014/main" id="{179D9590-D52F-4665-ACEE-709AA7C6B519}"/>
+                </a:ext>
+              </a:extLst>
+            </p:cNvPr>
+            <p:cNvSpPr txBox="1"/>
+            <p:nvPr/>
+          </p:nvSpPr>
+          <p:spPr>
+            <a:xfrm>
+              <a:off x="6855203" y="1098958"/>
+              <a:ext cx="1249960" cy="369332"/>
+            </a:xfrm>
+            <a:prstGeom prst="rect">
+              <a:avLst/>
+            </a:prstGeom>
+            <a:noFill/>
+          </p:spPr>
+          <p:txBody>
+            <a:bodyPr wrap="square" rtlCol="0">
+              <a:spAutoFit/>
+            </a:bodyPr>
+            <a:lstStyle/>
+            <a:p>
+              <a:r>
+                <a:rPr lang="en-GB" dirty="0"/>
+                <a:t>R = 0.15</a:t>
+              </a:r>
+            </a:p>
+          </p:txBody>
+        </p:sp>
+        <p:sp>
+          <p:nvSpPr>
+            <p:cNvPr id="6" name="TextBox 5">
+              <a:extLst>
+                <a:ext uri="{FF2B5EF4-FFF2-40B4-BE49-F238E27FC236}">
+                  <a16:creationId xmlns:a16="http://schemas.microsoft.com/office/drawing/2014/main" id="{B20A5690-CF29-4AD8-8139-3154CD7DC47A}"/>
+                </a:ext>
+              </a:extLst>
+            </p:cNvPr>
+            <p:cNvSpPr txBox="1"/>
+            <p:nvPr/>
+          </p:nvSpPr>
+          <p:spPr>
+            <a:xfrm>
+              <a:off x="1912690" y="3913464"/>
+              <a:ext cx="1249960" cy="369332"/>
+            </a:xfrm>
+            <a:prstGeom prst="rect">
+              <a:avLst/>
+            </a:prstGeom>
+            <a:noFill/>
+          </p:spPr>
+          <p:txBody>
+            <a:bodyPr wrap="square" rtlCol="0">
+              <a:spAutoFit/>
+            </a:bodyPr>
+            <a:lstStyle/>
+            <a:p>
+              <a:r>
+                <a:rPr lang="en-GB" dirty="0"/>
+                <a:t>R = 0.3</a:t>
+              </a:r>
+            </a:p>
+          </p:txBody>
+        </p:sp>
+        <p:sp>
+          <p:nvSpPr>
+            <p:cNvPr id="7" name="TextBox 6">
+              <a:extLst>
+                <a:ext uri="{FF2B5EF4-FFF2-40B4-BE49-F238E27FC236}">
+                  <a16:creationId xmlns:a16="http://schemas.microsoft.com/office/drawing/2014/main" id="{3CEAFA84-EC03-42A9-ADC9-85F348C1E0FE}"/>
+                </a:ext>
+              </a:extLst>
+            </p:cNvPr>
+            <p:cNvSpPr txBox="1"/>
+            <p:nvPr/>
+          </p:nvSpPr>
+          <p:spPr>
+            <a:xfrm>
+              <a:off x="9933963" y="3913464"/>
+              <a:ext cx="1249960" cy="369332"/>
+            </a:xfrm>
+            <a:prstGeom prst="rect">
+              <a:avLst/>
+            </a:prstGeom>
+            <a:noFill/>
+          </p:spPr>
+          <p:txBody>
+            <a:bodyPr wrap="square" rtlCol="0">
+              <a:spAutoFit/>
+            </a:bodyPr>
+            <a:lstStyle/>
+            <a:p>
+              <a:r>
+                <a:rPr lang="en-GB" dirty="0"/>
+                <a:t>R = 0.03</a:t>
+              </a:r>
+            </a:p>
+          </p:txBody>
+        </p:sp>
+      </p:grpSp>
+      <p:sp>
+        <p:nvSpPr>
+          <p:cNvPr id="2" name="TextBox 1">
+            <a:extLst>
+              <a:ext uri="{FF2B5EF4-FFF2-40B4-BE49-F238E27FC236}">
+                <a16:creationId xmlns:a16="http://schemas.microsoft.com/office/drawing/2014/main" id="{E160FD2B-9306-4698-B982-002A47305769}"/>
+              </a:ext>
+            </a:extLst>
+          </p:cNvPr>
+          <p:cNvSpPr txBox="1"/>
+          <p:nvPr/>
+        </p:nvSpPr>
+        <p:spPr>
+          <a:xfrm>
+            <a:off x="3287354" y="914292"/>
+            <a:ext cx="2776756" cy="738664"/>
+          </a:xfrm>
+          <a:prstGeom prst="rect">
+            <a:avLst/>
+          </a:prstGeom>
+          <a:solidFill>
+            <a:schemeClr val="bg1"/>
+          </a:solidFill>
+        </p:spPr>
+        <p:txBody>
+          <a:bodyPr wrap="square" rtlCol="0">
+            <a:spAutoFit/>
+          </a:bodyPr>
+          <a:lstStyle/>
+          <a:p>
+            <a:r>
+              <a:rPr lang="en-GB" sz="1400" dirty="0"/>
+              <a:t>Strong positive relationship between average pace and time as is expected. </a:t>
+            </a:r>
+          </a:p>
+        </p:txBody>
+      </p:sp>
+      <p:sp>
+        <p:nvSpPr>
+          <p:cNvPr id="9" name="TextBox 8">
+            <a:extLst>
+              <a:ext uri="{FF2B5EF4-FFF2-40B4-BE49-F238E27FC236}">
+                <a16:creationId xmlns:a16="http://schemas.microsoft.com/office/drawing/2014/main" id="{3BA459F3-4666-4785-9C5A-DB1926F93481}"/>
+              </a:ext>
+            </a:extLst>
+          </p:cNvPr>
+          <p:cNvSpPr txBox="1"/>
+          <p:nvPr/>
+        </p:nvSpPr>
+        <p:spPr>
+          <a:xfrm>
+            <a:off x="8296342" y="914292"/>
+            <a:ext cx="3484062" cy="738664"/>
+          </a:xfrm>
+          <a:prstGeom prst="rect">
+            <a:avLst/>
+          </a:prstGeom>
+          <a:solidFill>
+            <a:schemeClr val="bg1"/>
+          </a:solidFill>
+        </p:spPr>
+        <p:txBody>
+          <a:bodyPr wrap="square" rtlCol="0">
+            <a:spAutoFit/>
+          </a:bodyPr>
+          <a:lstStyle/>
+          <a:p>
+            <a:r>
+              <a:rPr lang="en-GB" sz="1400" dirty="0"/>
+              <a:t>Much weaker correlation than average pace. This would probably be expected. Curious gap in the data between 5.6 and 6mins/km.  </a:t>
+            </a:r>
+          </a:p>
+        </p:txBody>
+      </p:sp>
+      <p:sp>
+        <p:nvSpPr>
+          <p:cNvPr id="11" name="TextBox 10">
+            <a:extLst>
+              <a:ext uri="{FF2B5EF4-FFF2-40B4-BE49-F238E27FC236}">
+                <a16:creationId xmlns:a16="http://schemas.microsoft.com/office/drawing/2014/main" id="{407396BE-5157-41D4-B966-58296790F804}"/>
+              </a:ext>
+            </a:extLst>
+          </p:cNvPr>
+          <p:cNvSpPr txBox="1"/>
+          <p:nvPr/>
+        </p:nvSpPr>
+        <p:spPr>
+          <a:xfrm>
+            <a:off x="2726422" y="3805742"/>
+            <a:ext cx="3204595" cy="954107"/>
+          </a:xfrm>
+          <a:prstGeom prst="rect">
+            <a:avLst/>
+          </a:prstGeom>
+          <a:solidFill>
+            <a:schemeClr val="bg1"/>
+          </a:solidFill>
+        </p:spPr>
+        <p:txBody>
+          <a:bodyPr wrap="square" rtlCol="0">
+            <a:spAutoFit/>
+          </a:bodyPr>
+          <a:lstStyle/>
+          <a:p>
+            <a:r>
+              <a:rPr lang="en-GB" sz="1400" dirty="0"/>
+              <a:t>Calories burnt are clustered around 500-600. An R value of 0.3 implies a much stronger relationship than is immediately visible by human eye. </a:t>
+            </a:r>
+          </a:p>
+        </p:txBody>
+      </p:sp>
+      <p:sp>
+        <p:nvSpPr>
+          <p:cNvPr id="12" name="TextBox 11">
+            <a:extLst>
+              <a:ext uri="{FF2B5EF4-FFF2-40B4-BE49-F238E27FC236}">
+                <a16:creationId xmlns:a16="http://schemas.microsoft.com/office/drawing/2014/main" id="{D28A9338-D2A5-4F1E-BD68-F4E8DF20BA38}"/>
+              </a:ext>
+            </a:extLst>
+          </p:cNvPr>
+          <p:cNvSpPr txBox="1"/>
+          <p:nvPr/>
+        </p:nvSpPr>
+        <p:spPr>
+          <a:xfrm>
+            <a:off x="6314812" y="3793266"/>
+            <a:ext cx="3550641" cy="1169551"/>
+          </a:xfrm>
+          <a:prstGeom prst="rect">
+            <a:avLst/>
+          </a:prstGeom>
+          <a:solidFill>
+            <a:schemeClr val="bg1"/>
+          </a:solidFill>
+        </p:spPr>
+        <p:txBody>
+          <a:bodyPr wrap="square" rtlCol="0">
+            <a:spAutoFit/>
+          </a:bodyPr>
+          <a:lstStyle/>
+          <a:p>
+            <a:r>
+              <a:rPr lang="en-GB" sz="1400" dirty="0"/>
+              <a:t>No correlation visible here. Although this is almost certainly due to the limited range of the elevation. We would definitely expect a correlation between elevation and time with a more varied dataset. </a:t>
+            </a:r>
+          </a:p>
+        </p:txBody>
+      </p:sp>
+      <p:sp>
+        <p:nvSpPr>
+          <p:cNvPr id="13" name="TextBox 12">
+            <a:extLst>
+              <a:ext uri="{FF2B5EF4-FFF2-40B4-BE49-F238E27FC236}">
+                <a16:creationId xmlns:a16="http://schemas.microsoft.com/office/drawing/2014/main" id="{E572A2B0-48B9-4AED-84BC-60B14980C560}"/>
+              </a:ext>
+            </a:extLst>
+          </p:cNvPr>
+          <p:cNvSpPr txBox="1"/>
+          <p:nvPr/>
+        </p:nvSpPr>
+        <p:spPr>
+          <a:xfrm>
+            <a:off x="82759" y="5773863"/>
+            <a:ext cx="3204595" cy="954107"/>
+          </a:xfrm>
+          <a:prstGeom prst="rect">
+            <a:avLst/>
+          </a:prstGeom>
+          <a:solidFill>
+            <a:schemeClr val="bg1"/>
+          </a:solidFill>
+        </p:spPr>
+        <p:txBody>
+          <a:bodyPr wrap="square" rtlCol="0">
+            <a:spAutoFit/>
+          </a:bodyPr>
+          <a:lstStyle/>
+          <a:p>
+            <a:r>
+              <a:rPr lang="en-GB" sz="1400" dirty="0"/>
+              <a:t>As companies don’t typically release their algorithms for calculating calories, this would be an interesting feature to explore further. </a:t>
+            </a:r>
+          </a:p>
+        </p:txBody>
+      </p:sp>
+    </p:spTree>
+    <p:extLst>
+      <p:ext uri="{BB962C8B-B14F-4D97-AF65-F5344CB8AC3E}">
+        <p14:creationId xmlns:p14="http://schemas.microsoft.com/office/powerpoint/2010/main" val="3712625328"/>
+      </p:ext>
+    </p:extLst>
+  </p:cSld>
+  <p:clrMapOvr>
+    <a:masterClrMapping/>
+  </p:clrMapOvr>
+</p:sld>
+</file>
+
 <file path=ppt/slides/slide2.xml><?xml version="1.0" encoding="utf-8"?>
 <p:sld xmlns:a="http://schemas.openxmlformats.org/drawingml/2006/main" xmlns:r="http://schemas.openxmlformats.org/officeDocument/2006/relationships" xmlns:p="http://schemas.openxmlformats.org/presentationml/2006/main">
   <p:cSld>
@@ -4811,6 +6061,1095 @@
     <p:extLst>
       <p:ext uri="{BB962C8B-B14F-4D97-AF65-F5344CB8AC3E}">
         <p14:creationId xmlns:p14="http://schemas.microsoft.com/office/powerpoint/2010/main" val="4090212194"/>
+      </p:ext>
+    </p:extLst>
+  </p:cSld>
+  <p:clrMapOvr>
+    <a:masterClrMapping/>
+  </p:clrMapOvr>
+</p:sld>
+</file>
+
+<file path=ppt/slides/slide20.xml><?xml version="1.0" encoding="utf-8"?>
+<p:sld xmlns:a="http://schemas.openxmlformats.org/drawingml/2006/main" xmlns:r="http://schemas.openxmlformats.org/officeDocument/2006/relationships" xmlns:p="http://schemas.openxmlformats.org/presentationml/2006/main">
+  <p:cSld>
+    <p:spTree>
+      <p:nvGrpSpPr>
+        <p:cNvPr id="1" name=""/>
+        <p:cNvGrpSpPr/>
+        <p:nvPr/>
+      </p:nvGrpSpPr>
+      <p:grpSpPr>
+        <a:xfrm>
+          <a:off x="0" y="0"/>
+          <a:ext cx="0" cy="0"/>
+          <a:chOff x="0" y="0"/>
+          <a:chExt cx="0" cy="0"/>
+        </a:xfrm>
+      </p:grpSpPr>
+      <p:grpSp>
+        <p:nvGrpSpPr>
+          <p:cNvPr id="11" name="Group 10">
+            <a:extLst>
+              <a:ext uri="{FF2B5EF4-FFF2-40B4-BE49-F238E27FC236}">
+                <a16:creationId xmlns:a16="http://schemas.microsoft.com/office/drawing/2014/main" id="{CD1F469E-C11E-4206-A1FD-4FCA3B9FF0CC}"/>
+              </a:ext>
+            </a:extLst>
+          </p:cNvPr>
+          <p:cNvGrpSpPr/>
+          <p:nvPr/>
+        </p:nvGrpSpPr>
+        <p:grpSpPr>
+          <a:xfrm>
+            <a:off x="1130253" y="172401"/>
+            <a:ext cx="10053670" cy="6555570"/>
+            <a:chOff x="1130253" y="172401"/>
+            <a:chExt cx="10053670" cy="6555570"/>
+          </a:xfrm>
+        </p:grpSpPr>
+        <p:pic>
+          <p:nvPicPr>
+            <p:cNvPr id="3" name="Picture 2" descr="A screenshot of a cell phone&#10;&#10;Description automatically generated">
+              <a:extLst>
+                <a:ext uri="{FF2B5EF4-FFF2-40B4-BE49-F238E27FC236}">
+                  <a16:creationId xmlns:a16="http://schemas.microsoft.com/office/drawing/2014/main" id="{8F169DB8-4F67-4FF6-8C29-7C3C19FAEBBB}"/>
+                </a:ext>
+              </a:extLst>
+            </p:cNvPr>
+            <p:cNvPicPr>
+              <a:picLocks noChangeAspect="1"/>
+            </p:cNvPicPr>
+            <p:nvPr/>
+          </p:nvPicPr>
+          <p:blipFill>
+            <a:blip r:embed="rId2">
+              <a:extLst>
+                <a:ext uri="{28A0092B-C50C-407E-A947-70E740481C1C}">
+                  <a14:useLocalDpi xmlns:a14="http://schemas.microsoft.com/office/drawing/2010/main" val="0"/>
+                </a:ext>
+              </a:extLst>
+            </a:blip>
+            <a:stretch>
+              <a:fillRect/>
+            </a:stretch>
+          </p:blipFill>
+          <p:spPr>
+            <a:xfrm>
+              <a:off x="1130253" y="172401"/>
+              <a:ext cx="9977660" cy="6555570"/>
+            </a:xfrm>
+            <a:prstGeom prst="rect">
+              <a:avLst/>
+            </a:prstGeom>
+          </p:spPr>
+        </p:pic>
+        <p:sp>
+          <p:nvSpPr>
+            <p:cNvPr id="7" name="TextBox 6">
+              <a:extLst>
+                <a:ext uri="{FF2B5EF4-FFF2-40B4-BE49-F238E27FC236}">
+                  <a16:creationId xmlns:a16="http://schemas.microsoft.com/office/drawing/2014/main" id="{499AB68D-045C-4DE6-91FC-DA031FC28614}"/>
+                </a:ext>
+              </a:extLst>
+            </p:cNvPr>
+            <p:cNvSpPr txBox="1"/>
+            <p:nvPr/>
+          </p:nvSpPr>
+          <p:spPr>
+            <a:xfrm>
+              <a:off x="1912690" y="1098958"/>
+              <a:ext cx="1249960" cy="369332"/>
+            </a:xfrm>
+            <a:prstGeom prst="rect">
+              <a:avLst/>
+            </a:prstGeom>
+            <a:noFill/>
+          </p:spPr>
+          <p:txBody>
+            <a:bodyPr wrap="square" rtlCol="0">
+              <a:spAutoFit/>
+            </a:bodyPr>
+            <a:lstStyle/>
+            <a:p>
+              <a:r>
+                <a:rPr lang="en-GB" dirty="0"/>
+                <a:t>R = -0.08</a:t>
+              </a:r>
+            </a:p>
+          </p:txBody>
+        </p:sp>
+        <p:sp>
+          <p:nvSpPr>
+            <p:cNvPr id="8" name="TextBox 7">
+              <a:extLst>
+                <a:ext uri="{FF2B5EF4-FFF2-40B4-BE49-F238E27FC236}">
+                  <a16:creationId xmlns:a16="http://schemas.microsoft.com/office/drawing/2014/main" id="{357EB3C3-C442-4B86-9275-28180D05B5EC}"/>
+                </a:ext>
+              </a:extLst>
+            </p:cNvPr>
+            <p:cNvSpPr txBox="1"/>
+            <p:nvPr/>
+          </p:nvSpPr>
+          <p:spPr>
+            <a:xfrm>
+              <a:off x="6855203" y="1098958"/>
+              <a:ext cx="1249960" cy="369332"/>
+            </a:xfrm>
+            <a:prstGeom prst="rect">
+              <a:avLst/>
+            </a:prstGeom>
+            <a:noFill/>
+          </p:spPr>
+          <p:txBody>
+            <a:bodyPr wrap="square" rtlCol="0">
+              <a:spAutoFit/>
+            </a:bodyPr>
+            <a:lstStyle/>
+            <a:p>
+              <a:r>
+                <a:rPr lang="en-GB" dirty="0"/>
+                <a:t>R = -0.1</a:t>
+              </a:r>
+            </a:p>
+          </p:txBody>
+        </p:sp>
+        <p:sp>
+          <p:nvSpPr>
+            <p:cNvPr id="9" name="TextBox 8">
+              <a:extLst>
+                <a:ext uri="{FF2B5EF4-FFF2-40B4-BE49-F238E27FC236}">
+                  <a16:creationId xmlns:a16="http://schemas.microsoft.com/office/drawing/2014/main" id="{0075353B-FD7C-4990-A987-95C3194B2F8B}"/>
+                </a:ext>
+              </a:extLst>
+            </p:cNvPr>
+            <p:cNvSpPr txBox="1"/>
+            <p:nvPr/>
+          </p:nvSpPr>
+          <p:spPr>
+            <a:xfrm>
+              <a:off x="4907128" y="3913464"/>
+              <a:ext cx="1249960" cy="369332"/>
+            </a:xfrm>
+            <a:prstGeom prst="rect">
+              <a:avLst/>
+            </a:prstGeom>
+            <a:noFill/>
+          </p:spPr>
+          <p:txBody>
+            <a:bodyPr wrap="square" rtlCol="0">
+              <a:spAutoFit/>
+            </a:bodyPr>
+            <a:lstStyle/>
+            <a:p>
+              <a:r>
+                <a:rPr lang="en-GB" dirty="0"/>
+                <a:t>R = -0.13</a:t>
+              </a:r>
+            </a:p>
+          </p:txBody>
+        </p:sp>
+        <p:sp>
+          <p:nvSpPr>
+            <p:cNvPr id="10" name="TextBox 9">
+              <a:extLst>
+                <a:ext uri="{FF2B5EF4-FFF2-40B4-BE49-F238E27FC236}">
+                  <a16:creationId xmlns:a16="http://schemas.microsoft.com/office/drawing/2014/main" id="{2A2D5211-FB34-4D9E-B721-54BF02694F3E}"/>
+                </a:ext>
+              </a:extLst>
+            </p:cNvPr>
+            <p:cNvSpPr txBox="1"/>
+            <p:nvPr/>
+          </p:nvSpPr>
+          <p:spPr>
+            <a:xfrm>
+              <a:off x="9933963" y="3913464"/>
+              <a:ext cx="1249960" cy="369332"/>
+            </a:xfrm>
+            <a:prstGeom prst="rect">
+              <a:avLst/>
+            </a:prstGeom>
+            <a:noFill/>
+          </p:spPr>
+          <p:txBody>
+            <a:bodyPr wrap="square" rtlCol="0">
+              <a:spAutoFit/>
+            </a:bodyPr>
+            <a:lstStyle/>
+            <a:p>
+              <a:r>
+                <a:rPr lang="en-GB" dirty="0"/>
+                <a:t>R = -0.3</a:t>
+              </a:r>
+            </a:p>
+          </p:txBody>
+        </p:sp>
+      </p:grpSp>
+    </p:spTree>
+    <p:extLst>
+      <p:ext uri="{BB962C8B-B14F-4D97-AF65-F5344CB8AC3E}">
+        <p14:creationId xmlns:p14="http://schemas.microsoft.com/office/powerpoint/2010/main" val="3639911692"/>
+      </p:ext>
+    </p:extLst>
+  </p:cSld>
+  <p:clrMapOvr>
+    <a:masterClrMapping/>
+  </p:clrMapOvr>
+</p:sld>
+</file>
+
+<file path=ppt/slides/slide21.xml><?xml version="1.0" encoding="utf-8"?>
+<p:sld xmlns:a="http://schemas.openxmlformats.org/drawingml/2006/main" xmlns:r="http://schemas.openxmlformats.org/officeDocument/2006/relationships" xmlns:p="http://schemas.openxmlformats.org/presentationml/2006/main">
+  <p:cSld>
+    <p:spTree>
+      <p:nvGrpSpPr>
+        <p:cNvPr id="1" name=""/>
+        <p:cNvGrpSpPr/>
+        <p:nvPr/>
+      </p:nvGrpSpPr>
+      <p:grpSpPr>
+        <a:xfrm>
+          <a:off x="0" y="0"/>
+          <a:ext cx="0" cy="0"/>
+          <a:chOff x="0" y="0"/>
+          <a:chExt cx="0" cy="0"/>
+        </a:xfrm>
+      </p:grpSpPr>
+      <p:grpSp>
+        <p:nvGrpSpPr>
+          <p:cNvPr id="11" name="Group 10">
+            <a:extLst>
+              <a:ext uri="{FF2B5EF4-FFF2-40B4-BE49-F238E27FC236}">
+                <a16:creationId xmlns:a16="http://schemas.microsoft.com/office/drawing/2014/main" id="{CD1F469E-C11E-4206-A1FD-4FCA3B9FF0CC}"/>
+              </a:ext>
+            </a:extLst>
+          </p:cNvPr>
+          <p:cNvGrpSpPr/>
+          <p:nvPr/>
+        </p:nvGrpSpPr>
+        <p:grpSpPr>
+          <a:xfrm>
+            <a:off x="1130253" y="172401"/>
+            <a:ext cx="10053670" cy="6555570"/>
+            <a:chOff x="1130253" y="172401"/>
+            <a:chExt cx="10053670" cy="6555570"/>
+          </a:xfrm>
+        </p:grpSpPr>
+        <p:pic>
+          <p:nvPicPr>
+            <p:cNvPr id="3" name="Picture 2" descr="A screenshot of a cell phone&#10;&#10;Description automatically generated">
+              <a:extLst>
+                <a:ext uri="{FF2B5EF4-FFF2-40B4-BE49-F238E27FC236}">
+                  <a16:creationId xmlns:a16="http://schemas.microsoft.com/office/drawing/2014/main" id="{8F169DB8-4F67-4FF6-8C29-7C3C19FAEBBB}"/>
+                </a:ext>
+              </a:extLst>
+            </p:cNvPr>
+            <p:cNvPicPr>
+              <a:picLocks noChangeAspect="1"/>
+            </p:cNvPicPr>
+            <p:nvPr/>
+          </p:nvPicPr>
+          <p:blipFill>
+            <a:blip r:embed="rId2">
+              <a:extLst>
+                <a:ext uri="{28A0092B-C50C-407E-A947-70E740481C1C}">
+                  <a14:useLocalDpi xmlns:a14="http://schemas.microsoft.com/office/drawing/2010/main" val="0"/>
+                </a:ext>
+              </a:extLst>
+            </a:blip>
+            <a:stretch>
+              <a:fillRect/>
+            </a:stretch>
+          </p:blipFill>
+          <p:spPr>
+            <a:xfrm>
+              <a:off x="1130253" y="172401"/>
+              <a:ext cx="9977660" cy="6555570"/>
+            </a:xfrm>
+            <a:prstGeom prst="rect">
+              <a:avLst/>
+            </a:prstGeom>
+          </p:spPr>
+        </p:pic>
+        <p:sp>
+          <p:nvSpPr>
+            <p:cNvPr id="7" name="TextBox 6">
+              <a:extLst>
+                <a:ext uri="{FF2B5EF4-FFF2-40B4-BE49-F238E27FC236}">
+                  <a16:creationId xmlns:a16="http://schemas.microsoft.com/office/drawing/2014/main" id="{499AB68D-045C-4DE6-91FC-DA031FC28614}"/>
+                </a:ext>
+              </a:extLst>
+            </p:cNvPr>
+            <p:cNvSpPr txBox="1"/>
+            <p:nvPr/>
+          </p:nvSpPr>
+          <p:spPr>
+            <a:xfrm>
+              <a:off x="1912690" y="1098958"/>
+              <a:ext cx="1249960" cy="369332"/>
+            </a:xfrm>
+            <a:prstGeom prst="rect">
+              <a:avLst/>
+            </a:prstGeom>
+            <a:noFill/>
+          </p:spPr>
+          <p:txBody>
+            <a:bodyPr wrap="square" rtlCol="0">
+              <a:spAutoFit/>
+            </a:bodyPr>
+            <a:lstStyle/>
+            <a:p>
+              <a:r>
+                <a:rPr lang="en-GB" dirty="0"/>
+                <a:t>R = -0.08</a:t>
+              </a:r>
+            </a:p>
+          </p:txBody>
+        </p:sp>
+        <p:sp>
+          <p:nvSpPr>
+            <p:cNvPr id="8" name="TextBox 7">
+              <a:extLst>
+                <a:ext uri="{FF2B5EF4-FFF2-40B4-BE49-F238E27FC236}">
+                  <a16:creationId xmlns:a16="http://schemas.microsoft.com/office/drawing/2014/main" id="{357EB3C3-C442-4B86-9275-28180D05B5EC}"/>
+                </a:ext>
+              </a:extLst>
+            </p:cNvPr>
+            <p:cNvSpPr txBox="1"/>
+            <p:nvPr/>
+          </p:nvSpPr>
+          <p:spPr>
+            <a:xfrm>
+              <a:off x="6855203" y="1098958"/>
+              <a:ext cx="1249960" cy="369332"/>
+            </a:xfrm>
+            <a:prstGeom prst="rect">
+              <a:avLst/>
+            </a:prstGeom>
+            <a:noFill/>
+          </p:spPr>
+          <p:txBody>
+            <a:bodyPr wrap="square" rtlCol="0">
+              <a:spAutoFit/>
+            </a:bodyPr>
+            <a:lstStyle/>
+            <a:p>
+              <a:r>
+                <a:rPr lang="en-GB" dirty="0"/>
+                <a:t>R = -0.1</a:t>
+              </a:r>
+            </a:p>
+          </p:txBody>
+        </p:sp>
+        <p:sp>
+          <p:nvSpPr>
+            <p:cNvPr id="9" name="TextBox 8">
+              <a:extLst>
+                <a:ext uri="{FF2B5EF4-FFF2-40B4-BE49-F238E27FC236}">
+                  <a16:creationId xmlns:a16="http://schemas.microsoft.com/office/drawing/2014/main" id="{0075353B-FD7C-4990-A987-95C3194B2F8B}"/>
+                </a:ext>
+              </a:extLst>
+            </p:cNvPr>
+            <p:cNvSpPr txBox="1"/>
+            <p:nvPr/>
+          </p:nvSpPr>
+          <p:spPr>
+            <a:xfrm>
+              <a:off x="4907128" y="3913464"/>
+              <a:ext cx="1249960" cy="369332"/>
+            </a:xfrm>
+            <a:prstGeom prst="rect">
+              <a:avLst/>
+            </a:prstGeom>
+            <a:noFill/>
+          </p:spPr>
+          <p:txBody>
+            <a:bodyPr wrap="square" rtlCol="0">
+              <a:spAutoFit/>
+            </a:bodyPr>
+            <a:lstStyle/>
+            <a:p>
+              <a:r>
+                <a:rPr lang="en-GB" dirty="0"/>
+                <a:t>R = -0.13</a:t>
+              </a:r>
+            </a:p>
+          </p:txBody>
+        </p:sp>
+        <p:sp>
+          <p:nvSpPr>
+            <p:cNvPr id="10" name="TextBox 9">
+              <a:extLst>
+                <a:ext uri="{FF2B5EF4-FFF2-40B4-BE49-F238E27FC236}">
+                  <a16:creationId xmlns:a16="http://schemas.microsoft.com/office/drawing/2014/main" id="{2A2D5211-FB34-4D9E-B721-54BF02694F3E}"/>
+                </a:ext>
+              </a:extLst>
+            </p:cNvPr>
+            <p:cNvSpPr txBox="1"/>
+            <p:nvPr/>
+          </p:nvSpPr>
+          <p:spPr>
+            <a:xfrm>
+              <a:off x="9933963" y="3913464"/>
+              <a:ext cx="1249960" cy="369332"/>
+            </a:xfrm>
+            <a:prstGeom prst="rect">
+              <a:avLst/>
+            </a:prstGeom>
+            <a:noFill/>
+          </p:spPr>
+          <p:txBody>
+            <a:bodyPr wrap="square" rtlCol="0">
+              <a:spAutoFit/>
+            </a:bodyPr>
+            <a:lstStyle/>
+            <a:p>
+              <a:r>
+                <a:rPr lang="en-GB" dirty="0"/>
+                <a:t>R = -0.3</a:t>
+              </a:r>
+            </a:p>
+          </p:txBody>
+        </p:sp>
+      </p:grpSp>
+      <p:sp>
+        <p:nvSpPr>
+          <p:cNvPr id="2" name="TextBox 1">
+            <a:extLst>
+              <a:ext uri="{FF2B5EF4-FFF2-40B4-BE49-F238E27FC236}">
+                <a16:creationId xmlns:a16="http://schemas.microsoft.com/office/drawing/2014/main" id="{6F49BB6C-7E89-41F2-8820-EC053F8D96C4}"/>
+              </a:ext>
+            </a:extLst>
+          </p:cNvPr>
+          <p:cNvSpPr txBox="1"/>
+          <p:nvPr/>
+        </p:nvSpPr>
+        <p:spPr>
+          <a:xfrm>
+            <a:off x="3590488" y="587229"/>
+            <a:ext cx="5217952" cy="1200329"/>
+          </a:xfrm>
+          <a:prstGeom prst="rect">
+            <a:avLst/>
+          </a:prstGeom>
+          <a:solidFill>
+            <a:schemeClr val="bg1"/>
+          </a:solidFill>
+        </p:spPr>
+        <p:txBody>
+          <a:bodyPr wrap="square" rtlCol="0">
+            <a:spAutoFit/>
+          </a:bodyPr>
+          <a:lstStyle/>
+          <a:p>
+            <a:r>
+              <a:rPr lang="en-GB" dirty="0"/>
+              <a:t>HR measurements show little correlation to time. The average HR is clustered 145-160 and max HR 160-180 bpm. Does a lack of correlation make sense here? Probably need to ask a health scientist. . </a:t>
+            </a:r>
+          </a:p>
+        </p:txBody>
+      </p:sp>
+      <p:sp>
+        <p:nvSpPr>
+          <p:cNvPr id="12" name="TextBox 11">
+            <a:extLst>
+              <a:ext uri="{FF2B5EF4-FFF2-40B4-BE49-F238E27FC236}">
+                <a16:creationId xmlns:a16="http://schemas.microsoft.com/office/drawing/2014/main" id="{70006FDD-CADF-4597-AE7C-391247EA6C5D}"/>
+              </a:ext>
+            </a:extLst>
+          </p:cNvPr>
+          <p:cNvSpPr txBox="1"/>
+          <p:nvPr/>
+        </p:nvSpPr>
+        <p:spPr>
+          <a:xfrm>
+            <a:off x="3721916" y="3758402"/>
+            <a:ext cx="5217952" cy="369332"/>
+          </a:xfrm>
+          <a:prstGeom prst="rect">
+            <a:avLst/>
+          </a:prstGeom>
+          <a:solidFill>
+            <a:schemeClr val="bg1"/>
+          </a:solidFill>
+        </p:spPr>
+        <p:txBody>
+          <a:bodyPr wrap="square" rtlCol="0">
+            <a:spAutoFit/>
+          </a:bodyPr>
+          <a:lstStyle/>
+          <a:p>
+            <a:r>
+              <a:rPr lang="en-GB" dirty="0"/>
+              <a:t>Gaps are due to the squashed axis and integer values. </a:t>
+            </a:r>
+          </a:p>
+        </p:txBody>
+      </p:sp>
+      <p:cxnSp>
+        <p:nvCxnSpPr>
+          <p:cNvPr id="5" name="Straight Arrow Connector 4">
+            <a:extLst>
+              <a:ext uri="{FF2B5EF4-FFF2-40B4-BE49-F238E27FC236}">
+                <a16:creationId xmlns:a16="http://schemas.microsoft.com/office/drawing/2014/main" id="{9C79302D-4AB0-46AC-8FBB-1C2194E75AEB}"/>
+              </a:ext>
+            </a:extLst>
+          </p:cNvPr>
+          <p:cNvCxnSpPr/>
+          <p:nvPr/>
+        </p:nvCxnSpPr>
+        <p:spPr>
+          <a:xfrm>
+            <a:off x="8380602" y="4098130"/>
+            <a:ext cx="232350" cy="683595"/>
+          </a:xfrm>
+          <a:prstGeom prst="straightConnector1">
+            <a:avLst/>
+          </a:prstGeom>
+          <a:ln>
+            <a:solidFill>
+              <a:schemeClr val="tx1"/>
+            </a:solidFill>
+            <a:tailEnd type="triangle"/>
+          </a:ln>
+        </p:spPr>
+        <p:style>
+          <a:lnRef idx="1">
+            <a:schemeClr val="accent1"/>
+          </a:lnRef>
+          <a:fillRef idx="0">
+            <a:schemeClr val="accent1"/>
+          </a:fillRef>
+          <a:effectRef idx="0">
+            <a:schemeClr val="accent1"/>
+          </a:effectRef>
+          <a:fontRef idx="minor">
+            <a:schemeClr val="tx1"/>
+          </a:fontRef>
+        </p:style>
+      </p:cxnSp>
+      <p:cxnSp>
+        <p:nvCxnSpPr>
+          <p:cNvPr id="13" name="Straight Arrow Connector 12">
+            <a:extLst>
+              <a:ext uri="{FF2B5EF4-FFF2-40B4-BE49-F238E27FC236}">
+                <a16:creationId xmlns:a16="http://schemas.microsoft.com/office/drawing/2014/main" id="{00121BF9-7F5F-41D4-B5BF-00B1281059B6}"/>
+              </a:ext>
+            </a:extLst>
+          </p:cNvPr>
+          <p:cNvCxnSpPr>
+            <a:cxnSpLocks/>
+          </p:cNvCxnSpPr>
+          <p:nvPr/>
+        </p:nvCxnSpPr>
+        <p:spPr>
+          <a:xfrm flipH="1">
+            <a:off x="4130448" y="4202884"/>
+            <a:ext cx="449764" cy="679509"/>
+          </a:xfrm>
+          <a:prstGeom prst="straightConnector1">
+            <a:avLst/>
+          </a:prstGeom>
+          <a:ln>
+            <a:solidFill>
+              <a:schemeClr val="tx1"/>
+            </a:solidFill>
+            <a:tailEnd type="triangle"/>
+          </a:ln>
+        </p:spPr>
+        <p:style>
+          <a:lnRef idx="1">
+            <a:schemeClr val="accent1"/>
+          </a:lnRef>
+          <a:fillRef idx="0">
+            <a:schemeClr val="accent1"/>
+          </a:fillRef>
+          <a:effectRef idx="0">
+            <a:schemeClr val="accent1"/>
+          </a:effectRef>
+          <a:fontRef idx="minor">
+            <a:schemeClr val="tx1"/>
+          </a:fontRef>
+        </p:style>
+      </p:cxnSp>
+    </p:spTree>
+    <p:extLst>
+      <p:ext uri="{BB962C8B-B14F-4D97-AF65-F5344CB8AC3E}">
+        <p14:creationId xmlns:p14="http://schemas.microsoft.com/office/powerpoint/2010/main" val="3565583398"/>
+      </p:ext>
+    </p:extLst>
+  </p:cSld>
+  <p:clrMapOvr>
+    <a:masterClrMapping/>
+  </p:clrMapOvr>
+</p:sld>
+</file>
+
+<file path=ppt/slides/slide22.xml><?xml version="1.0" encoding="utf-8"?>
+<p:sld xmlns:a="http://schemas.openxmlformats.org/drawingml/2006/main" xmlns:r="http://schemas.openxmlformats.org/officeDocument/2006/relationships" xmlns:p="http://schemas.openxmlformats.org/presentationml/2006/main">
+  <p:cSld>
+    <p:spTree>
+      <p:nvGrpSpPr>
+        <p:cNvPr id="1" name=""/>
+        <p:cNvGrpSpPr/>
+        <p:nvPr/>
+      </p:nvGrpSpPr>
+      <p:grpSpPr>
+        <a:xfrm>
+          <a:off x="0" y="0"/>
+          <a:ext cx="0" cy="0"/>
+          <a:chOff x="0" y="0"/>
+          <a:chExt cx="0" cy="0"/>
+        </a:xfrm>
+      </p:grpSpPr>
+      <p:pic>
+        <p:nvPicPr>
+          <p:cNvPr id="3" name="Picture 2" descr="A screenshot of a cell phone&#10;&#10;Description automatically generated">
+            <a:extLst>
+              <a:ext uri="{FF2B5EF4-FFF2-40B4-BE49-F238E27FC236}">
+                <a16:creationId xmlns:a16="http://schemas.microsoft.com/office/drawing/2014/main" id="{C8826A4C-AC8F-47C2-AC77-D78C7EE6B6D1}"/>
+              </a:ext>
+            </a:extLst>
+          </p:cNvPr>
+          <p:cNvPicPr>
+            <a:picLocks noChangeAspect="1"/>
+          </p:cNvPicPr>
+          <p:nvPr/>
+        </p:nvPicPr>
+        <p:blipFill>
+          <a:blip r:embed="rId2">
+            <a:extLst>
+              <a:ext uri="{28A0092B-C50C-407E-A947-70E740481C1C}">
+                <a14:useLocalDpi xmlns:a14="http://schemas.microsoft.com/office/drawing/2010/main" val="0"/>
+              </a:ext>
+            </a:extLst>
+          </a:blip>
+          <a:stretch>
+            <a:fillRect/>
+          </a:stretch>
+        </p:blipFill>
+        <p:spPr>
+          <a:xfrm>
+            <a:off x="1038945" y="0"/>
+            <a:ext cx="10114109" cy="6858000"/>
+          </a:xfrm>
+          <a:prstGeom prst="rect">
+            <a:avLst/>
+          </a:prstGeom>
+        </p:spPr>
+      </p:pic>
+    </p:spTree>
+    <p:extLst>
+      <p:ext uri="{BB962C8B-B14F-4D97-AF65-F5344CB8AC3E}">
+        <p14:creationId xmlns:p14="http://schemas.microsoft.com/office/powerpoint/2010/main" val="2807649956"/>
+      </p:ext>
+    </p:extLst>
+  </p:cSld>
+  <p:clrMapOvr>
+    <a:masterClrMapping/>
+  </p:clrMapOvr>
+</p:sld>
+</file>
+
+<file path=ppt/slides/slide23.xml><?xml version="1.0" encoding="utf-8"?>
+<p:sld xmlns:a="http://schemas.openxmlformats.org/drawingml/2006/main" xmlns:r="http://schemas.openxmlformats.org/officeDocument/2006/relationships" xmlns:p="http://schemas.openxmlformats.org/presentationml/2006/main">
+  <p:cSld>
+    <p:spTree>
+      <p:nvGrpSpPr>
+        <p:cNvPr id="1" name=""/>
+        <p:cNvGrpSpPr/>
+        <p:nvPr/>
+      </p:nvGrpSpPr>
+      <p:grpSpPr>
+        <a:xfrm>
+          <a:off x="0" y="0"/>
+          <a:ext cx="0" cy="0"/>
+          <a:chOff x="0" y="0"/>
+          <a:chExt cx="0" cy="0"/>
+        </a:xfrm>
+      </p:grpSpPr>
+      <p:pic>
+        <p:nvPicPr>
+          <p:cNvPr id="3" name="Picture 2" descr="A screenshot of a cell phone&#10;&#10;Description automatically generated">
+            <a:extLst>
+              <a:ext uri="{FF2B5EF4-FFF2-40B4-BE49-F238E27FC236}">
+                <a16:creationId xmlns:a16="http://schemas.microsoft.com/office/drawing/2014/main" id="{C8826A4C-AC8F-47C2-AC77-D78C7EE6B6D1}"/>
+              </a:ext>
+            </a:extLst>
+          </p:cNvPr>
+          <p:cNvPicPr>
+            <a:picLocks noChangeAspect="1"/>
+          </p:cNvPicPr>
+          <p:nvPr/>
+        </p:nvPicPr>
+        <p:blipFill>
+          <a:blip r:embed="rId2">
+            <a:extLst>
+              <a:ext uri="{28A0092B-C50C-407E-A947-70E740481C1C}">
+                <a14:useLocalDpi xmlns:a14="http://schemas.microsoft.com/office/drawing/2010/main" val="0"/>
+              </a:ext>
+            </a:extLst>
+          </a:blip>
+          <a:stretch>
+            <a:fillRect/>
+          </a:stretch>
+        </p:blipFill>
+        <p:spPr>
+          <a:xfrm>
+            <a:off x="1038945" y="0"/>
+            <a:ext cx="10114109" cy="6858000"/>
+          </a:xfrm>
+          <a:prstGeom prst="rect">
+            <a:avLst/>
+          </a:prstGeom>
+        </p:spPr>
+      </p:pic>
+      <p:sp>
+        <p:nvSpPr>
+          <p:cNvPr id="2" name="TextBox 1">
+            <a:extLst>
+              <a:ext uri="{FF2B5EF4-FFF2-40B4-BE49-F238E27FC236}">
+                <a16:creationId xmlns:a16="http://schemas.microsoft.com/office/drawing/2014/main" id="{798B9B1A-CECE-4D75-B635-974C2D966B30}"/>
+              </a:ext>
+            </a:extLst>
+          </p:cNvPr>
+          <p:cNvSpPr txBox="1"/>
+          <p:nvPr/>
+        </p:nvSpPr>
+        <p:spPr>
+          <a:xfrm>
+            <a:off x="9370503" y="3816991"/>
+            <a:ext cx="2567031" cy="1200329"/>
+          </a:xfrm>
+          <a:prstGeom prst="rect">
+            <a:avLst/>
+          </a:prstGeom>
+          <a:solidFill>
+            <a:schemeClr val="bg1"/>
+          </a:solidFill>
+        </p:spPr>
+        <p:txBody>
+          <a:bodyPr wrap="square" rtlCol="0">
+            <a:spAutoFit/>
+          </a:bodyPr>
+          <a:lstStyle/>
+          <a:p>
+            <a:r>
+              <a:rPr lang="en-GB" dirty="0"/>
+              <a:t>The best fit line is hopelessly overfit to the natural variance In the dataset. </a:t>
+            </a:r>
+          </a:p>
+        </p:txBody>
+      </p:sp>
+      <p:sp>
+        <p:nvSpPr>
+          <p:cNvPr id="4" name="TextBox 3">
+            <a:extLst>
+              <a:ext uri="{FF2B5EF4-FFF2-40B4-BE49-F238E27FC236}">
+                <a16:creationId xmlns:a16="http://schemas.microsoft.com/office/drawing/2014/main" id="{D89263A0-DB9D-4773-A8FE-0BC5CEE084B6}"/>
+              </a:ext>
+            </a:extLst>
+          </p:cNvPr>
+          <p:cNvSpPr txBox="1"/>
+          <p:nvPr/>
+        </p:nvSpPr>
+        <p:spPr>
+          <a:xfrm>
+            <a:off x="4328719" y="169179"/>
+            <a:ext cx="3256327" cy="1200329"/>
+          </a:xfrm>
+          <a:prstGeom prst="rect">
+            <a:avLst/>
+          </a:prstGeom>
+          <a:solidFill>
+            <a:schemeClr val="bg1"/>
+          </a:solidFill>
+        </p:spPr>
+        <p:txBody>
+          <a:bodyPr wrap="square" rtlCol="0">
+            <a:spAutoFit/>
+          </a:bodyPr>
+          <a:lstStyle/>
+          <a:p>
+            <a:r>
+              <a:rPr lang="en-GB" dirty="0"/>
+              <a:t>Linear and quadratic fits the data quite well but are they suitable for predicting future times? </a:t>
+            </a:r>
+          </a:p>
+        </p:txBody>
+      </p:sp>
+      <p:sp>
+        <p:nvSpPr>
+          <p:cNvPr id="5" name="TextBox 4">
+            <a:extLst>
+              <a:ext uri="{FF2B5EF4-FFF2-40B4-BE49-F238E27FC236}">
+                <a16:creationId xmlns:a16="http://schemas.microsoft.com/office/drawing/2014/main" id="{97D74A8D-24B1-4601-B157-C0F4446FB599}"/>
+              </a:ext>
+            </a:extLst>
+          </p:cNvPr>
+          <p:cNvSpPr txBox="1"/>
+          <p:nvPr/>
+        </p:nvSpPr>
+        <p:spPr>
+          <a:xfrm>
+            <a:off x="2551652" y="3816991"/>
+            <a:ext cx="3807203" cy="923330"/>
+          </a:xfrm>
+          <a:prstGeom prst="rect">
+            <a:avLst/>
+          </a:prstGeom>
+          <a:solidFill>
+            <a:schemeClr val="bg1"/>
+          </a:solidFill>
+        </p:spPr>
+        <p:txBody>
+          <a:bodyPr wrap="square" rtlCol="0">
+            <a:spAutoFit/>
+          </a:bodyPr>
+          <a:lstStyle/>
+          <a:p>
+            <a:r>
+              <a:rPr lang="en-GB" dirty="0"/>
+              <a:t>Both quadratic and cubic trendlines have negative gradients before ~150 days. Is this sensible? </a:t>
+            </a:r>
+          </a:p>
+        </p:txBody>
+      </p:sp>
+    </p:spTree>
+    <p:extLst>
+      <p:ext uri="{BB962C8B-B14F-4D97-AF65-F5344CB8AC3E}">
+        <p14:creationId xmlns:p14="http://schemas.microsoft.com/office/powerpoint/2010/main" val="1936054791"/>
+      </p:ext>
+    </p:extLst>
+  </p:cSld>
+  <p:clrMapOvr>
+    <a:masterClrMapping/>
+  </p:clrMapOvr>
+</p:sld>
+</file>
+
+<file path=ppt/slides/slide24.xml><?xml version="1.0" encoding="utf-8"?>
+<p:sld xmlns:a="http://schemas.openxmlformats.org/drawingml/2006/main" xmlns:r="http://schemas.openxmlformats.org/officeDocument/2006/relationships" xmlns:p="http://schemas.openxmlformats.org/presentationml/2006/main">
+  <p:cSld>
+    <p:spTree>
+      <p:nvGrpSpPr>
+        <p:cNvPr id="1" name=""/>
+        <p:cNvGrpSpPr/>
+        <p:nvPr/>
+      </p:nvGrpSpPr>
+      <p:grpSpPr>
+        <a:xfrm>
+          <a:off x="0" y="0"/>
+          <a:ext cx="0" cy="0"/>
+          <a:chOff x="0" y="0"/>
+          <a:chExt cx="0" cy="0"/>
+        </a:xfrm>
+      </p:grpSpPr>
+      <p:sp>
+        <p:nvSpPr>
+          <p:cNvPr id="2" name="Title 1">
+            <a:extLst>
+              <a:ext uri="{FF2B5EF4-FFF2-40B4-BE49-F238E27FC236}">
+                <a16:creationId xmlns:a16="http://schemas.microsoft.com/office/drawing/2014/main" id="{78140A36-B8B4-45EB-88EB-AE54A3EBA06B}"/>
+              </a:ext>
+            </a:extLst>
+          </p:cNvPr>
+          <p:cNvSpPr>
+            <a:spLocks noGrp="1"/>
+          </p:cNvSpPr>
+          <p:nvPr>
+            <p:ph type="title"/>
+          </p:nvPr>
+        </p:nvSpPr>
+        <p:spPr/>
+        <p:txBody>
+          <a:bodyPr/>
+          <a:lstStyle/>
+          <a:p>
+            <a:r>
+              <a:rPr lang="en-GB" dirty="0"/>
+              <a:t>Some other interesting stats. . . </a:t>
+            </a:r>
+          </a:p>
+        </p:txBody>
+      </p:sp>
+      <p:sp>
+        <p:nvSpPr>
+          <p:cNvPr id="3" name="Content Placeholder 2">
+            <a:extLst>
+              <a:ext uri="{FF2B5EF4-FFF2-40B4-BE49-F238E27FC236}">
+                <a16:creationId xmlns:a16="http://schemas.microsoft.com/office/drawing/2014/main" id="{869C1753-7B55-4CA2-9160-D1CBABA9CECE}"/>
+              </a:ext>
+            </a:extLst>
+          </p:cNvPr>
+          <p:cNvSpPr>
+            <a:spLocks noGrp="1"/>
+          </p:cNvSpPr>
+          <p:nvPr>
+            <p:ph idx="1"/>
+          </p:nvPr>
+        </p:nvSpPr>
+        <p:spPr/>
+        <p:txBody>
+          <a:bodyPr/>
+          <a:lstStyle/>
+          <a:p>
+            <a:r>
+              <a:rPr lang="en-GB" dirty="0"/>
+              <a:t>Difference between slowest and quickest 5k run: </a:t>
+            </a:r>
+            <a:r>
+              <a:rPr lang="en-GB" b="1" dirty="0"/>
+              <a:t>12 minutes and 2 seconds</a:t>
+            </a:r>
+          </a:p>
+          <a:p>
+            <a:r>
+              <a:rPr lang="en-GB" dirty="0"/>
+              <a:t>Difference between slowest and quickest 5k run (discard La Oliva): </a:t>
+            </a:r>
+            <a:r>
+              <a:rPr lang="en-GB" b="1" dirty="0"/>
+              <a:t>6 minutes and 59 seconds</a:t>
+            </a:r>
+          </a:p>
+          <a:p>
+            <a:r>
+              <a:rPr lang="en-GB" dirty="0"/>
+              <a:t>Difference between earliest and latest date: </a:t>
+            </a:r>
+            <a:r>
+              <a:rPr lang="en-GB" b="1" dirty="0"/>
+              <a:t>4 minutes and 57 seconds</a:t>
+            </a:r>
+          </a:p>
+          <a:p>
+            <a:r>
+              <a:rPr lang="en-GB" dirty="0"/>
+              <a:t>Time improvement at Wokingham is: </a:t>
+            </a:r>
+            <a:r>
+              <a:rPr lang="en-GB" b="1" dirty="0"/>
+              <a:t>6 m</a:t>
+            </a:r>
+            <a:r>
+              <a:rPr lang="en-GB" dirty="0"/>
+              <a:t>inutes and 59 seconds</a:t>
+            </a:r>
+          </a:p>
+          <a:p>
+            <a:r>
+              <a:rPr lang="en-GB" dirty="0"/>
+              <a:t>5k PB is: </a:t>
+            </a:r>
+            <a:r>
+              <a:rPr lang="en-GB" b="1" dirty="0"/>
+              <a:t>33 minutes and 11 seconds</a:t>
+            </a:r>
+          </a:p>
+        </p:txBody>
+      </p:sp>
+    </p:spTree>
+    <p:extLst>
+      <p:ext uri="{BB962C8B-B14F-4D97-AF65-F5344CB8AC3E}">
+        <p14:creationId xmlns:p14="http://schemas.microsoft.com/office/powerpoint/2010/main" val="3776936030"/>
+      </p:ext>
+    </p:extLst>
+  </p:cSld>
+  <p:clrMapOvr>
+    <a:masterClrMapping/>
+  </p:clrMapOvr>
+</p:sld>
+</file>
+
+<file path=ppt/slides/slide25.xml><?xml version="1.0" encoding="utf-8"?>
+<p:sld xmlns:a="http://schemas.openxmlformats.org/drawingml/2006/main" xmlns:r="http://schemas.openxmlformats.org/officeDocument/2006/relationships" xmlns:p="http://schemas.openxmlformats.org/presentationml/2006/main">
+  <p:cSld>
+    <p:spTree>
+      <p:nvGrpSpPr>
+        <p:cNvPr id="1" name=""/>
+        <p:cNvGrpSpPr/>
+        <p:nvPr/>
+      </p:nvGrpSpPr>
+      <p:grpSpPr>
+        <a:xfrm>
+          <a:off x="0" y="0"/>
+          <a:ext cx="0" cy="0"/>
+          <a:chOff x="0" y="0"/>
+          <a:chExt cx="0" cy="0"/>
+        </a:xfrm>
+      </p:grpSpPr>
+      <p:sp>
+        <p:nvSpPr>
+          <p:cNvPr id="2" name="Title 1">
+            <a:extLst>
+              <a:ext uri="{FF2B5EF4-FFF2-40B4-BE49-F238E27FC236}">
+                <a16:creationId xmlns:a16="http://schemas.microsoft.com/office/drawing/2014/main" id="{F2C74376-574F-47D1-9465-74EB6825B66E}"/>
+              </a:ext>
+            </a:extLst>
+          </p:cNvPr>
+          <p:cNvSpPr>
+            <a:spLocks noGrp="1"/>
+          </p:cNvSpPr>
+          <p:nvPr>
+            <p:ph type="title"/>
+          </p:nvPr>
+        </p:nvSpPr>
+        <p:spPr/>
+        <p:txBody>
+          <a:bodyPr/>
+          <a:lstStyle/>
+          <a:p>
+            <a:r>
+              <a:rPr lang="en-GB" dirty="0"/>
+              <a:t>10K data</a:t>
+            </a:r>
+          </a:p>
+        </p:txBody>
+      </p:sp>
+      <p:sp>
+        <p:nvSpPr>
+          <p:cNvPr id="3" name="Content Placeholder 2">
+            <a:extLst>
+              <a:ext uri="{FF2B5EF4-FFF2-40B4-BE49-F238E27FC236}">
+                <a16:creationId xmlns:a16="http://schemas.microsoft.com/office/drawing/2014/main" id="{3FDEE798-092E-41DD-AD81-32CCD574C570}"/>
+              </a:ext>
+            </a:extLst>
+          </p:cNvPr>
+          <p:cNvSpPr>
+            <a:spLocks noGrp="1"/>
+          </p:cNvSpPr>
+          <p:nvPr>
+            <p:ph idx="1"/>
+          </p:nvPr>
+        </p:nvSpPr>
+        <p:spPr/>
+        <p:txBody>
+          <a:bodyPr/>
+          <a:lstStyle/>
+          <a:p>
+            <a:r>
+              <a:rPr lang="en-GB" dirty="0"/>
+              <a:t>From the 260 data points recorded, 15 were recorded between the distances of 9.9 and 10.1km. </a:t>
+            </a:r>
+          </a:p>
+          <a:p>
+            <a:r>
+              <a:rPr lang="en-GB" dirty="0"/>
+              <a:t>These datapoints will be referred to as 10km runs. </a:t>
+            </a:r>
+          </a:p>
+          <a:p>
+            <a:r>
+              <a:rPr lang="en-GB" dirty="0"/>
+              <a:t>Next slides show some further analysis into the 10k runs. </a:t>
+            </a:r>
+          </a:p>
+        </p:txBody>
+      </p:sp>
+    </p:spTree>
+    <p:extLst>
+      <p:ext uri="{BB962C8B-B14F-4D97-AF65-F5344CB8AC3E}">
+        <p14:creationId xmlns:p14="http://schemas.microsoft.com/office/powerpoint/2010/main" val="2778795109"/>
       </p:ext>
     </p:extLst>
   </p:cSld>
@@ -5130,7 +7469,7 @@
           <a:p>
             <a:r>
               <a:rPr lang="en-GB" dirty="0"/>
-              <a:t>Max Distance: 13.82km  :O</a:t>
+              <a:t>Max Distance: 13.82km  </a:t>
             </a:r>
           </a:p>
           <a:p>

</xml_diff>

<commit_message>
Finish Data Summary Presentation - First Draft
Completed first draft of Data Summary Presentation
</commit_message>
<xml_diff>
--- a/Data_Summary.pptx
+++ b/Data_Summary.pptx
@@ -7,8 +7,8 @@
   <p:sldIdLst>
     <p:sldId id="256" r:id="rId2"/>
     <p:sldId id="259" r:id="rId3"/>
-    <p:sldId id="260" r:id="rId4"/>
-    <p:sldId id="261" r:id="rId5"/>
+    <p:sldId id="261" r:id="rId4"/>
+    <p:sldId id="291" r:id="rId5"/>
     <p:sldId id="257" r:id="rId6"/>
     <p:sldId id="258" r:id="rId7"/>
     <p:sldId id="262" r:id="rId8"/>
@@ -17,7 +17,7 @@
     <p:sldId id="267" r:id="rId11"/>
     <p:sldId id="266" r:id="rId12"/>
     <p:sldId id="268" r:id="rId13"/>
-    <p:sldId id="263" r:id="rId14"/>
+    <p:sldId id="292" r:id="rId14"/>
     <p:sldId id="269" r:id="rId15"/>
     <p:sldId id="270" r:id="rId16"/>
     <p:sldId id="271" r:id="rId17"/>
@@ -29,7 +29,19 @@
     <p:sldId id="277" r:id="rId23"/>
     <p:sldId id="280" r:id="rId24"/>
     <p:sldId id="276" r:id="rId25"/>
-    <p:sldId id="272" r:id="rId26"/>
+    <p:sldId id="293" r:id="rId26"/>
+    <p:sldId id="272" r:id="rId27"/>
+    <p:sldId id="281" r:id="rId28"/>
+    <p:sldId id="286" r:id="rId29"/>
+    <p:sldId id="287" r:id="rId30"/>
+    <p:sldId id="283" r:id="rId31"/>
+    <p:sldId id="288" r:id="rId32"/>
+    <p:sldId id="285" r:id="rId33"/>
+    <p:sldId id="289" r:id="rId34"/>
+    <p:sldId id="284" r:id="rId35"/>
+    <p:sldId id="290" r:id="rId36"/>
+    <p:sldId id="294" r:id="rId37"/>
+    <p:sldId id="295" r:id="rId38"/>
   </p:sldIdLst>
   <p:sldSz cx="12192000" cy="6858000"/>
   <p:notesSz cx="6858000" cy="9144000"/>
@@ -4178,8 +4190,8 @@
               <a:buAutoNum type="arabicPeriod"/>
             </a:pPr>
             <a:r>
-              <a:rPr lang="en-GB" b="1" dirty="0"/>
-              <a:t>5k Data</a:t>
+              <a:rPr lang="en-GB" dirty="0"/>
+              <a:t>First Impressions</a:t>
             </a:r>
           </a:p>
           <a:p>
@@ -4188,8 +4200,16 @@
               <a:buAutoNum type="arabicPeriod"/>
             </a:pPr>
             <a:r>
+              <a:rPr lang="en-GB" b="1" dirty="0"/>
+              <a:t>5k</a:t>
+            </a:r>
+            <a:r>
               <a:rPr lang="en-GB" dirty="0"/>
-              <a:t>10k Data</a:t>
+              <a:t> </a:t>
+            </a:r>
+            <a:r>
+              <a:rPr lang="en-GB" b="1" dirty="0"/>
+              <a:t>Data</a:t>
             </a:r>
           </a:p>
           <a:p>
@@ -4199,7 +4219,7 @@
             </a:pPr>
             <a:r>
               <a:rPr lang="en-GB" dirty="0"/>
-              <a:t>Other</a:t>
+              <a:t>10k Data</a:t>
             </a:r>
           </a:p>
           <a:p>
@@ -4217,7 +4237,7 @@
     </p:spTree>
     <p:extLst>
       <p:ext uri="{BB962C8B-B14F-4D97-AF65-F5344CB8AC3E}">
-        <p14:creationId xmlns:p14="http://schemas.microsoft.com/office/powerpoint/2010/main" val="2594530493"/>
+        <p14:creationId xmlns:p14="http://schemas.microsoft.com/office/powerpoint/2010/main" val="4090216800"/>
       </p:ext>
     </p:extLst>
   </p:cSld>
@@ -6001,7 +6021,7 @@
               <a:buAutoNum type="arabicPeriod"/>
             </a:pPr>
             <a:r>
-              <a:rPr lang="en-GB" dirty="0"/>
+              <a:rPr lang="en-GB" b="1" dirty="0"/>
               <a:t>Introduction</a:t>
             </a:r>
           </a:p>
@@ -6033,16 +6053,6 @@
             <a:r>
               <a:rPr lang="en-GB" dirty="0"/>
               <a:t>10k Data</a:t>
-            </a:r>
-          </a:p>
-          <a:p>
-            <a:pPr marL="514350" indent="-514350">
-              <a:buFont typeface="+mj-lt"/>
-              <a:buAutoNum type="arabicPeriod"/>
-            </a:pPr>
-            <a:r>
-              <a:rPr lang="en-GB" dirty="0"/>
-              <a:t>Other</a:t>
             </a:r>
           </a:p>
           <a:p>
@@ -6835,7 +6845,7 @@
           <a:p>
             <a:r>
               <a:rPr lang="en-GB" dirty="0"/>
-              <a:t>The best fit line is hopelessly overfit to the natural variance In the dataset. </a:t>
+              <a:t>The best fit line for order 20 is hopelessly overfit to the natural variance In the dataset. </a:t>
             </a:r>
           </a:p>
         </p:txBody>
@@ -7083,7 +7093,7 @@
           <p:cNvPr id="2" name="Title 1">
             <a:extLst>
               <a:ext uri="{FF2B5EF4-FFF2-40B4-BE49-F238E27FC236}">
-                <a16:creationId xmlns:a16="http://schemas.microsoft.com/office/drawing/2014/main" id="{F2C74376-574F-47D1-9465-74EB6825B66E}"/>
+                <a16:creationId xmlns:a16="http://schemas.microsoft.com/office/drawing/2014/main" id="{74E9F826-5C6E-4474-BE7E-DEC7BF10A7D7}"/>
               </a:ext>
             </a:extLst>
           </p:cNvPr>
@@ -7101,7 +7111,7 @@
           <a:p>
             <a:r>
               <a:rPr lang="en-GB" dirty="0"/>
-              <a:t>10K data</a:t>
+              <a:t>Contents</a:t>
             </a:r>
           </a:p>
         </p:txBody>
@@ -7111,7 +7121,7 @@
           <p:cNvPr id="3" name="Content Placeholder 2">
             <a:extLst>
               <a:ext uri="{FF2B5EF4-FFF2-40B4-BE49-F238E27FC236}">
-                <a16:creationId xmlns:a16="http://schemas.microsoft.com/office/drawing/2014/main" id="{3FDEE798-092E-41DD-AD81-32CCD574C570}"/>
+                <a16:creationId xmlns:a16="http://schemas.microsoft.com/office/drawing/2014/main" id="{6507AB12-866C-4630-8EBA-A96761B739A0}"/>
               </a:ext>
             </a:extLst>
           </p:cNvPr>
@@ -7127,6 +7137,136 @@
           <a:bodyPr/>
           <a:lstStyle/>
           <a:p>
+            <a:pPr marL="514350" indent="-514350">
+              <a:buFont typeface="+mj-lt"/>
+              <a:buAutoNum type="arabicPeriod"/>
+            </a:pPr>
+            <a:r>
+              <a:rPr lang="en-GB" dirty="0"/>
+              <a:t>Introduction</a:t>
+            </a:r>
+          </a:p>
+          <a:p>
+            <a:pPr marL="514350" indent="-514350">
+              <a:buFont typeface="+mj-lt"/>
+              <a:buAutoNum type="arabicPeriod"/>
+            </a:pPr>
+            <a:r>
+              <a:rPr lang="en-GB" dirty="0"/>
+              <a:t>First Impressions</a:t>
+            </a:r>
+          </a:p>
+          <a:p>
+            <a:pPr marL="514350" indent="-514350">
+              <a:buFont typeface="+mj-lt"/>
+              <a:buAutoNum type="arabicPeriod"/>
+            </a:pPr>
+            <a:r>
+              <a:rPr lang="en-GB" dirty="0"/>
+              <a:t>5k Data</a:t>
+            </a:r>
+          </a:p>
+          <a:p>
+            <a:pPr marL="514350" indent="-514350">
+              <a:buFont typeface="+mj-lt"/>
+              <a:buAutoNum type="arabicPeriod"/>
+            </a:pPr>
+            <a:r>
+              <a:rPr lang="en-GB" b="1" dirty="0"/>
+              <a:t>10k Data</a:t>
+            </a:r>
+          </a:p>
+          <a:p>
+            <a:pPr marL="514350" indent="-514350">
+              <a:buFont typeface="+mj-lt"/>
+              <a:buAutoNum type="arabicPeriod"/>
+            </a:pPr>
+            <a:r>
+              <a:rPr lang="en-GB" dirty="0"/>
+              <a:t>Conclusion</a:t>
+            </a:r>
+          </a:p>
+        </p:txBody>
+      </p:sp>
+    </p:spTree>
+    <p:extLst>
+      <p:ext uri="{BB962C8B-B14F-4D97-AF65-F5344CB8AC3E}">
+        <p14:creationId xmlns:p14="http://schemas.microsoft.com/office/powerpoint/2010/main" val="2171188178"/>
+      </p:ext>
+    </p:extLst>
+  </p:cSld>
+  <p:clrMapOvr>
+    <a:masterClrMapping/>
+  </p:clrMapOvr>
+</p:sld>
+</file>
+
+<file path=ppt/slides/slide26.xml><?xml version="1.0" encoding="utf-8"?>
+<p:sld xmlns:a="http://schemas.openxmlformats.org/drawingml/2006/main" xmlns:r="http://schemas.openxmlformats.org/officeDocument/2006/relationships" xmlns:p="http://schemas.openxmlformats.org/presentationml/2006/main">
+  <p:cSld>
+    <p:spTree>
+      <p:nvGrpSpPr>
+        <p:cNvPr id="1" name=""/>
+        <p:cNvGrpSpPr/>
+        <p:nvPr/>
+      </p:nvGrpSpPr>
+      <p:grpSpPr>
+        <a:xfrm>
+          <a:off x="0" y="0"/>
+          <a:ext cx="0" cy="0"/>
+          <a:chOff x="0" y="0"/>
+          <a:chExt cx="0" cy="0"/>
+        </a:xfrm>
+      </p:grpSpPr>
+      <p:sp>
+        <p:nvSpPr>
+          <p:cNvPr id="2" name="Title 1">
+            <a:extLst>
+              <a:ext uri="{FF2B5EF4-FFF2-40B4-BE49-F238E27FC236}">
+                <a16:creationId xmlns:a16="http://schemas.microsoft.com/office/drawing/2014/main" id="{F2C74376-574F-47D1-9465-74EB6825B66E}"/>
+              </a:ext>
+            </a:extLst>
+          </p:cNvPr>
+          <p:cNvSpPr>
+            <a:spLocks noGrp="1"/>
+          </p:cNvSpPr>
+          <p:nvPr>
+            <p:ph type="title"/>
+          </p:nvPr>
+        </p:nvSpPr>
+        <p:spPr/>
+        <p:txBody>
+          <a:bodyPr/>
+          <a:lstStyle/>
+          <a:p>
+            <a:r>
+              <a:rPr lang="en-GB" dirty="0"/>
+              <a:t>10K data</a:t>
+            </a:r>
+          </a:p>
+        </p:txBody>
+      </p:sp>
+      <p:sp>
+        <p:nvSpPr>
+          <p:cNvPr id="3" name="Content Placeholder 2">
+            <a:extLst>
+              <a:ext uri="{FF2B5EF4-FFF2-40B4-BE49-F238E27FC236}">
+                <a16:creationId xmlns:a16="http://schemas.microsoft.com/office/drawing/2014/main" id="{3FDEE798-092E-41DD-AD81-32CCD574C570}"/>
+              </a:ext>
+            </a:extLst>
+          </p:cNvPr>
+          <p:cNvSpPr>
+            <a:spLocks noGrp="1"/>
+          </p:cNvSpPr>
+          <p:nvPr>
+            <p:ph idx="1"/>
+          </p:nvPr>
+        </p:nvSpPr>
+        <p:spPr/>
+        <p:txBody>
+          <a:bodyPr/>
+          <a:lstStyle/>
+          <a:p>
             <a:r>
               <a:rPr lang="en-GB" dirty="0"/>
               <a:t>From the 260 data points recorded, 15 were recorded between the distances of 9.9 and 10.1km. </a:t>
@@ -7141,7 +7281,13 @@
           <a:p>
             <a:r>
               <a:rPr lang="en-GB" dirty="0"/>
-              <a:t>Next slides show some further analysis into the 10k runs. </a:t>
+              <a:t>Next slides show some further analysis into the 10k runs.</a:t>
+            </a:r>
+          </a:p>
+          <a:p>
+            <a:r>
+              <a:rPr lang="en-GB" dirty="0"/>
+              <a:t>Note: The 10k dataset is much smaller and therefore harder to draw reliable trends and conclusions.  </a:t>
             </a:r>
           </a:p>
         </p:txBody>
@@ -7150,6 +7296,803 @@
     <p:extLst>
       <p:ext uri="{BB962C8B-B14F-4D97-AF65-F5344CB8AC3E}">
         <p14:creationId xmlns:p14="http://schemas.microsoft.com/office/powerpoint/2010/main" val="2778795109"/>
+      </p:ext>
+    </p:extLst>
+  </p:cSld>
+  <p:clrMapOvr>
+    <a:masterClrMapping/>
+  </p:clrMapOvr>
+</p:sld>
+</file>
+
+<file path=ppt/slides/slide27.xml><?xml version="1.0" encoding="utf-8"?>
+<p:sld xmlns:a="http://schemas.openxmlformats.org/drawingml/2006/main" xmlns:r="http://schemas.openxmlformats.org/officeDocument/2006/relationships" xmlns:p="http://schemas.openxmlformats.org/presentationml/2006/main">
+  <p:cSld>
+    <p:spTree>
+      <p:nvGrpSpPr>
+        <p:cNvPr id="1" name=""/>
+        <p:cNvGrpSpPr/>
+        <p:nvPr/>
+      </p:nvGrpSpPr>
+      <p:grpSpPr>
+        <a:xfrm>
+          <a:off x="0" y="0"/>
+          <a:ext cx="0" cy="0"/>
+          <a:chOff x="0" y="0"/>
+          <a:chExt cx="0" cy="0"/>
+        </a:xfrm>
+      </p:grpSpPr>
+      <p:pic>
+        <p:nvPicPr>
+          <p:cNvPr id="3" name="Picture 2" descr="A screenshot of a social media post&#10;&#10;Description automatically generated">
+            <a:extLst>
+              <a:ext uri="{FF2B5EF4-FFF2-40B4-BE49-F238E27FC236}">
+                <a16:creationId xmlns:a16="http://schemas.microsoft.com/office/drawing/2014/main" id="{6073A895-E19F-47B1-8047-AC970B9C7190}"/>
+              </a:ext>
+            </a:extLst>
+          </p:cNvPr>
+          <p:cNvPicPr>
+            <a:picLocks noChangeAspect="1"/>
+          </p:cNvPicPr>
+          <p:nvPr/>
+        </p:nvPicPr>
+        <p:blipFill>
+          <a:blip r:embed="rId2">
+            <a:extLst>
+              <a:ext uri="{28A0092B-C50C-407E-A947-70E740481C1C}">
+                <a14:useLocalDpi xmlns:a14="http://schemas.microsoft.com/office/drawing/2010/main" val="0"/>
+              </a:ext>
+            </a:extLst>
+          </a:blip>
+          <a:stretch>
+            <a:fillRect/>
+          </a:stretch>
+        </p:blipFill>
+        <p:spPr>
+          <a:xfrm>
+            <a:off x="1115736" y="54273"/>
+            <a:ext cx="9865453" cy="6815131"/>
+          </a:xfrm>
+          <a:prstGeom prst="rect">
+            <a:avLst/>
+          </a:prstGeom>
+        </p:spPr>
+      </p:pic>
+    </p:spTree>
+    <p:extLst>
+      <p:ext uri="{BB962C8B-B14F-4D97-AF65-F5344CB8AC3E}">
+        <p14:creationId xmlns:p14="http://schemas.microsoft.com/office/powerpoint/2010/main" val="3313220228"/>
+      </p:ext>
+    </p:extLst>
+  </p:cSld>
+  <p:clrMapOvr>
+    <a:masterClrMapping/>
+  </p:clrMapOvr>
+</p:sld>
+</file>
+
+<file path=ppt/slides/slide28.xml><?xml version="1.0" encoding="utf-8"?>
+<p:sld xmlns:a="http://schemas.openxmlformats.org/drawingml/2006/main" xmlns:r="http://schemas.openxmlformats.org/officeDocument/2006/relationships" xmlns:p="http://schemas.openxmlformats.org/presentationml/2006/main">
+  <p:cSld>
+    <p:spTree>
+      <p:nvGrpSpPr>
+        <p:cNvPr id="1" name=""/>
+        <p:cNvGrpSpPr/>
+        <p:nvPr/>
+      </p:nvGrpSpPr>
+      <p:grpSpPr>
+        <a:xfrm>
+          <a:off x="0" y="0"/>
+          <a:ext cx="0" cy="0"/>
+          <a:chOff x="0" y="0"/>
+          <a:chExt cx="0" cy="0"/>
+        </a:xfrm>
+      </p:grpSpPr>
+      <p:pic>
+        <p:nvPicPr>
+          <p:cNvPr id="3" name="Picture 2" descr="A screenshot of a social media post&#10;&#10;Description automatically generated">
+            <a:extLst>
+              <a:ext uri="{FF2B5EF4-FFF2-40B4-BE49-F238E27FC236}">
+                <a16:creationId xmlns:a16="http://schemas.microsoft.com/office/drawing/2014/main" id="{6073A895-E19F-47B1-8047-AC970B9C7190}"/>
+              </a:ext>
+            </a:extLst>
+          </p:cNvPr>
+          <p:cNvPicPr>
+            <a:picLocks noChangeAspect="1"/>
+          </p:cNvPicPr>
+          <p:nvPr/>
+        </p:nvPicPr>
+        <p:blipFill>
+          <a:blip r:embed="rId2">
+            <a:extLst>
+              <a:ext uri="{28A0092B-C50C-407E-A947-70E740481C1C}">
+                <a14:useLocalDpi xmlns:a14="http://schemas.microsoft.com/office/drawing/2010/main" val="0"/>
+              </a:ext>
+            </a:extLst>
+          </a:blip>
+          <a:stretch>
+            <a:fillRect/>
+          </a:stretch>
+        </p:blipFill>
+        <p:spPr>
+          <a:xfrm>
+            <a:off x="1115736" y="54273"/>
+            <a:ext cx="9865453" cy="6815131"/>
+          </a:xfrm>
+          <a:prstGeom prst="rect">
+            <a:avLst/>
+          </a:prstGeom>
+        </p:spPr>
+      </p:pic>
+      <p:sp>
+        <p:nvSpPr>
+          <p:cNvPr id="2" name="TextBox 1">
+            <a:extLst>
+              <a:ext uri="{FF2B5EF4-FFF2-40B4-BE49-F238E27FC236}">
+                <a16:creationId xmlns:a16="http://schemas.microsoft.com/office/drawing/2014/main" id="{FE44AB4D-CBE2-43C5-8E90-314CC49354C8}"/>
+              </a:ext>
+            </a:extLst>
+          </p:cNvPr>
+          <p:cNvSpPr txBox="1"/>
+          <p:nvPr/>
+        </p:nvSpPr>
+        <p:spPr>
+          <a:xfrm>
+            <a:off x="2910980" y="4496499"/>
+            <a:ext cx="2424418" cy="369332"/>
+          </a:xfrm>
+          <a:prstGeom prst="rect">
+            <a:avLst/>
+          </a:prstGeom>
+          <a:solidFill>
+            <a:schemeClr val="bg1"/>
+          </a:solidFill>
+        </p:spPr>
+        <p:txBody>
+          <a:bodyPr wrap="square" rtlCol="0">
+            <a:spAutoFit/>
+          </a:bodyPr>
+          <a:lstStyle/>
+          <a:p>
+            <a:r>
+              <a:rPr lang="en-GB" dirty="0"/>
+              <a:t>Strong negative trend! </a:t>
+            </a:r>
+          </a:p>
+        </p:txBody>
+      </p:sp>
+      <p:sp>
+        <p:nvSpPr>
+          <p:cNvPr id="4" name="TextBox 3">
+            <a:extLst>
+              <a:ext uri="{FF2B5EF4-FFF2-40B4-BE49-F238E27FC236}">
+                <a16:creationId xmlns:a16="http://schemas.microsoft.com/office/drawing/2014/main" id="{AB57767B-F843-44AC-8DE4-DAF1A829F3B8}"/>
+              </a:ext>
+            </a:extLst>
+          </p:cNvPr>
+          <p:cNvSpPr txBox="1"/>
+          <p:nvPr/>
+        </p:nvSpPr>
+        <p:spPr>
+          <a:xfrm>
+            <a:off x="6372836" y="513126"/>
+            <a:ext cx="2424418" cy="1754326"/>
+          </a:xfrm>
+          <a:prstGeom prst="rect">
+            <a:avLst/>
+          </a:prstGeom>
+          <a:solidFill>
+            <a:schemeClr val="bg1"/>
+          </a:solidFill>
+        </p:spPr>
+        <p:txBody>
+          <a:bodyPr wrap="square" rtlCol="0">
+            <a:spAutoFit/>
+          </a:bodyPr>
+          <a:lstStyle/>
+          <a:p>
+            <a:r>
+              <a:rPr lang="en-GB" dirty="0"/>
+              <a:t>There was a data point (from Woodley) here but none of the other features were recorded so it has been thrown away. </a:t>
+            </a:r>
+          </a:p>
+        </p:txBody>
+      </p:sp>
+      <p:cxnSp>
+        <p:nvCxnSpPr>
+          <p:cNvPr id="6" name="Straight Arrow Connector 5">
+            <a:extLst>
+              <a:ext uri="{FF2B5EF4-FFF2-40B4-BE49-F238E27FC236}">
+                <a16:creationId xmlns:a16="http://schemas.microsoft.com/office/drawing/2014/main" id="{9D5E2C07-DBC1-407E-9B41-B3FA9433A1C1}"/>
+              </a:ext>
+            </a:extLst>
+          </p:cNvPr>
+          <p:cNvCxnSpPr>
+            <a:stCxn id="4" idx="1"/>
+          </p:cNvCxnSpPr>
+          <p:nvPr/>
+        </p:nvCxnSpPr>
+        <p:spPr>
+          <a:xfrm flipH="1" flipV="1">
+            <a:off x="4311942" y="1090572"/>
+            <a:ext cx="2060894" cy="299717"/>
+          </a:xfrm>
+          <a:prstGeom prst="straightConnector1">
+            <a:avLst/>
+          </a:prstGeom>
+          <a:ln>
+            <a:tailEnd type="triangle"/>
+          </a:ln>
+        </p:spPr>
+        <p:style>
+          <a:lnRef idx="1">
+            <a:schemeClr val="accent1"/>
+          </a:lnRef>
+          <a:fillRef idx="0">
+            <a:schemeClr val="accent1"/>
+          </a:fillRef>
+          <a:effectRef idx="0">
+            <a:schemeClr val="accent1"/>
+          </a:effectRef>
+          <a:fontRef idx="minor">
+            <a:schemeClr val="tx1"/>
+          </a:fontRef>
+        </p:style>
+      </p:cxnSp>
+    </p:spTree>
+    <p:extLst>
+      <p:ext uri="{BB962C8B-B14F-4D97-AF65-F5344CB8AC3E}">
+        <p14:creationId xmlns:p14="http://schemas.microsoft.com/office/powerpoint/2010/main" val="4175844969"/>
+      </p:ext>
+    </p:extLst>
+  </p:cSld>
+  <p:clrMapOvr>
+    <a:masterClrMapping/>
+  </p:clrMapOvr>
+</p:sld>
+</file>
+
+<file path=ppt/slides/slide29.xml><?xml version="1.0" encoding="utf-8"?>
+<p:sld xmlns:a="http://schemas.openxmlformats.org/drawingml/2006/main" xmlns:r="http://schemas.openxmlformats.org/officeDocument/2006/relationships" xmlns:p="http://schemas.openxmlformats.org/presentationml/2006/main">
+  <p:cSld>
+    <p:spTree>
+      <p:nvGrpSpPr>
+        <p:cNvPr id="1" name=""/>
+        <p:cNvGrpSpPr/>
+        <p:nvPr/>
+      </p:nvGrpSpPr>
+      <p:grpSpPr>
+        <a:xfrm>
+          <a:off x="0" y="0"/>
+          <a:ext cx="0" cy="0"/>
+          <a:chOff x="0" y="0"/>
+          <a:chExt cx="0" cy="0"/>
+        </a:xfrm>
+      </p:grpSpPr>
+      <p:sp>
+        <p:nvSpPr>
+          <p:cNvPr id="2" name="Title 1">
+            <a:extLst>
+              <a:ext uri="{FF2B5EF4-FFF2-40B4-BE49-F238E27FC236}">
+                <a16:creationId xmlns:a16="http://schemas.microsoft.com/office/drawing/2014/main" id="{6065471C-B202-46C2-899B-28B20C87774A}"/>
+              </a:ext>
+            </a:extLst>
+          </p:cNvPr>
+          <p:cNvSpPr>
+            <a:spLocks noGrp="1"/>
+          </p:cNvSpPr>
+          <p:nvPr>
+            <p:ph type="title"/>
+          </p:nvPr>
+        </p:nvSpPr>
+        <p:spPr/>
+        <p:txBody>
+          <a:bodyPr/>
+          <a:lstStyle/>
+          <a:p>
+            <a:r>
+              <a:rPr lang="en-GB" dirty="0"/>
+              <a:t>So how do other features relate to Time? </a:t>
+            </a:r>
+          </a:p>
+        </p:txBody>
+      </p:sp>
+      <p:sp>
+        <p:nvSpPr>
+          <p:cNvPr id="3" name="Content Placeholder 2">
+            <a:extLst>
+              <a:ext uri="{FF2B5EF4-FFF2-40B4-BE49-F238E27FC236}">
+                <a16:creationId xmlns:a16="http://schemas.microsoft.com/office/drawing/2014/main" id="{01393760-D529-4A02-ACB7-E651183798A3}"/>
+              </a:ext>
+            </a:extLst>
+          </p:cNvPr>
+          <p:cNvSpPr>
+            <a:spLocks noGrp="1"/>
+          </p:cNvSpPr>
+          <p:nvPr>
+            <p:ph idx="1"/>
+          </p:nvPr>
+        </p:nvSpPr>
+        <p:spPr>
+          <a:xfrm>
+            <a:off x="838200" y="1825625"/>
+            <a:ext cx="5257800" cy="4351338"/>
+          </a:xfrm>
+        </p:spPr>
+        <p:txBody>
+          <a:bodyPr>
+            <a:normAutofit/>
+          </a:bodyPr>
+          <a:lstStyle/>
+          <a:p>
+            <a:r>
+              <a:rPr lang="en-GB" sz="2400" dirty="0"/>
+              <a:t>Same exercise as 5k runs, we are looking at how the other features correlate with time taken to run 10k?</a:t>
+            </a:r>
+          </a:p>
+          <a:p>
+            <a:endParaRPr lang="en-GB" sz="2400" dirty="0"/>
+          </a:p>
+          <a:p>
+            <a:r>
+              <a:rPr lang="en-GB" sz="2400" dirty="0"/>
+              <a:t>Generally stronger correlations found in this dataset, but this is most likely due to significantly less datapoints.</a:t>
+            </a:r>
+          </a:p>
+          <a:p>
+            <a:endParaRPr lang="en-GB" sz="2400" dirty="0"/>
+          </a:p>
+          <a:p>
+            <a:r>
+              <a:rPr lang="en-GB" sz="2400" dirty="0"/>
+              <a:t>I am very dubious of these R values for this dataset.   </a:t>
+            </a:r>
+          </a:p>
+          <a:p>
+            <a:endParaRPr lang="en-GB" sz="2400" dirty="0"/>
+          </a:p>
+        </p:txBody>
+      </p:sp>
+      <p:sp>
+        <p:nvSpPr>
+          <p:cNvPr id="5" name="TextBox 4">
+            <a:extLst>
+              <a:ext uri="{FF2B5EF4-FFF2-40B4-BE49-F238E27FC236}">
+                <a16:creationId xmlns:a16="http://schemas.microsoft.com/office/drawing/2014/main" id="{6E06E83A-6FE3-4DD5-B263-37C6BB5B2385}"/>
+              </a:ext>
+            </a:extLst>
+          </p:cNvPr>
+          <p:cNvSpPr txBox="1"/>
+          <p:nvPr/>
+        </p:nvSpPr>
+        <p:spPr>
+          <a:xfrm>
+            <a:off x="7217568" y="1527323"/>
+            <a:ext cx="1459707" cy="461665"/>
+          </a:xfrm>
+          <a:prstGeom prst="rect">
+            <a:avLst/>
+          </a:prstGeom>
+          <a:noFill/>
+        </p:spPr>
+        <p:txBody>
+          <a:bodyPr wrap="square" rtlCol="0">
+            <a:spAutoFit/>
+          </a:bodyPr>
+          <a:lstStyle/>
+          <a:p>
+            <a:r>
+              <a:rPr lang="en-GB" sz="2400" dirty="0"/>
+              <a:t>Features</a:t>
+            </a:r>
+          </a:p>
+        </p:txBody>
+      </p:sp>
+      <p:sp>
+        <p:nvSpPr>
+          <p:cNvPr id="6" name="TextBox 5">
+            <a:extLst>
+              <a:ext uri="{FF2B5EF4-FFF2-40B4-BE49-F238E27FC236}">
+                <a16:creationId xmlns:a16="http://schemas.microsoft.com/office/drawing/2014/main" id="{8B278B0E-5137-4874-BC3F-6E5780C8CEF3}"/>
+              </a:ext>
+            </a:extLst>
+          </p:cNvPr>
+          <p:cNvSpPr txBox="1"/>
+          <p:nvPr/>
+        </p:nvSpPr>
+        <p:spPr>
+          <a:xfrm>
+            <a:off x="9711331" y="1527324"/>
+            <a:ext cx="1232298" cy="461665"/>
+          </a:xfrm>
+          <a:prstGeom prst="rect">
+            <a:avLst/>
+          </a:prstGeom>
+          <a:noFill/>
+        </p:spPr>
+        <p:txBody>
+          <a:bodyPr wrap="square" rtlCol="0">
+            <a:spAutoFit/>
+          </a:bodyPr>
+          <a:lstStyle/>
+          <a:p>
+            <a:r>
+              <a:rPr lang="en-GB" sz="2400" dirty="0"/>
+              <a:t>R Value</a:t>
+            </a:r>
+          </a:p>
+        </p:txBody>
+      </p:sp>
+      <p:cxnSp>
+        <p:nvCxnSpPr>
+          <p:cNvPr id="8" name="Straight Arrow Connector 7">
+            <a:extLst>
+              <a:ext uri="{FF2B5EF4-FFF2-40B4-BE49-F238E27FC236}">
+                <a16:creationId xmlns:a16="http://schemas.microsoft.com/office/drawing/2014/main" id="{A7CD9B6E-A423-4FE6-99F6-DF3E2C2F0BF4}"/>
+              </a:ext>
+            </a:extLst>
+          </p:cNvPr>
+          <p:cNvCxnSpPr/>
+          <p:nvPr/>
+        </p:nvCxnSpPr>
+        <p:spPr>
+          <a:xfrm flipH="1">
+            <a:off x="10943629" y="2768367"/>
+            <a:ext cx="587229" cy="0"/>
+          </a:xfrm>
+          <a:prstGeom prst="straightConnector1">
+            <a:avLst/>
+          </a:prstGeom>
+          <a:ln w="38100">
+            <a:solidFill>
+              <a:srgbClr val="FF0000"/>
+            </a:solidFill>
+            <a:tailEnd type="triangle"/>
+          </a:ln>
+        </p:spPr>
+        <p:style>
+          <a:lnRef idx="1">
+            <a:schemeClr val="accent1"/>
+          </a:lnRef>
+          <a:fillRef idx="0">
+            <a:schemeClr val="accent1"/>
+          </a:fillRef>
+          <a:effectRef idx="0">
+            <a:schemeClr val="accent1"/>
+          </a:effectRef>
+          <a:fontRef idx="minor">
+            <a:schemeClr val="tx1"/>
+          </a:fontRef>
+        </p:style>
+      </p:cxnSp>
+      <p:cxnSp>
+        <p:nvCxnSpPr>
+          <p:cNvPr id="9" name="Straight Arrow Connector 8">
+            <a:extLst>
+              <a:ext uri="{FF2B5EF4-FFF2-40B4-BE49-F238E27FC236}">
+                <a16:creationId xmlns:a16="http://schemas.microsoft.com/office/drawing/2014/main" id="{D552E57B-D36D-4097-8AC9-26172F479A7D}"/>
+              </a:ext>
+            </a:extLst>
+          </p:cNvPr>
+          <p:cNvCxnSpPr/>
+          <p:nvPr/>
+        </p:nvCxnSpPr>
+        <p:spPr>
+          <a:xfrm flipH="1">
+            <a:off x="10956817" y="4001294"/>
+            <a:ext cx="587229" cy="0"/>
+          </a:xfrm>
+          <a:prstGeom prst="straightConnector1">
+            <a:avLst/>
+          </a:prstGeom>
+          <a:ln w="38100">
+            <a:solidFill>
+              <a:srgbClr val="FF0000"/>
+            </a:solidFill>
+            <a:tailEnd type="triangle"/>
+          </a:ln>
+        </p:spPr>
+        <p:style>
+          <a:lnRef idx="1">
+            <a:schemeClr val="accent1"/>
+          </a:lnRef>
+          <a:fillRef idx="0">
+            <a:schemeClr val="accent1"/>
+          </a:fillRef>
+          <a:effectRef idx="0">
+            <a:schemeClr val="accent1"/>
+          </a:effectRef>
+          <a:fontRef idx="minor">
+            <a:schemeClr val="tx1"/>
+          </a:fontRef>
+        </p:style>
+      </p:cxnSp>
+      <p:cxnSp>
+        <p:nvCxnSpPr>
+          <p:cNvPr id="10" name="Straight Arrow Connector 9">
+            <a:extLst>
+              <a:ext uri="{FF2B5EF4-FFF2-40B4-BE49-F238E27FC236}">
+                <a16:creationId xmlns:a16="http://schemas.microsoft.com/office/drawing/2014/main" id="{75594942-E1FB-48ED-B81E-F11177FDBF95}"/>
+              </a:ext>
+            </a:extLst>
+          </p:cNvPr>
+          <p:cNvCxnSpPr/>
+          <p:nvPr/>
+        </p:nvCxnSpPr>
+        <p:spPr>
+          <a:xfrm flipH="1">
+            <a:off x="10943629" y="3389852"/>
+            <a:ext cx="587229" cy="0"/>
+          </a:xfrm>
+          <a:prstGeom prst="straightConnector1">
+            <a:avLst/>
+          </a:prstGeom>
+          <a:ln w="38100">
+            <a:solidFill>
+              <a:srgbClr val="FF0000"/>
+            </a:solidFill>
+            <a:tailEnd type="triangle"/>
+          </a:ln>
+        </p:spPr>
+        <p:style>
+          <a:lnRef idx="1">
+            <a:schemeClr val="accent1"/>
+          </a:lnRef>
+          <a:fillRef idx="0">
+            <a:schemeClr val="accent1"/>
+          </a:fillRef>
+          <a:effectRef idx="0">
+            <a:schemeClr val="accent1"/>
+          </a:effectRef>
+          <a:fontRef idx="minor">
+            <a:schemeClr val="tx1"/>
+          </a:fontRef>
+        </p:style>
+      </p:cxnSp>
+      <p:cxnSp>
+        <p:nvCxnSpPr>
+          <p:cNvPr id="11" name="Straight Arrow Connector 10">
+            <a:extLst>
+              <a:ext uri="{FF2B5EF4-FFF2-40B4-BE49-F238E27FC236}">
+                <a16:creationId xmlns:a16="http://schemas.microsoft.com/office/drawing/2014/main" id="{8326F180-55F7-4C11-87F1-BB5C2BD546F8}"/>
+              </a:ext>
+            </a:extLst>
+          </p:cNvPr>
+          <p:cNvCxnSpPr/>
+          <p:nvPr/>
+        </p:nvCxnSpPr>
+        <p:spPr>
+          <a:xfrm flipH="1">
+            <a:off x="10943629" y="3701643"/>
+            <a:ext cx="587229" cy="0"/>
+          </a:xfrm>
+          <a:prstGeom prst="straightConnector1">
+            <a:avLst/>
+          </a:prstGeom>
+          <a:ln w="38100">
+            <a:solidFill>
+              <a:srgbClr val="FF0000"/>
+            </a:solidFill>
+            <a:tailEnd type="triangle"/>
+          </a:ln>
+        </p:spPr>
+        <p:style>
+          <a:lnRef idx="1">
+            <a:schemeClr val="accent1"/>
+          </a:lnRef>
+          <a:fillRef idx="0">
+            <a:schemeClr val="accent1"/>
+          </a:fillRef>
+          <a:effectRef idx="0">
+            <a:schemeClr val="accent1"/>
+          </a:effectRef>
+          <a:fontRef idx="minor">
+            <a:schemeClr val="tx1"/>
+          </a:fontRef>
+        </p:style>
+      </p:cxnSp>
+      <p:cxnSp>
+        <p:nvCxnSpPr>
+          <p:cNvPr id="12" name="Straight Arrow Connector 11">
+            <a:extLst>
+              <a:ext uri="{FF2B5EF4-FFF2-40B4-BE49-F238E27FC236}">
+                <a16:creationId xmlns:a16="http://schemas.microsoft.com/office/drawing/2014/main" id="{EB0A1A9E-C5C1-4D91-AAAE-7BC0C963C3D2}"/>
+              </a:ext>
+            </a:extLst>
+          </p:cNvPr>
+          <p:cNvCxnSpPr/>
+          <p:nvPr/>
+        </p:nvCxnSpPr>
+        <p:spPr>
+          <a:xfrm flipH="1">
+            <a:off x="10958612" y="4322122"/>
+            <a:ext cx="587229" cy="0"/>
+          </a:xfrm>
+          <a:prstGeom prst="straightConnector1">
+            <a:avLst/>
+          </a:prstGeom>
+          <a:ln w="38100">
+            <a:solidFill>
+              <a:srgbClr val="FF0000"/>
+            </a:solidFill>
+            <a:tailEnd type="triangle"/>
+          </a:ln>
+        </p:spPr>
+        <p:style>
+          <a:lnRef idx="1">
+            <a:schemeClr val="accent1"/>
+          </a:lnRef>
+          <a:fillRef idx="0">
+            <a:schemeClr val="accent1"/>
+          </a:fillRef>
+          <a:effectRef idx="0">
+            <a:schemeClr val="accent1"/>
+          </a:effectRef>
+          <a:fontRef idx="minor">
+            <a:schemeClr val="tx1"/>
+          </a:fontRef>
+        </p:style>
+      </p:cxnSp>
+      <p:cxnSp>
+        <p:nvCxnSpPr>
+          <p:cNvPr id="13" name="Straight Arrow Connector 12">
+            <a:extLst>
+              <a:ext uri="{FF2B5EF4-FFF2-40B4-BE49-F238E27FC236}">
+                <a16:creationId xmlns:a16="http://schemas.microsoft.com/office/drawing/2014/main" id="{F941016F-B166-4519-82CB-28CB27E4861A}"/>
+              </a:ext>
+            </a:extLst>
+          </p:cNvPr>
+          <p:cNvCxnSpPr/>
+          <p:nvPr/>
+        </p:nvCxnSpPr>
+        <p:spPr>
+          <a:xfrm flipH="1">
+            <a:off x="10943629" y="5256403"/>
+            <a:ext cx="587229" cy="0"/>
+          </a:xfrm>
+          <a:prstGeom prst="straightConnector1">
+            <a:avLst/>
+          </a:prstGeom>
+          <a:ln w="38100">
+            <a:solidFill>
+              <a:srgbClr val="FF0000"/>
+            </a:solidFill>
+            <a:tailEnd type="triangle"/>
+          </a:ln>
+        </p:spPr>
+        <p:style>
+          <a:lnRef idx="1">
+            <a:schemeClr val="accent1"/>
+          </a:lnRef>
+          <a:fillRef idx="0">
+            <a:schemeClr val="accent1"/>
+          </a:fillRef>
+          <a:effectRef idx="0">
+            <a:schemeClr val="accent1"/>
+          </a:effectRef>
+          <a:fontRef idx="minor">
+            <a:schemeClr val="tx1"/>
+          </a:fontRef>
+        </p:style>
+      </p:cxnSp>
+      <p:cxnSp>
+        <p:nvCxnSpPr>
+          <p:cNvPr id="14" name="Straight Arrow Connector 13">
+            <a:extLst>
+              <a:ext uri="{FF2B5EF4-FFF2-40B4-BE49-F238E27FC236}">
+                <a16:creationId xmlns:a16="http://schemas.microsoft.com/office/drawing/2014/main" id="{A118D8B8-3069-4AFA-85C5-2A44057F7F41}"/>
+              </a:ext>
+            </a:extLst>
+          </p:cNvPr>
+          <p:cNvCxnSpPr/>
+          <p:nvPr/>
+        </p:nvCxnSpPr>
+        <p:spPr>
+          <a:xfrm flipH="1">
+            <a:off x="10943629" y="5861809"/>
+            <a:ext cx="587229" cy="0"/>
+          </a:xfrm>
+          <a:prstGeom prst="straightConnector1">
+            <a:avLst/>
+          </a:prstGeom>
+          <a:ln w="38100">
+            <a:solidFill>
+              <a:srgbClr val="FF0000"/>
+            </a:solidFill>
+            <a:tailEnd type="triangle"/>
+          </a:ln>
+        </p:spPr>
+        <p:style>
+          <a:lnRef idx="1">
+            <a:schemeClr val="accent1"/>
+          </a:lnRef>
+          <a:fillRef idx="0">
+            <a:schemeClr val="accent1"/>
+          </a:fillRef>
+          <a:effectRef idx="0">
+            <a:schemeClr val="accent1"/>
+          </a:effectRef>
+          <a:fontRef idx="minor">
+            <a:schemeClr val="tx1"/>
+          </a:fontRef>
+        </p:style>
+      </p:cxnSp>
+      <p:cxnSp>
+        <p:nvCxnSpPr>
+          <p:cNvPr id="15" name="Straight Arrow Connector 14">
+            <a:extLst>
+              <a:ext uri="{FF2B5EF4-FFF2-40B4-BE49-F238E27FC236}">
+                <a16:creationId xmlns:a16="http://schemas.microsoft.com/office/drawing/2014/main" id="{28A0AE86-BADA-4D39-AA70-C6F792611306}"/>
+              </a:ext>
+            </a:extLst>
+          </p:cNvPr>
+          <p:cNvCxnSpPr/>
+          <p:nvPr/>
+        </p:nvCxnSpPr>
+        <p:spPr>
+          <a:xfrm flipH="1">
+            <a:off x="10943629" y="6176963"/>
+            <a:ext cx="587229" cy="0"/>
+          </a:xfrm>
+          <a:prstGeom prst="straightConnector1">
+            <a:avLst/>
+          </a:prstGeom>
+          <a:ln w="38100">
+            <a:solidFill>
+              <a:srgbClr val="FF0000"/>
+            </a:solidFill>
+            <a:tailEnd type="triangle"/>
+          </a:ln>
+        </p:spPr>
+        <p:style>
+          <a:lnRef idx="1">
+            <a:schemeClr val="accent1"/>
+          </a:lnRef>
+          <a:fillRef idx="0">
+            <a:schemeClr val="accent1"/>
+          </a:fillRef>
+          <a:effectRef idx="0">
+            <a:schemeClr val="accent1"/>
+          </a:effectRef>
+          <a:fontRef idx="minor">
+            <a:schemeClr val="tx1"/>
+          </a:fontRef>
+        </p:style>
+      </p:cxnSp>
+      <p:pic>
+        <p:nvPicPr>
+          <p:cNvPr id="4" name="Picture 3">
+            <a:extLst>
+              <a:ext uri="{FF2B5EF4-FFF2-40B4-BE49-F238E27FC236}">
+                <a16:creationId xmlns:a16="http://schemas.microsoft.com/office/drawing/2014/main" id="{17BCF938-B897-4D78-A907-9BEA870F0E68}"/>
+              </a:ext>
+            </a:extLst>
+          </p:cNvPr>
+          <p:cNvPicPr>
+            <a:picLocks noChangeAspect="1"/>
+          </p:cNvPicPr>
+          <p:nvPr/>
+        </p:nvPicPr>
+        <p:blipFill>
+          <a:blip r:embed="rId2"/>
+          <a:stretch>
+            <a:fillRect/>
+          </a:stretch>
+        </p:blipFill>
+        <p:spPr>
+          <a:xfrm>
+            <a:off x="6748456" y="1947905"/>
+            <a:ext cx="4222550" cy="4748435"/>
+          </a:xfrm>
+          <a:prstGeom prst="rect">
+            <a:avLst/>
+          </a:prstGeom>
+        </p:spPr>
+      </p:pic>
+    </p:spTree>
+    <p:extLst>
+      <p:ext uri="{BB962C8B-B14F-4D97-AF65-F5344CB8AC3E}">
+        <p14:creationId xmlns:p14="http://schemas.microsoft.com/office/powerpoint/2010/main" val="379710401"/>
       </p:ext>
     </p:extLst>
   </p:cSld>
@@ -7181,7 +8124,7 @@
           <p:cNvPr id="2" name="Title 1">
             <a:extLst>
               <a:ext uri="{FF2B5EF4-FFF2-40B4-BE49-F238E27FC236}">
-                <a16:creationId xmlns:a16="http://schemas.microsoft.com/office/drawing/2014/main" id="{74E9F826-5C6E-4474-BE7E-DEC7BF10A7D7}"/>
+                <a16:creationId xmlns:a16="http://schemas.microsoft.com/office/drawing/2014/main" id="{854C52A5-9E9A-44D7-B12E-0FD122D8A7A3}"/>
               </a:ext>
             </a:extLst>
           </p:cNvPr>
@@ -7199,7 +8142,7 @@
           <a:p>
             <a:r>
               <a:rPr lang="en-GB" dirty="0"/>
-              <a:t>Contents</a:t>
+              <a:t>Introduction</a:t>
             </a:r>
           </a:p>
         </p:txBody>
@@ -7209,7 +8152,7 @@
           <p:cNvPr id="3" name="Content Placeholder 2">
             <a:extLst>
               <a:ext uri="{FF2B5EF4-FFF2-40B4-BE49-F238E27FC236}">
-                <a16:creationId xmlns:a16="http://schemas.microsoft.com/office/drawing/2014/main" id="{6507AB12-866C-4630-8EBA-A96761B739A0}"/>
+                <a16:creationId xmlns:a16="http://schemas.microsoft.com/office/drawing/2014/main" id="{5485ED19-43AA-4F1C-B23F-3D5812474831}"/>
               </a:ext>
             </a:extLst>
           </p:cNvPr>
@@ -7225,53 +8168,41 @@
           <a:bodyPr/>
           <a:lstStyle/>
           <a:p>
-            <a:pPr marL="514350" indent="-514350">
+            <a:r>
+              <a:rPr lang="en-GB" dirty="0"/>
+              <a:t>This presentation analyses a small running dataset where the data was collected on a fitness watch. The two main aims of this project are: </a:t>
+            </a:r>
+          </a:p>
+          <a:p>
+            <a:pPr marL="914400" lvl="1" indent="-457200">
               <a:buFont typeface="+mj-lt"/>
               <a:buAutoNum type="arabicPeriod"/>
             </a:pPr>
             <a:r>
-              <a:rPr lang="en-GB" b="1" dirty="0"/>
-              <a:t>Introduction</a:t>
-            </a:r>
-          </a:p>
-          <a:p>
-            <a:pPr marL="514350" indent="-514350">
+              <a:rPr lang="en-GB" dirty="0"/>
+              <a:t>Practice of data handling on real, messy data</a:t>
+            </a:r>
+          </a:p>
+          <a:p>
+            <a:pPr marL="914400" lvl="1" indent="-457200">
               <a:buFont typeface="+mj-lt"/>
               <a:buAutoNum type="arabicPeriod"/>
             </a:pPr>
             <a:r>
               <a:rPr lang="en-GB" dirty="0"/>
-              <a:t>5k Data</a:t>
-            </a:r>
-          </a:p>
-          <a:p>
-            <a:pPr marL="514350" indent="-514350">
-              <a:buFont typeface="+mj-lt"/>
-              <a:buAutoNum type="arabicPeriod"/>
-            </a:pPr>
+              <a:t>Assess whether this dataset is suitable for a machine learning project</a:t>
+            </a:r>
+          </a:p>
+          <a:p>
             <a:r>
               <a:rPr lang="en-GB" dirty="0"/>
-              <a:t>10k Data</a:t>
-            </a:r>
-          </a:p>
-          <a:p>
-            <a:pPr marL="514350" indent="-514350">
-              <a:buFont typeface="+mj-lt"/>
-              <a:buAutoNum type="arabicPeriod"/>
-            </a:pPr>
+              <a:t>Multiple plots are shown to broadly summarise the data before assessing specific relationships multiple features and the time taken to complete a run. </a:t>
+            </a:r>
+          </a:p>
+          <a:p>
             <a:r>
               <a:rPr lang="en-GB" dirty="0"/>
-              <a:t>Other</a:t>
-            </a:r>
-          </a:p>
-          <a:p>
-            <a:pPr marL="514350" indent="-514350">
-              <a:buFont typeface="+mj-lt"/>
-              <a:buAutoNum type="arabicPeriod"/>
-            </a:pPr>
-            <a:r>
-              <a:rPr lang="en-GB" dirty="0"/>
-              <a:t>Conclusion</a:t>
+              <a:t>This has been done for practice/general fun. </a:t>
             </a:r>
           </a:p>
         </p:txBody>
@@ -7279,7 +8210,1390 @@
     </p:spTree>
     <p:extLst>
       <p:ext uri="{BB962C8B-B14F-4D97-AF65-F5344CB8AC3E}">
-        <p14:creationId xmlns:p14="http://schemas.microsoft.com/office/powerpoint/2010/main" val="1490033011"/>
+        <p14:creationId xmlns:p14="http://schemas.microsoft.com/office/powerpoint/2010/main" val="1513206591"/>
+      </p:ext>
+    </p:extLst>
+  </p:cSld>
+  <p:clrMapOvr>
+    <a:masterClrMapping/>
+  </p:clrMapOvr>
+</p:sld>
+</file>
+
+<file path=ppt/slides/slide30.xml><?xml version="1.0" encoding="utf-8"?>
+<p:sld xmlns:a="http://schemas.openxmlformats.org/drawingml/2006/main" xmlns:r="http://schemas.openxmlformats.org/officeDocument/2006/relationships" xmlns:p="http://schemas.openxmlformats.org/presentationml/2006/main">
+  <p:cSld>
+    <p:spTree>
+      <p:nvGrpSpPr>
+        <p:cNvPr id="1" name=""/>
+        <p:cNvGrpSpPr/>
+        <p:nvPr/>
+      </p:nvGrpSpPr>
+      <p:grpSpPr>
+        <a:xfrm>
+          <a:off x="0" y="0"/>
+          <a:ext cx="0" cy="0"/>
+          <a:chOff x="0" y="0"/>
+          <a:chExt cx="0" cy="0"/>
+        </a:xfrm>
+      </p:grpSpPr>
+      <p:pic>
+        <p:nvPicPr>
+          <p:cNvPr id="3" name="Picture 2" descr="A screenshot of a cell phone&#10;&#10;Description automatically generated">
+            <a:extLst>
+              <a:ext uri="{FF2B5EF4-FFF2-40B4-BE49-F238E27FC236}">
+                <a16:creationId xmlns:a16="http://schemas.microsoft.com/office/drawing/2014/main" id="{4415F31B-F0F6-4338-9F20-C6B878C4869D}"/>
+              </a:ext>
+            </a:extLst>
+          </p:cNvPr>
+          <p:cNvPicPr>
+            <a:picLocks noChangeAspect="1"/>
+          </p:cNvPicPr>
+          <p:nvPr/>
+        </p:nvPicPr>
+        <p:blipFill>
+          <a:blip r:embed="rId2">
+            <a:extLst>
+              <a:ext uri="{28A0092B-C50C-407E-A947-70E740481C1C}">
+                <a14:useLocalDpi xmlns:a14="http://schemas.microsoft.com/office/drawing/2010/main" val="0"/>
+              </a:ext>
+            </a:extLst>
+          </a:blip>
+          <a:stretch>
+            <a:fillRect/>
+          </a:stretch>
+        </p:blipFill>
+        <p:spPr>
+          <a:xfrm>
+            <a:off x="1057013" y="138962"/>
+            <a:ext cx="9991288" cy="6637666"/>
+          </a:xfrm>
+          <a:prstGeom prst="rect">
+            <a:avLst/>
+          </a:prstGeom>
+        </p:spPr>
+      </p:pic>
+      <p:sp>
+        <p:nvSpPr>
+          <p:cNvPr id="4" name="TextBox 3">
+            <a:extLst>
+              <a:ext uri="{FF2B5EF4-FFF2-40B4-BE49-F238E27FC236}">
+                <a16:creationId xmlns:a16="http://schemas.microsoft.com/office/drawing/2014/main" id="{1DEE8E9A-214A-4887-B632-79A1E119A115}"/>
+              </a:ext>
+            </a:extLst>
+          </p:cNvPr>
+          <p:cNvSpPr txBox="1"/>
+          <p:nvPr/>
+        </p:nvSpPr>
+        <p:spPr>
+          <a:xfrm>
+            <a:off x="1677798" y="1015068"/>
+            <a:ext cx="1249960" cy="369332"/>
+          </a:xfrm>
+          <a:prstGeom prst="rect">
+            <a:avLst/>
+          </a:prstGeom>
+          <a:noFill/>
+        </p:spPr>
+        <p:txBody>
+          <a:bodyPr wrap="square" rtlCol="0">
+            <a:spAutoFit/>
+          </a:bodyPr>
+          <a:lstStyle/>
+          <a:p>
+            <a:r>
+              <a:rPr lang="en-GB" dirty="0"/>
+              <a:t>R = 0.94</a:t>
+            </a:r>
+          </a:p>
+        </p:txBody>
+      </p:sp>
+      <p:sp>
+        <p:nvSpPr>
+          <p:cNvPr id="5" name="TextBox 4">
+            <a:extLst>
+              <a:ext uri="{FF2B5EF4-FFF2-40B4-BE49-F238E27FC236}">
+                <a16:creationId xmlns:a16="http://schemas.microsoft.com/office/drawing/2014/main" id="{BE74D6F1-03C8-4F94-8AD0-427BFC3ADA0A}"/>
+              </a:ext>
+            </a:extLst>
+          </p:cNvPr>
+          <p:cNvSpPr txBox="1"/>
+          <p:nvPr/>
+        </p:nvSpPr>
+        <p:spPr>
+          <a:xfrm>
+            <a:off x="6771313" y="1015068"/>
+            <a:ext cx="1249960" cy="369332"/>
+          </a:xfrm>
+          <a:prstGeom prst="rect">
+            <a:avLst/>
+          </a:prstGeom>
+          <a:noFill/>
+        </p:spPr>
+        <p:txBody>
+          <a:bodyPr wrap="square" rtlCol="0">
+            <a:spAutoFit/>
+          </a:bodyPr>
+          <a:lstStyle/>
+          <a:p>
+            <a:r>
+              <a:rPr lang="en-GB" dirty="0"/>
+              <a:t>R = -0.1</a:t>
+            </a:r>
+          </a:p>
+        </p:txBody>
+      </p:sp>
+      <p:sp>
+        <p:nvSpPr>
+          <p:cNvPr id="6" name="TextBox 5">
+            <a:extLst>
+              <a:ext uri="{FF2B5EF4-FFF2-40B4-BE49-F238E27FC236}">
+                <a16:creationId xmlns:a16="http://schemas.microsoft.com/office/drawing/2014/main" id="{5F9CB728-364E-41DD-A4CD-3972B6290363}"/>
+              </a:ext>
+            </a:extLst>
+          </p:cNvPr>
+          <p:cNvSpPr txBox="1"/>
+          <p:nvPr/>
+        </p:nvSpPr>
+        <p:spPr>
+          <a:xfrm>
+            <a:off x="1677798" y="3917037"/>
+            <a:ext cx="1249960" cy="369332"/>
+          </a:xfrm>
+          <a:prstGeom prst="rect">
+            <a:avLst/>
+          </a:prstGeom>
+          <a:noFill/>
+        </p:spPr>
+        <p:txBody>
+          <a:bodyPr wrap="square" rtlCol="0">
+            <a:spAutoFit/>
+          </a:bodyPr>
+          <a:lstStyle/>
+          <a:p>
+            <a:r>
+              <a:rPr lang="en-GB" dirty="0"/>
+              <a:t>R = 0.03</a:t>
+            </a:r>
+          </a:p>
+        </p:txBody>
+      </p:sp>
+      <p:sp>
+        <p:nvSpPr>
+          <p:cNvPr id="7" name="TextBox 6">
+            <a:extLst>
+              <a:ext uri="{FF2B5EF4-FFF2-40B4-BE49-F238E27FC236}">
+                <a16:creationId xmlns:a16="http://schemas.microsoft.com/office/drawing/2014/main" id="{3F1B4C59-CD11-44AF-BF1E-D13202ABECE2}"/>
+              </a:ext>
+            </a:extLst>
+          </p:cNvPr>
+          <p:cNvSpPr txBox="1"/>
+          <p:nvPr/>
+        </p:nvSpPr>
+        <p:spPr>
+          <a:xfrm>
+            <a:off x="6771313" y="3895443"/>
+            <a:ext cx="1249960" cy="369332"/>
+          </a:xfrm>
+          <a:prstGeom prst="rect">
+            <a:avLst/>
+          </a:prstGeom>
+          <a:noFill/>
+        </p:spPr>
+        <p:txBody>
+          <a:bodyPr wrap="square" rtlCol="0">
+            <a:spAutoFit/>
+          </a:bodyPr>
+          <a:lstStyle/>
+          <a:p>
+            <a:r>
+              <a:rPr lang="en-GB" dirty="0"/>
+              <a:t>R = -0.3</a:t>
+            </a:r>
+          </a:p>
+        </p:txBody>
+      </p:sp>
+    </p:spTree>
+    <p:extLst>
+      <p:ext uri="{BB962C8B-B14F-4D97-AF65-F5344CB8AC3E}">
+        <p14:creationId xmlns:p14="http://schemas.microsoft.com/office/powerpoint/2010/main" val="283240657"/>
+      </p:ext>
+    </p:extLst>
+  </p:cSld>
+  <p:clrMapOvr>
+    <a:masterClrMapping/>
+  </p:clrMapOvr>
+</p:sld>
+</file>
+
+<file path=ppt/slides/slide31.xml><?xml version="1.0" encoding="utf-8"?>
+<p:sld xmlns:a="http://schemas.openxmlformats.org/drawingml/2006/main" xmlns:r="http://schemas.openxmlformats.org/officeDocument/2006/relationships" xmlns:p="http://schemas.openxmlformats.org/presentationml/2006/main">
+  <p:cSld>
+    <p:spTree>
+      <p:nvGrpSpPr>
+        <p:cNvPr id="1" name=""/>
+        <p:cNvGrpSpPr/>
+        <p:nvPr/>
+      </p:nvGrpSpPr>
+      <p:grpSpPr>
+        <a:xfrm>
+          <a:off x="0" y="0"/>
+          <a:ext cx="0" cy="0"/>
+          <a:chOff x="0" y="0"/>
+          <a:chExt cx="0" cy="0"/>
+        </a:xfrm>
+      </p:grpSpPr>
+      <p:pic>
+        <p:nvPicPr>
+          <p:cNvPr id="3" name="Picture 2" descr="A screenshot of a cell phone&#10;&#10;Description automatically generated">
+            <a:extLst>
+              <a:ext uri="{FF2B5EF4-FFF2-40B4-BE49-F238E27FC236}">
+                <a16:creationId xmlns:a16="http://schemas.microsoft.com/office/drawing/2014/main" id="{4415F31B-F0F6-4338-9F20-C6B878C4869D}"/>
+              </a:ext>
+            </a:extLst>
+          </p:cNvPr>
+          <p:cNvPicPr>
+            <a:picLocks noChangeAspect="1"/>
+          </p:cNvPicPr>
+          <p:nvPr/>
+        </p:nvPicPr>
+        <p:blipFill>
+          <a:blip r:embed="rId2">
+            <a:extLst>
+              <a:ext uri="{28A0092B-C50C-407E-A947-70E740481C1C}">
+                <a14:useLocalDpi xmlns:a14="http://schemas.microsoft.com/office/drawing/2010/main" val="0"/>
+              </a:ext>
+            </a:extLst>
+          </a:blip>
+          <a:stretch>
+            <a:fillRect/>
+          </a:stretch>
+        </p:blipFill>
+        <p:spPr>
+          <a:xfrm>
+            <a:off x="1057013" y="138962"/>
+            <a:ext cx="9991288" cy="6637666"/>
+          </a:xfrm>
+          <a:prstGeom prst="rect">
+            <a:avLst/>
+          </a:prstGeom>
+        </p:spPr>
+      </p:pic>
+      <p:sp>
+        <p:nvSpPr>
+          <p:cNvPr id="4" name="TextBox 3">
+            <a:extLst>
+              <a:ext uri="{FF2B5EF4-FFF2-40B4-BE49-F238E27FC236}">
+                <a16:creationId xmlns:a16="http://schemas.microsoft.com/office/drawing/2014/main" id="{1DEE8E9A-214A-4887-B632-79A1E119A115}"/>
+              </a:ext>
+            </a:extLst>
+          </p:cNvPr>
+          <p:cNvSpPr txBox="1"/>
+          <p:nvPr/>
+        </p:nvSpPr>
+        <p:spPr>
+          <a:xfrm>
+            <a:off x="1677798" y="1015068"/>
+            <a:ext cx="1249960" cy="369332"/>
+          </a:xfrm>
+          <a:prstGeom prst="rect">
+            <a:avLst/>
+          </a:prstGeom>
+          <a:noFill/>
+        </p:spPr>
+        <p:txBody>
+          <a:bodyPr wrap="square" rtlCol="0">
+            <a:spAutoFit/>
+          </a:bodyPr>
+          <a:lstStyle/>
+          <a:p>
+            <a:r>
+              <a:rPr lang="en-GB" dirty="0"/>
+              <a:t>R = 0.94</a:t>
+            </a:r>
+          </a:p>
+        </p:txBody>
+      </p:sp>
+      <p:sp>
+        <p:nvSpPr>
+          <p:cNvPr id="5" name="TextBox 4">
+            <a:extLst>
+              <a:ext uri="{FF2B5EF4-FFF2-40B4-BE49-F238E27FC236}">
+                <a16:creationId xmlns:a16="http://schemas.microsoft.com/office/drawing/2014/main" id="{BE74D6F1-03C8-4F94-8AD0-427BFC3ADA0A}"/>
+              </a:ext>
+            </a:extLst>
+          </p:cNvPr>
+          <p:cNvSpPr txBox="1"/>
+          <p:nvPr/>
+        </p:nvSpPr>
+        <p:spPr>
+          <a:xfrm>
+            <a:off x="6771313" y="1015068"/>
+            <a:ext cx="1249960" cy="369332"/>
+          </a:xfrm>
+          <a:prstGeom prst="rect">
+            <a:avLst/>
+          </a:prstGeom>
+          <a:noFill/>
+        </p:spPr>
+        <p:txBody>
+          <a:bodyPr wrap="square" rtlCol="0">
+            <a:spAutoFit/>
+          </a:bodyPr>
+          <a:lstStyle/>
+          <a:p>
+            <a:r>
+              <a:rPr lang="en-GB" dirty="0"/>
+              <a:t>R = -0.1</a:t>
+            </a:r>
+          </a:p>
+        </p:txBody>
+      </p:sp>
+      <p:sp>
+        <p:nvSpPr>
+          <p:cNvPr id="6" name="TextBox 5">
+            <a:extLst>
+              <a:ext uri="{FF2B5EF4-FFF2-40B4-BE49-F238E27FC236}">
+                <a16:creationId xmlns:a16="http://schemas.microsoft.com/office/drawing/2014/main" id="{5F9CB728-364E-41DD-A4CD-3972B6290363}"/>
+              </a:ext>
+            </a:extLst>
+          </p:cNvPr>
+          <p:cNvSpPr txBox="1"/>
+          <p:nvPr/>
+        </p:nvSpPr>
+        <p:spPr>
+          <a:xfrm>
+            <a:off x="1677798" y="3917037"/>
+            <a:ext cx="1249960" cy="369332"/>
+          </a:xfrm>
+          <a:prstGeom prst="rect">
+            <a:avLst/>
+          </a:prstGeom>
+          <a:noFill/>
+        </p:spPr>
+        <p:txBody>
+          <a:bodyPr wrap="square" rtlCol="0">
+            <a:spAutoFit/>
+          </a:bodyPr>
+          <a:lstStyle/>
+          <a:p>
+            <a:r>
+              <a:rPr lang="en-GB" dirty="0"/>
+              <a:t>R = 0.03</a:t>
+            </a:r>
+          </a:p>
+        </p:txBody>
+      </p:sp>
+      <p:sp>
+        <p:nvSpPr>
+          <p:cNvPr id="7" name="TextBox 6">
+            <a:extLst>
+              <a:ext uri="{FF2B5EF4-FFF2-40B4-BE49-F238E27FC236}">
+                <a16:creationId xmlns:a16="http://schemas.microsoft.com/office/drawing/2014/main" id="{3F1B4C59-CD11-44AF-BF1E-D13202ABECE2}"/>
+              </a:ext>
+            </a:extLst>
+          </p:cNvPr>
+          <p:cNvSpPr txBox="1"/>
+          <p:nvPr/>
+        </p:nvSpPr>
+        <p:spPr>
+          <a:xfrm>
+            <a:off x="6771313" y="3895443"/>
+            <a:ext cx="1249960" cy="369332"/>
+          </a:xfrm>
+          <a:prstGeom prst="rect">
+            <a:avLst/>
+          </a:prstGeom>
+          <a:noFill/>
+        </p:spPr>
+        <p:txBody>
+          <a:bodyPr wrap="square" rtlCol="0">
+            <a:spAutoFit/>
+          </a:bodyPr>
+          <a:lstStyle/>
+          <a:p>
+            <a:r>
+              <a:rPr lang="en-GB" dirty="0"/>
+              <a:t>R = -0.3</a:t>
+            </a:r>
+          </a:p>
+        </p:txBody>
+      </p:sp>
+      <p:sp>
+        <p:nvSpPr>
+          <p:cNvPr id="2" name="TextBox 1">
+            <a:extLst>
+              <a:ext uri="{FF2B5EF4-FFF2-40B4-BE49-F238E27FC236}">
+                <a16:creationId xmlns:a16="http://schemas.microsoft.com/office/drawing/2014/main" id="{36EB936F-4CD4-4302-8E53-E73E7EA14F58}"/>
+              </a:ext>
+            </a:extLst>
+          </p:cNvPr>
+          <p:cNvSpPr txBox="1"/>
+          <p:nvPr/>
+        </p:nvSpPr>
+        <p:spPr>
+          <a:xfrm>
+            <a:off x="4353886" y="1499365"/>
+            <a:ext cx="3140278" cy="1754326"/>
+          </a:xfrm>
+          <a:prstGeom prst="rect">
+            <a:avLst/>
+          </a:prstGeom>
+          <a:solidFill>
+            <a:schemeClr val="bg1"/>
+          </a:solidFill>
+        </p:spPr>
+        <p:txBody>
+          <a:bodyPr wrap="square" rtlCol="0">
+            <a:spAutoFit/>
+          </a:bodyPr>
+          <a:lstStyle/>
+          <a:p>
+            <a:r>
+              <a:rPr lang="en-GB" dirty="0"/>
+              <a:t>Considerable difference between correlations from best and average pace. Similar to 5k dataset. Difference between </a:t>
+            </a:r>
+            <a:r>
+              <a:rPr lang="en-GB" dirty="0" err="1"/>
+              <a:t>Avg_Pace</a:t>
+            </a:r>
+            <a:r>
+              <a:rPr lang="en-GB" dirty="0"/>
+              <a:t> and </a:t>
+            </a:r>
+            <a:r>
+              <a:rPr lang="en-GB" dirty="0" err="1"/>
+              <a:t>Best_Pace</a:t>
+            </a:r>
+            <a:r>
+              <a:rPr lang="en-GB" dirty="0"/>
+              <a:t> may be an interesting metric.. ? </a:t>
+            </a:r>
+          </a:p>
+        </p:txBody>
+      </p:sp>
+      <p:sp>
+        <p:nvSpPr>
+          <p:cNvPr id="8" name="TextBox 7">
+            <a:extLst>
+              <a:ext uri="{FF2B5EF4-FFF2-40B4-BE49-F238E27FC236}">
+                <a16:creationId xmlns:a16="http://schemas.microsoft.com/office/drawing/2014/main" id="{9F37F9CE-E867-4186-9576-219B0DEA538D}"/>
+              </a:ext>
+            </a:extLst>
+          </p:cNvPr>
+          <p:cNvSpPr txBox="1"/>
+          <p:nvPr/>
+        </p:nvSpPr>
+        <p:spPr>
+          <a:xfrm>
+            <a:off x="5076737" y="4422230"/>
+            <a:ext cx="2417427" cy="923330"/>
+          </a:xfrm>
+          <a:prstGeom prst="rect">
+            <a:avLst/>
+          </a:prstGeom>
+          <a:solidFill>
+            <a:schemeClr val="bg1"/>
+          </a:solidFill>
+        </p:spPr>
+        <p:txBody>
+          <a:bodyPr wrap="square" rtlCol="0">
+            <a:spAutoFit/>
+          </a:bodyPr>
+          <a:lstStyle/>
+          <a:p>
+            <a:r>
+              <a:rPr lang="en-GB" dirty="0"/>
+              <a:t>Calories once again shows no correlation to the time. </a:t>
+            </a:r>
+          </a:p>
+        </p:txBody>
+      </p:sp>
+    </p:spTree>
+    <p:extLst>
+      <p:ext uri="{BB962C8B-B14F-4D97-AF65-F5344CB8AC3E}">
+        <p14:creationId xmlns:p14="http://schemas.microsoft.com/office/powerpoint/2010/main" val="536886127"/>
+      </p:ext>
+    </p:extLst>
+  </p:cSld>
+  <p:clrMapOvr>
+    <a:masterClrMapping/>
+  </p:clrMapOvr>
+</p:sld>
+</file>
+
+<file path=ppt/slides/slide32.xml><?xml version="1.0" encoding="utf-8"?>
+<p:sld xmlns:a="http://schemas.openxmlformats.org/drawingml/2006/main" xmlns:r="http://schemas.openxmlformats.org/officeDocument/2006/relationships" xmlns:p="http://schemas.openxmlformats.org/presentationml/2006/main">
+  <p:cSld>
+    <p:spTree>
+      <p:nvGrpSpPr>
+        <p:cNvPr id="1" name=""/>
+        <p:cNvGrpSpPr/>
+        <p:nvPr/>
+      </p:nvGrpSpPr>
+      <p:grpSpPr>
+        <a:xfrm>
+          <a:off x="0" y="0"/>
+          <a:ext cx="0" cy="0"/>
+          <a:chOff x="0" y="0"/>
+          <a:chExt cx="0" cy="0"/>
+        </a:xfrm>
+      </p:grpSpPr>
+      <p:pic>
+        <p:nvPicPr>
+          <p:cNvPr id="3" name="Picture 2" descr="A screenshot of a cell phone&#10;&#10;Description automatically generated">
+            <a:extLst>
+              <a:ext uri="{FF2B5EF4-FFF2-40B4-BE49-F238E27FC236}">
+                <a16:creationId xmlns:a16="http://schemas.microsoft.com/office/drawing/2014/main" id="{B05D6D98-D2A4-4464-BE10-CDFF6597ED69}"/>
+              </a:ext>
+            </a:extLst>
+          </p:cNvPr>
+          <p:cNvPicPr>
+            <a:picLocks noChangeAspect="1"/>
+          </p:cNvPicPr>
+          <p:nvPr/>
+        </p:nvPicPr>
+        <p:blipFill>
+          <a:blip r:embed="rId2">
+            <a:extLst>
+              <a:ext uri="{28A0092B-C50C-407E-A947-70E740481C1C}">
+                <a14:useLocalDpi xmlns:a14="http://schemas.microsoft.com/office/drawing/2010/main" val="0"/>
+              </a:ext>
+            </a:extLst>
+          </a:blip>
+          <a:stretch>
+            <a:fillRect/>
+          </a:stretch>
+        </p:blipFill>
+        <p:spPr>
+          <a:xfrm>
+            <a:off x="1139538" y="27868"/>
+            <a:ext cx="10230339" cy="6758826"/>
+          </a:xfrm>
+          <a:prstGeom prst="rect">
+            <a:avLst/>
+          </a:prstGeom>
+        </p:spPr>
+      </p:pic>
+      <p:sp>
+        <p:nvSpPr>
+          <p:cNvPr id="5" name="TextBox 4">
+            <a:extLst>
+              <a:ext uri="{FF2B5EF4-FFF2-40B4-BE49-F238E27FC236}">
+                <a16:creationId xmlns:a16="http://schemas.microsoft.com/office/drawing/2014/main" id="{FBF2E48D-986D-4C70-989D-34C84E41D0AC}"/>
+              </a:ext>
+            </a:extLst>
+          </p:cNvPr>
+          <p:cNvSpPr txBox="1"/>
+          <p:nvPr/>
+        </p:nvSpPr>
+        <p:spPr>
+          <a:xfrm>
+            <a:off x="1812022" y="855678"/>
+            <a:ext cx="1249960" cy="369332"/>
+          </a:xfrm>
+          <a:prstGeom prst="rect">
+            <a:avLst/>
+          </a:prstGeom>
+          <a:noFill/>
+        </p:spPr>
+        <p:txBody>
+          <a:bodyPr wrap="square" rtlCol="0">
+            <a:spAutoFit/>
+          </a:bodyPr>
+          <a:lstStyle/>
+          <a:p>
+            <a:r>
+              <a:rPr lang="en-GB" dirty="0"/>
+              <a:t>R = -0.39</a:t>
+            </a:r>
+          </a:p>
+        </p:txBody>
+      </p:sp>
+      <p:sp>
+        <p:nvSpPr>
+          <p:cNvPr id="6" name="TextBox 5">
+            <a:extLst>
+              <a:ext uri="{FF2B5EF4-FFF2-40B4-BE49-F238E27FC236}">
+                <a16:creationId xmlns:a16="http://schemas.microsoft.com/office/drawing/2014/main" id="{18209A35-D8E3-4FAC-B531-9728287D4059}"/>
+              </a:ext>
+            </a:extLst>
+          </p:cNvPr>
+          <p:cNvSpPr txBox="1"/>
+          <p:nvPr/>
+        </p:nvSpPr>
+        <p:spPr>
+          <a:xfrm>
+            <a:off x="6905537" y="855678"/>
+            <a:ext cx="1249960" cy="369332"/>
+          </a:xfrm>
+          <a:prstGeom prst="rect">
+            <a:avLst/>
+          </a:prstGeom>
+          <a:noFill/>
+        </p:spPr>
+        <p:txBody>
+          <a:bodyPr wrap="square" rtlCol="0">
+            <a:spAutoFit/>
+          </a:bodyPr>
+          <a:lstStyle/>
+          <a:p>
+            <a:r>
+              <a:rPr lang="en-GB" dirty="0"/>
+              <a:t>R = -0.3</a:t>
+            </a:r>
+          </a:p>
+        </p:txBody>
+      </p:sp>
+      <p:sp>
+        <p:nvSpPr>
+          <p:cNvPr id="7" name="TextBox 6">
+            <a:extLst>
+              <a:ext uri="{FF2B5EF4-FFF2-40B4-BE49-F238E27FC236}">
+                <a16:creationId xmlns:a16="http://schemas.microsoft.com/office/drawing/2014/main" id="{8A95A2E1-8C58-4008-B58B-6EE9A24D9FE7}"/>
+              </a:ext>
+            </a:extLst>
+          </p:cNvPr>
+          <p:cNvSpPr txBox="1"/>
+          <p:nvPr/>
+        </p:nvSpPr>
+        <p:spPr>
+          <a:xfrm>
+            <a:off x="5050174" y="3807981"/>
+            <a:ext cx="1249960" cy="369332"/>
+          </a:xfrm>
+          <a:prstGeom prst="rect">
+            <a:avLst/>
+          </a:prstGeom>
+          <a:noFill/>
+        </p:spPr>
+        <p:txBody>
+          <a:bodyPr wrap="square" rtlCol="0">
+            <a:spAutoFit/>
+          </a:bodyPr>
+          <a:lstStyle/>
+          <a:p>
+            <a:r>
+              <a:rPr lang="en-GB" dirty="0"/>
+              <a:t>R = -0.35</a:t>
+            </a:r>
+          </a:p>
+        </p:txBody>
+      </p:sp>
+      <p:sp>
+        <p:nvSpPr>
+          <p:cNvPr id="8" name="TextBox 7">
+            <a:extLst>
+              <a:ext uri="{FF2B5EF4-FFF2-40B4-BE49-F238E27FC236}">
+                <a16:creationId xmlns:a16="http://schemas.microsoft.com/office/drawing/2014/main" id="{F139BAD6-FB90-41BB-839F-043B2697799D}"/>
+              </a:ext>
+            </a:extLst>
+          </p:cNvPr>
+          <p:cNvSpPr txBox="1"/>
+          <p:nvPr/>
+        </p:nvSpPr>
+        <p:spPr>
+          <a:xfrm>
+            <a:off x="10210769" y="3807981"/>
+            <a:ext cx="1249960" cy="369332"/>
+          </a:xfrm>
+          <a:prstGeom prst="rect">
+            <a:avLst/>
+          </a:prstGeom>
+          <a:noFill/>
+        </p:spPr>
+        <p:txBody>
+          <a:bodyPr wrap="square" rtlCol="0">
+            <a:spAutoFit/>
+          </a:bodyPr>
+          <a:lstStyle/>
+          <a:p>
+            <a:r>
+              <a:rPr lang="en-GB" dirty="0"/>
+              <a:t>R = -0.46</a:t>
+            </a:r>
+          </a:p>
+        </p:txBody>
+      </p:sp>
+    </p:spTree>
+    <p:extLst>
+      <p:ext uri="{BB962C8B-B14F-4D97-AF65-F5344CB8AC3E}">
+        <p14:creationId xmlns:p14="http://schemas.microsoft.com/office/powerpoint/2010/main" val="1797789806"/>
+      </p:ext>
+    </p:extLst>
+  </p:cSld>
+  <p:clrMapOvr>
+    <a:masterClrMapping/>
+  </p:clrMapOvr>
+</p:sld>
+</file>
+
+<file path=ppt/slides/slide33.xml><?xml version="1.0" encoding="utf-8"?>
+<p:sld xmlns:a="http://schemas.openxmlformats.org/drawingml/2006/main" xmlns:r="http://schemas.openxmlformats.org/officeDocument/2006/relationships" xmlns:p="http://schemas.openxmlformats.org/presentationml/2006/main">
+  <p:cSld>
+    <p:spTree>
+      <p:nvGrpSpPr>
+        <p:cNvPr id="1" name=""/>
+        <p:cNvGrpSpPr/>
+        <p:nvPr/>
+      </p:nvGrpSpPr>
+      <p:grpSpPr>
+        <a:xfrm>
+          <a:off x="0" y="0"/>
+          <a:ext cx="0" cy="0"/>
+          <a:chOff x="0" y="0"/>
+          <a:chExt cx="0" cy="0"/>
+        </a:xfrm>
+      </p:grpSpPr>
+      <p:pic>
+        <p:nvPicPr>
+          <p:cNvPr id="3" name="Picture 2" descr="A screenshot of a cell phone&#10;&#10;Description automatically generated">
+            <a:extLst>
+              <a:ext uri="{FF2B5EF4-FFF2-40B4-BE49-F238E27FC236}">
+                <a16:creationId xmlns:a16="http://schemas.microsoft.com/office/drawing/2014/main" id="{B05D6D98-D2A4-4464-BE10-CDFF6597ED69}"/>
+              </a:ext>
+            </a:extLst>
+          </p:cNvPr>
+          <p:cNvPicPr>
+            <a:picLocks noChangeAspect="1"/>
+          </p:cNvPicPr>
+          <p:nvPr/>
+        </p:nvPicPr>
+        <p:blipFill>
+          <a:blip r:embed="rId2">
+            <a:extLst>
+              <a:ext uri="{28A0092B-C50C-407E-A947-70E740481C1C}">
+                <a14:useLocalDpi xmlns:a14="http://schemas.microsoft.com/office/drawing/2010/main" val="0"/>
+              </a:ext>
+            </a:extLst>
+          </a:blip>
+          <a:stretch>
+            <a:fillRect/>
+          </a:stretch>
+        </p:blipFill>
+        <p:spPr>
+          <a:xfrm>
+            <a:off x="1139538" y="27868"/>
+            <a:ext cx="10230339" cy="6758826"/>
+          </a:xfrm>
+          <a:prstGeom prst="rect">
+            <a:avLst/>
+          </a:prstGeom>
+        </p:spPr>
+      </p:pic>
+      <p:sp>
+        <p:nvSpPr>
+          <p:cNvPr id="5" name="TextBox 4">
+            <a:extLst>
+              <a:ext uri="{FF2B5EF4-FFF2-40B4-BE49-F238E27FC236}">
+                <a16:creationId xmlns:a16="http://schemas.microsoft.com/office/drawing/2014/main" id="{FBF2E48D-986D-4C70-989D-34C84E41D0AC}"/>
+              </a:ext>
+            </a:extLst>
+          </p:cNvPr>
+          <p:cNvSpPr txBox="1"/>
+          <p:nvPr/>
+        </p:nvSpPr>
+        <p:spPr>
+          <a:xfrm>
+            <a:off x="1812022" y="855678"/>
+            <a:ext cx="1249960" cy="369332"/>
+          </a:xfrm>
+          <a:prstGeom prst="rect">
+            <a:avLst/>
+          </a:prstGeom>
+          <a:noFill/>
+        </p:spPr>
+        <p:txBody>
+          <a:bodyPr wrap="square" rtlCol="0">
+            <a:spAutoFit/>
+          </a:bodyPr>
+          <a:lstStyle/>
+          <a:p>
+            <a:r>
+              <a:rPr lang="en-GB" dirty="0"/>
+              <a:t>R = -0.39</a:t>
+            </a:r>
+          </a:p>
+        </p:txBody>
+      </p:sp>
+      <p:sp>
+        <p:nvSpPr>
+          <p:cNvPr id="6" name="TextBox 5">
+            <a:extLst>
+              <a:ext uri="{FF2B5EF4-FFF2-40B4-BE49-F238E27FC236}">
+                <a16:creationId xmlns:a16="http://schemas.microsoft.com/office/drawing/2014/main" id="{18209A35-D8E3-4FAC-B531-9728287D4059}"/>
+              </a:ext>
+            </a:extLst>
+          </p:cNvPr>
+          <p:cNvSpPr txBox="1"/>
+          <p:nvPr/>
+        </p:nvSpPr>
+        <p:spPr>
+          <a:xfrm>
+            <a:off x="6905537" y="855678"/>
+            <a:ext cx="1249960" cy="369332"/>
+          </a:xfrm>
+          <a:prstGeom prst="rect">
+            <a:avLst/>
+          </a:prstGeom>
+          <a:noFill/>
+        </p:spPr>
+        <p:txBody>
+          <a:bodyPr wrap="square" rtlCol="0">
+            <a:spAutoFit/>
+          </a:bodyPr>
+          <a:lstStyle/>
+          <a:p>
+            <a:r>
+              <a:rPr lang="en-GB" dirty="0"/>
+              <a:t>R = -0.3</a:t>
+            </a:r>
+          </a:p>
+        </p:txBody>
+      </p:sp>
+      <p:sp>
+        <p:nvSpPr>
+          <p:cNvPr id="7" name="TextBox 6">
+            <a:extLst>
+              <a:ext uri="{FF2B5EF4-FFF2-40B4-BE49-F238E27FC236}">
+                <a16:creationId xmlns:a16="http://schemas.microsoft.com/office/drawing/2014/main" id="{8A95A2E1-8C58-4008-B58B-6EE9A24D9FE7}"/>
+              </a:ext>
+            </a:extLst>
+          </p:cNvPr>
+          <p:cNvSpPr txBox="1"/>
+          <p:nvPr/>
+        </p:nvSpPr>
+        <p:spPr>
+          <a:xfrm>
+            <a:off x="5050174" y="3807981"/>
+            <a:ext cx="1249960" cy="369332"/>
+          </a:xfrm>
+          <a:prstGeom prst="rect">
+            <a:avLst/>
+          </a:prstGeom>
+          <a:noFill/>
+        </p:spPr>
+        <p:txBody>
+          <a:bodyPr wrap="square" rtlCol="0">
+            <a:spAutoFit/>
+          </a:bodyPr>
+          <a:lstStyle/>
+          <a:p>
+            <a:r>
+              <a:rPr lang="en-GB" dirty="0"/>
+              <a:t>R = -0.35</a:t>
+            </a:r>
+          </a:p>
+        </p:txBody>
+      </p:sp>
+      <p:sp>
+        <p:nvSpPr>
+          <p:cNvPr id="8" name="TextBox 7">
+            <a:extLst>
+              <a:ext uri="{FF2B5EF4-FFF2-40B4-BE49-F238E27FC236}">
+                <a16:creationId xmlns:a16="http://schemas.microsoft.com/office/drawing/2014/main" id="{F139BAD6-FB90-41BB-839F-043B2697799D}"/>
+              </a:ext>
+            </a:extLst>
+          </p:cNvPr>
+          <p:cNvSpPr txBox="1"/>
+          <p:nvPr/>
+        </p:nvSpPr>
+        <p:spPr>
+          <a:xfrm>
+            <a:off x="10210769" y="3807981"/>
+            <a:ext cx="1249960" cy="369332"/>
+          </a:xfrm>
+          <a:prstGeom prst="rect">
+            <a:avLst/>
+          </a:prstGeom>
+          <a:noFill/>
+        </p:spPr>
+        <p:txBody>
+          <a:bodyPr wrap="square" rtlCol="0">
+            <a:spAutoFit/>
+          </a:bodyPr>
+          <a:lstStyle/>
+          <a:p>
+            <a:r>
+              <a:rPr lang="en-GB" dirty="0"/>
+              <a:t>R = -0.46</a:t>
+            </a:r>
+          </a:p>
+        </p:txBody>
+      </p:sp>
+      <p:sp>
+        <p:nvSpPr>
+          <p:cNvPr id="2" name="TextBox 1">
+            <a:extLst>
+              <a:ext uri="{FF2B5EF4-FFF2-40B4-BE49-F238E27FC236}">
+                <a16:creationId xmlns:a16="http://schemas.microsoft.com/office/drawing/2014/main" id="{2B7317A3-5D7E-4312-86FA-90C0D46BA895}"/>
+              </a:ext>
+            </a:extLst>
+          </p:cNvPr>
+          <p:cNvSpPr txBox="1"/>
+          <p:nvPr/>
+        </p:nvSpPr>
+        <p:spPr>
+          <a:xfrm>
+            <a:off x="5050174" y="855678"/>
+            <a:ext cx="3187815" cy="923330"/>
+          </a:xfrm>
+          <a:prstGeom prst="rect">
+            <a:avLst/>
+          </a:prstGeom>
+          <a:solidFill>
+            <a:schemeClr val="bg1"/>
+          </a:solidFill>
+        </p:spPr>
+        <p:txBody>
+          <a:bodyPr wrap="square" rtlCol="0">
+            <a:spAutoFit/>
+          </a:bodyPr>
+          <a:lstStyle/>
+          <a:p>
+            <a:r>
+              <a:rPr lang="en-GB" dirty="0"/>
+              <a:t>Despite the R values, it looks like there is little correlation between HR and time. </a:t>
+            </a:r>
+          </a:p>
+        </p:txBody>
+      </p:sp>
+      <p:sp>
+        <p:nvSpPr>
+          <p:cNvPr id="9" name="TextBox 8">
+            <a:extLst>
+              <a:ext uri="{FF2B5EF4-FFF2-40B4-BE49-F238E27FC236}">
+                <a16:creationId xmlns:a16="http://schemas.microsoft.com/office/drawing/2014/main" id="{EE3188FC-41EC-47D6-A397-6C9F1CF55C1C}"/>
+              </a:ext>
+            </a:extLst>
+          </p:cNvPr>
+          <p:cNvSpPr txBox="1"/>
+          <p:nvPr/>
+        </p:nvSpPr>
+        <p:spPr>
+          <a:xfrm>
+            <a:off x="4081246" y="3715648"/>
+            <a:ext cx="3187815" cy="2031325"/>
+          </a:xfrm>
+          <a:prstGeom prst="rect">
+            <a:avLst/>
+          </a:prstGeom>
+          <a:solidFill>
+            <a:schemeClr val="bg1"/>
+          </a:solidFill>
+        </p:spPr>
+        <p:txBody>
+          <a:bodyPr wrap="square" rtlCol="0">
+            <a:spAutoFit/>
+          </a:bodyPr>
+          <a:lstStyle/>
+          <a:p>
+            <a:r>
+              <a:rPr lang="en-GB" dirty="0"/>
+              <a:t>Once again, other than Delta Day, Run Cadence and Stride Length are showing the strongest negative correlations with time. This makes sense as a combination of these two factors surely controls the pace. </a:t>
+            </a:r>
+          </a:p>
+        </p:txBody>
+      </p:sp>
+    </p:spTree>
+    <p:extLst>
+      <p:ext uri="{BB962C8B-B14F-4D97-AF65-F5344CB8AC3E}">
+        <p14:creationId xmlns:p14="http://schemas.microsoft.com/office/powerpoint/2010/main" val="4274103117"/>
+      </p:ext>
+    </p:extLst>
+  </p:cSld>
+  <p:clrMapOvr>
+    <a:masterClrMapping/>
+  </p:clrMapOvr>
+</p:sld>
+</file>
+
+<file path=ppt/slides/slide34.xml><?xml version="1.0" encoding="utf-8"?>
+<p:sld xmlns:a="http://schemas.openxmlformats.org/drawingml/2006/main" xmlns:r="http://schemas.openxmlformats.org/officeDocument/2006/relationships" xmlns:p="http://schemas.openxmlformats.org/presentationml/2006/main">
+  <p:cSld>
+    <p:spTree>
+      <p:nvGrpSpPr>
+        <p:cNvPr id="1" name=""/>
+        <p:cNvGrpSpPr/>
+        <p:nvPr/>
+      </p:nvGrpSpPr>
+      <p:grpSpPr>
+        <a:xfrm>
+          <a:off x="0" y="0"/>
+          <a:ext cx="0" cy="0"/>
+          <a:chOff x="0" y="0"/>
+          <a:chExt cx="0" cy="0"/>
+        </a:xfrm>
+      </p:grpSpPr>
+      <p:pic>
+        <p:nvPicPr>
+          <p:cNvPr id="3" name="Picture 2" descr="A close up of a map&#10;&#10;Description automatically generated">
+            <a:extLst>
+              <a:ext uri="{FF2B5EF4-FFF2-40B4-BE49-F238E27FC236}">
+                <a16:creationId xmlns:a16="http://schemas.microsoft.com/office/drawing/2014/main" id="{7D3BF0B0-0C20-42CE-9AF4-C606398C9944}"/>
+              </a:ext>
+            </a:extLst>
+          </p:cNvPr>
+          <p:cNvPicPr>
+            <a:picLocks noChangeAspect="1"/>
+          </p:cNvPicPr>
+          <p:nvPr/>
+        </p:nvPicPr>
+        <p:blipFill>
+          <a:blip r:embed="rId2">
+            <a:extLst>
+              <a:ext uri="{28A0092B-C50C-407E-A947-70E740481C1C}">
+                <a14:useLocalDpi xmlns:a14="http://schemas.microsoft.com/office/drawing/2010/main" val="0"/>
+              </a:ext>
+            </a:extLst>
+          </a:blip>
+          <a:stretch>
+            <a:fillRect/>
+          </a:stretch>
+        </p:blipFill>
+        <p:spPr>
+          <a:xfrm>
+            <a:off x="1038945" y="0"/>
+            <a:ext cx="10114109" cy="6858000"/>
+          </a:xfrm>
+          <a:prstGeom prst="rect">
+            <a:avLst/>
+          </a:prstGeom>
+        </p:spPr>
+      </p:pic>
+    </p:spTree>
+    <p:extLst>
+      <p:ext uri="{BB962C8B-B14F-4D97-AF65-F5344CB8AC3E}">
+        <p14:creationId xmlns:p14="http://schemas.microsoft.com/office/powerpoint/2010/main" val="3447369500"/>
+      </p:ext>
+    </p:extLst>
+  </p:cSld>
+  <p:clrMapOvr>
+    <a:masterClrMapping/>
+  </p:clrMapOvr>
+</p:sld>
+</file>
+
+<file path=ppt/slides/slide35.xml><?xml version="1.0" encoding="utf-8"?>
+<p:sld xmlns:a="http://schemas.openxmlformats.org/drawingml/2006/main" xmlns:r="http://schemas.openxmlformats.org/officeDocument/2006/relationships" xmlns:p="http://schemas.openxmlformats.org/presentationml/2006/main">
+  <p:cSld>
+    <p:spTree>
+      <p:nvGrpSpPr>
+        <p:cNvPr id="1" name=""/>
+        <p:cNvGrpSpPr/>
+        <p:nvPr/>
+      </p:nvGrpSpPr>
+      <p:grpSpPr>
+        <a:xfrm>
+          <a:off x="0" y="0"/>
+          <a:ext cx="0" cy="0"/>
+          <a:chOff x="0" y="0"/>
+          <a:chExt cx="0" cy="0"/>
+        </a:xfrm>
+      </p:grpSpPr>
+      <p:pic>
+        <p:nvPicPr>
+          <p:cNvPr id="3" name="Picture 2" descr="A close up of a map&#10;&#10;Description automatically generated">
+            <a:extLst>
+              <a:ext uri="{FF2B5EF4-FFF2-40B4-BE49-F238E27FC236}">
+                <a16:creationId xmlns:a16="http://schemas.microsoft.com/office/drawing/2014/main" id="{7D3BF0B0-0C20-42CE-9AF4-C606398C9944}"/>
+              </a:ext>
+            </a:extLst>
+          </p:cNvPr>
+          <p:cNvPicPr>
+            <a:picLocks noChangeAspect="1"/>
+          </p:cNvPicPr>
+          <p:nvPr/>
+        </p:nvPicPr>
+        <p:blipFill>
+          <a:blip r:embed="rId2">
+            <a:extLst>
+              <a:ext uri="{28A0092B-C50C-407E-A947-70E740481C1C}">
+                <a14:useLocalDpi xmlns:a14="http://schemas.microsoft.com/office/drawing/2010/main" val="0"/>
+              </a:ext>
+            </a:extLst>
+          </a:blip>
+          <a:stretch>
+            <a:fillRect/>
+          </a:stretch>
+        </p:blipFill>
+        <p:spPr>
+          <a:xfrm>
+            <a:off x="1038945" y="0"/>
+            <a:ext cx="10114109" cy="6858000"/>
+          </a:xfrm>
+          <a:prstGeom prst="rect">
+            <a:avLst/>
+          </a:prstGeom>
+        </p:spPr>
+      </p:pic>
+      <p:sp>
+        <p:nvSpPr>
+          <p:cNvPr id="2" name="TextBox 1">
+            <a:extLst>
+              <a:ext uri="{FF2B5EF4-FFF2-40B4-BE49-F238E27FC236}">
+                <a16:creationId xmlns:a16="http://schemas.microsoft.com/office/drawing/2014/main" id="{FEA31A86-DB23-4F17-B4A0-85C4DDB7912A}"/>
+              </a:ext>
+            </a:extLst>
+          </p:cNvPr>
+          <p:cNvSpPr txBox="1"/>
+          <p:nvPr/>
+        </p:nvSpPr>
+        <p:spPr>
+          <a:xfrm>
+            <a:off x="5016617" y="3020037"/>
+            <a:ext cx="4102217" cy="1200329"/>
+          </a:xfrm>
+          <a:prstGeom prst="rect">
+            <a:avLst/>
+          </a:prstGeom>
+          <a:solidFill>
+            <a:schemeClr val="bg1"/>
+          </a:solidFill>
+        </p:spPr>
+        <p:txBody>
+          <a:bodyPr wrap="square" rtlCol="0">
+            <a:spAutoFit/>
+          </a:bodyPr>
+          <a:lstStyle/>
+          <a:p>
+            <a:r>
+              <a:rPr lang="en-GB" dirty="0"/>
+              <a:t>There is no need to look at higher order than a linear fit with this trend, especially due to the lack of data points increasing the chances of overfitting. </a:t>
+            </a:r>
+          </a:p>
+        </p:txBody>
+      </p:sp>
+    </p:spTree>
+    <p:extLst>
+      <p:ext uri="{BB962C8B-B14F-4D97-AF65-F5344CB8AC3E}">
+        <p14:creationId xmlns:p14="http://schemas.microsoft.com/office/powerpoint/2010/main" val="2788930886"/>
+      </p:ext>
+    </p:extLst>
+  </p:cSld>
+  <p:clrMapOvr>
+    <a:masterClrMapping/>
+  </p:clrMapOvr>
+</p:sld>
+</file>
+
+<file path=ppt/slides/slide36.xml><?xml version="1.0" encoding="utf-8"?>
+<p:sld xmlns:a="http://schemas.openxmlformats.org/drawingml/2006/main" xmlns:r="http://schemas.openxmlformats.org/officeDocument/2006/relationships" xmlns:p="http://schemas.openxmlformats.org/presentationml/2006/main">
+  <p:cSld>
+    <p:spTree>
+      <p:nvGrpSpPr>
+        <p:cNvPr id="1" name=""/>
+        <p:cNvGrpSpPr/>
+        <p:nvPr/>
+      </p:nvGrpSpPr>
+      <p:grpSpPr>
+        <a:xfrm>
+          <a:off x="0" y="0"/>
+          <a:ext cx="0" cy="0"/>
+          <a:chOff x="0" y="0"/>
+          <a:chExt cx="0" cy="0"/>
+        </a:xfrm>
+      </p:grpSpPr>
+      <p:sp>
+        <p:nvSpPr>
+          <p:cNvPr id="2" name="Title 1">
+            <a:extLst>
+              <a:ext uri="{FF2B5EF4-FFF2-40B4-BE49-F238E27FC236}">
+                <a16:creationId xmlns:a16="http://schemas.microsoft.com/office/drawing/2014/main" id="{78140A36-B8B4-45EB-88EB-AE54A3EBA06B}"/>
+              </a:ext>
+            </a:extLst>
+          </p:cNvPr>
+          <p:cNvSpPr>
+            <a:spLocks noGrp="1"/>
+          </p:cNvSpPr>
+          <p:nvPr>
+            <p:ph type="title"/>
+          </p:nvPr>
+        </p:nvSpPr>
+        <p:spPr/>
+        <p:txBody>
+          <a:bodyPr/>
+          <a:lstStyle/>
+          <a:p>
+            <a:r>
+              <a:rPr lang="en-GB" dirty="0"/>
+              <a:t>Some other interesting stats. . . </a:t>
+            </a:r>
+          </a:p>
+        </p:txBody>
+      </p:sp>
+      <p:sp>
+        <p:nvSpPr>
+          <p:cNvPr id="3" name="Content Placeholder 2">
+            <a:extLst>
+              <a:ext uri="{FF2B5EF4-FFF2-40B4-BE49-F238E27FC236}">
+                <a16:creationId xmlns:a16="http://schemas.microsoft.com/office/drawing/2014/main" id="{869C1753-7B55-4CA2-9160-D1CBABA9CECE}"/>
+              </a:ext>
+            </a:extLst>
+          </p:cNvPr>
+          <p:cNvSpPr>
+            <a:spLocks noGrp="1"/>
+          </p:cNvSpPr>
+          <p:nvPr>
+            <p:ph idx="1"/>
+          </p:nvPr>
+        </p:nvSpPr>
+        <p:spPr/>
+        <p:txBody>
+          <a:bodyPr/>
+          <a:lstStyle/>
+          <a:p>
+            <a:r>
+              <a:rPr lang="en-GB" dirty="0"/>
+              <a:t>Difference between slowest and quickest 10k run: </a:t>
+            </a:r>
+            <a:r>
+              <a:rPr lang="en-GB" b="1" dirty="0"/>
+              <a:t>10 minutes and 35 seconds</a:t>
+            </a:r>
+          </a:p>
+          <a:p>
+            <a:r>
+              <a:rPr lang="en-GB" dirty="0"/>
+              <a:t>Difference between earliest and latest date: </a:t>
+            </a:r>
+            <a:r>
+              <a:rPr lang="en-GB" b="1" dirty="0"/>
+              <a:t>5 minutes and 21 seconds</a:t>
+            </a:r>
+          </a:p>
+          <a:p>
+            <a:r>
+              <a:rPr lang="en-GB" dirty="0"/>
+              <a:t>10k PB is: </a:t>
+            </a:r>
+            <a:r>
+              <a:rPr lang="en-GB" b="1" dirty="0"/>
+              <a:t>1 Hour, 10minutes and 3 seconds</a:t>
+            </a:r>
+          </a:p>
+        </p:txBody>
+      </p:sp>
+    </p:spTree>
+    <p:extLst>
+      <p:ext uri="{BB962C8B-B14F-4D97-AF65-F5344CB8AC3E}">
+        <p14:creationId xmlns:p14="http://schemas.microsoft.com/office/powerpoint/2010/main" val="3331324030"/>
+      </p:ext>
+    </p:extLst>
+  </p:cSld>
+  <p:clrMapOvr>
+    <a:masterClrMapping/>
+  </p:clrMapOvr>
+</p:sld>
+</file>
+
+<file path=ppt/slides/slide37.xml><?xml version="1.0" encoding="utf-8"?>
+<p:sld xmlns:a="http://schemas.openxmlformats.org/drawingml/2006/main" xmlns:r="http://schemas.openxmlformats.org/officeDocument/2006/relationships" xmlns:p="http://schemas.openxmlformats.org/presentationml/2006/main">
+  <p:cSld>
+    <p:spTree>
+      <p:nvGrpSpPr>
+        <p:cNvPr id="1" name=""/>
+        <p:cNvGrpSpPr/>
+        <p:nvPr/>
+      </p:nvGrpSpPr>
+      <p:grpSpPr>
+        <a:xfrm>
+          <a:off x="0" y="0"/>
+          <a:ext cx="0" cy="0"/>
+          <a:chOff x="0" y="0"/>
+          <a:chExt cx="0" cy="0"/>
+        </a:xfrm>
+      </p:grpSpPr>
+      <p:sp>
+        <p:nvSpPr>
+          <p:cNvPr id="2" name="Title 1">
+            <a:extLst>
+              <a:ext uri="{FF2B5EF4-FFF2-40B4-BE49-F238E27FC236}">
+                <a16:creationId xmlns:a16="http://schemas.microsoft.com/office/drawing/2014/main" id="{0C7E1DFF-F7A0-44F6-BD06-6BBEE32EF127}"/>
+              </a:ext>
+            </a:extLst>
+          </p:cNvPr>
+          <p:cNvSpPr>
+            <a:spLocks noGrp="1"/>
+          </p:cNvSpPr>
+          <p:nvPr>
+            <p:ph type="title"/>
+          </p:nvPr>
+        </p:nvSpPr>
+        <p:spPr/>
+        <p:txBody>
+          <a:bodyPr/>
+          <a:lstStyle/>
+          <a:p>
+            <a:r>
+              <a:rPr lang="en-GB" dirty="0"/>
+              <a:t>Conclusions</a:t>
+            </a:r>
+          </a:p>
+        </p:txBody>
+      </p:sp>
+      <p:sp>
+        <p:nvSpPr>
+          <p:cNvPr id="3" name="Content Placeholder 2">
+            <a:extLst>
+              <a:ext uri="{FF2B5EF4-FFF2-40B4-BE49-F238E27FC236}">
+                <a16:creationId xmlns:a16="http://schemas.microsoft.com/office/drawing/2014/main" id="{E4908759-7A35-4432-B741-EB06150559D8}"/>
+              </a:ext>
+            </a:extLst>
+          </p:cNvPr>
+          <p:cNvSpPr>
+            <a:spLocks noGrp="1"/>
+          </p:cNvSpPr>
+          <p:nvPr>
+            <p:ph idx="1"/>
+          </p:nvPr>
+        </p:nvSpPr>
+        <p:spPr/>
+        <p:txBody>
+          <a:bodyPr/>
+          <a:lstStyle/>
+          <a:p>
+            <a:r>
+              <a:rPr lang="en-GB" dirty="0"/>
+              <a:t>The data shows few surprises. </a:t>
+            </a:r>
+          </a:p>
+          <a:p>
+            <a:r>
+              <a:rPr lang="en-GB" dirty="0"/>
+              <a:t>Both 5k and 10k runs show quicker times the later the run has been done indicating significant improvement! </a:t>
+            </a:r>
+          </a:p>
+          <a:p>
+            <a:r>
+              <a:rPr lang="en-GB" dirty="0"/>
+              <a:t>Could future times be predicted using machine learning methodology? </a:t>
+            </a:r>
+          </a:p>
+          <a:p>
+            <a:r>
+              <a:rPr lang="en-GB" dirty="0"/>
+              <a:t>Which features would be useful in estimating future times? </a:t>
+            </a:r>
+          </a:p>
+          <a:p>
+            <a:r>
+              <a:rPr lang="en-GB" dirty="0"/>
+              <a:t>Is there more data available? </a:t>
+            </a:r>
+          </a:p>
+          <a:p>
+            <a:r>
+              <a:rPr lang="en-GB" dirty="0"/>
+              <a:t>What other relationships exist other than in relation to time? Calories? </a:t>
+            </a:r>
+          </a:p>
+        </p:txBody>
+      </p:sp>
+    </p:spTree>
+    <p:extLst>
+      <p:ext uri="{BB962C8B-B14F-4D97-AF65-F5344CB8AC3E}">
+        <p14:creationId xmlns:p14="http://schemas.microsoft.com/office/powerpoint/2010/main" val="213070493"/>
       </p:ext>
     </p:extLst>
   </p:cSld>
@@ -7311,7 +9625,7 @@
           <p:cNvPr id="2" name="Title 1">
             <a:extLst>
               <a:ext uri="{FF2B5EF4-FFF2-40B4-BE49-F238E27FC236}">
-                <a16:creationId xmlns:a16="http://schemas.microsoft.com/office/drawing/2014/main" id="{854C52A5-9E9A-44D7-B12E-0FD122D8A7A3}"/>
+                <a16:creationId xmlns:a16="http://schemas.microsoft.com/office/drawing/2014/main" id="{74E9F826-5C6E-4474-BE7E-DEC7BF10A7D7}"/>
               </a:ext>
             </a:extLst>
           </p:cNvPr>
@@ -7329,7 +9643,7 @@
           <a:p>
             <a:r>
               <a:rPr lang="en-GB" dirty="0"/>
-              <a:t>Introduction</a:t>
+              <a:t>Contents</a:t>
             </a:r>
           </a:p>
         </p:txBody>
@@ -7339,7 +9653,7 @@
           <p:cNvPr id="3" name="Content Placeholder 2">
             <a:extLst>
               <a:ext uri="{FF2B5EF4-FFF2-40B4-BE49-F238E27FC236}">
-                <a16:creationId xmlns:a16="http://schemas.microsoft.com/office/drawing/2014/main" id="{5485ED19-43AA-4F1C-B23F-3D5812474831}"/>
+                <a16:creationId xmlns:a16="http://schemas.microsoft.com/office/drawing/2014/main" id="{6507AB12-866C-4630-8EBA-A96761B739A0}"/>
               </a:ext>
             </a:extLst>
           </p:cNvPr>
@@ -7355,14 +9669,61 @@
           <a:bodyPr/>
           <a:lstStyle/>
           <a:p>
-            <a:endParaRPr lang="en-GB"/>
+            <a:pPr marL="514350" indent="-514350">
+              <a:buFont typeface="+mj-lt"/>
+              <a:buAutoNum type="arabicPeriod"/>
+            </a:pPr>
+            <a:r>
+              <a:rPr lang="en-GB" dirty="0"/>
+              <a:t>Introduction</a:t>
+            </a:r>
+          </a:p>
+          <a:p>
+            <a:pPr marL="514350" indent="-514350">
+              <a:buFont typeface="+mj-lt"/>
+              <a:buAutoNum type="arabicPeriod"/>
+            </a:pPr>
+            <a:r>
+              <a:rPr lang="en-GB" b="1" dirty="0"/>
+              <a:t>First Impressions</a:t>
+            </a:r>
+          </a:p>
+          <a:p>
+            <a:pPr marL="514350" indent="-514350">
+              <a:buFont typeface="+mj-lt"/>
+              <a:buAutoNum type="arabicPeriod"/>
+            </a:pPr>
+            <a:r>
+              <a:rPr lang="en-GB" dirty="0"/>
+              <a:t>5k Data</a:t>
+            </a:r>
+          </a:p>
+          <a:p>
+            <a:pPr marL="514350" indent="-514350">
+              <a:buFont typeface="+mj-lt"/>
+              <a:buAutoNum type="arabicPeriod"/>
+            </a:pPr>
+            <a:r>
+              <a:rPr lang="en-GB" dirty="0"/>
+              <a:t>10k Data</a:t>
+            </a:r>
+          </a:p>
+          <a:p>
+            <a:pPr marL="514350" indent="-514350">
+              <a:buFont typeface="+mj-lt"/>
+              <a:buAutoNum type="arabicPeriod"/>
+            </a:pPr>
+            <a:r>
+              <a:rPr lang="en-GB" dirty="0"/>
+              <a:t>Conclusion</a:t>
+            </a:r>
           </a:p>
         </p:txBody>
       </p:sp>
     </p:spTree>
     <p:extLst>
       <p:ext uri="{BB962C8B-B14F-4D97-AF65-F5344CB8AC3E}">
-        <p14:creationId xmlns:p14="http://schemas.microsoft.com/office/powerpoint/2010/main" val="1513206591"/>
+        <p14:creationId xmlns:p14="http://schemas.microsoft.com/office/powerpoint/2010/main" val="2039197248"/>
       </p:ext>
     </p:extLst>
   </p:cSld>
@@ -7436,11 +9797,13 @@
         <p:spPr>
           <a:xfrm>
             <a:off x="838200" y="1825625"/>
-            <a:ext cx="8664559" cy="4351338"/>
-          </a:xfrm>
-        </p:spPr>
-        <p:txBody>
-          <a:bodyPr/>
+            <a:ext cx="7617903" cy="4351338"/>
+          </a:xfrm>
+        </p:spPr>
+        <p:txBody>
+          <a:bodyPr>
+            <a:normAutofit fontScale="77500" lnSpcReduction="20000"/>
+          </a:bodyPr>
           <a:lstStyle/>
           <a:p>
             <a:r>
@@ -7476,6 +9839,23 @@
             <a:r>
               <a:rPr lang="en-GB" dirty="0"/>
               <a:t>Dates: 03/12/2017 – 30/07/2019</a:t>
+            </a:r>
+          </a:p>
+          <a:p>
+            <a:endParaRPr lang="en-GB" dirty="0"/>
+          </a:p>
+          <a:p>
+            <a:r>
+              <a:rPr lang="en-GB" dirty="0"/>
+              <a:t>Note: A feature often seen on the y axis of plots is ‘</a:t>
+            </a:r>
+            <a:r>
+              <a:rPr lang="en-GB" dirty="0" err="1"/>
+              <a:t>Time_dec_min</a:t>
+            </a:r>
+            <a:r>
+              <a:rPr lang="en-GB" dirty="0"/>
+              <a:t>’. This is short hand for decimal minutes. Time was recorded in an awkward format so was converted to decimal minutes, e.g. 2:30 minutes would be 2.5 minutes. This is a little confusing but as we are generally looking at things on a scale of multiple minutes, it should not be a problem. </a:t>
             </a:r>
           </a:p>
           <a:p>

</xml_diff>

<commit_message>
Add final summary slide
Add final summary slide with final stats on.
</commit_message>
<xml_diff>
--- a/Data_Summary.pptx
+++ b/Data_Summary.pptx
@@ -42,6 +42,7 @@
     <p:sldId id="290" r:id="rId36"/>
     <p:sldId id="294" r:id="rId37"/>
     <p:sldId id="295" r:id="rId38"/>
+    <p:sldId id="296" r:id="rId39"/>
   </p:sldIdLst>
   <p:sldSz cx="12192000" cy="6858000"/>
   <p:notesSz cx="6858000" cy="9144000"/>
@@ -6977,7 +6978,7 @@
           <a:p>
             <a:r>
               <a:rPr lang="en-GB" dirty="0"/>
-              <a:t>Some other interesting stats. . . </a:t>
+              <a:t>Some other interesting stats. . . (5km) </a:t>
             </a:r>
           </a:p>
         </p:txBody>
@@ -9417,7 +9418,7 @@
           <a:p>
             <a:r>
               <a:rPr lang="en-GB" dirty="0"/>
-              <a:t>Some other interesting stats. . . </a:t>
+              <a:t>Some other interesting stats. . . (10km) </a:t>
             </a:r>
           </a:p>
         </p:txBody>
@@ -9594,6 +9595,124 @@
     <p:extLst>
       <p:ext uri="{BB962C8B-B14F-4D97-AF65-F5344CB8AC3E}">
         <p14:creationId xmlns:p14="http://schemas.microsoft.com/office/powerpoint/2010/main" val="213070493"/>
+      </p:ext>
+    </p:extLst>
+  </p:cSld>
+  <p:clrMapOvr>
+    <a:masterClrMapping/>
+  </p:clrMapOvr>
+</p:sld>
+</file>
+
+<file path=ppt/slides/slide38.xml><?xml version="1.0" encoding="utf-8"?>
+<p:sld xmlns:a="http://schemas.openxmlformats.org/drawingml/2006/main" xmlns:r="http://schemas.openxmlformats.org/officeDocument/2006/relationships" xmlns:p="http://schemas.openxmlformats.org/presentationml/2006/main">
+  <p:cSld>
+    <p:spTree>
+      <p:nvGrpSpPr>
+        <p:cNvPr id="1" name=""/>
+        <p:cNvGrpSpPr/>
+        <p:nvPr/>
+      </p:nvGrpSpPr>
+      <p:grpSpPr>
+        <a:xfrm>
+          <a:off x="0" y="0"/>
+          <a:ext cx="0" cy="0"/>
+          <a:chOff x="0" y="0"/>
+          <a:chExt cx="0" cy="0"/>
+        </a:xfrm>
+      </p:grpSpPr>
+      <p:sp>
+        <p:nvSpPr>
+          <p:cNvPr id="2" name="Title 1">
+            <a:extLst>
+              <a:ext uri="{FF2B5EF4-FFF2-40B4-BE49-F238E27FC236}">
+                <a16:creationId xmlns:a16="http://schemas.microsoft.com/office/drawing/2014/main" id="{E2C0C0F8-A11F-4880-89E2-CAE3E00D392D}"/>
+              </a:ext>
+            </a:extLst>
+          </p:cNvPr>
+          <p:cNvSpPr>
+            <a:spLocks noGrp="1"/>
+          </p:cNvSpPr>
+          <p:nvPr>
+            <p:ph type="title"/>
+          </p:nvPr>
+        </p:nvSpPr>
+        <p:spPr/>
+        <p:txBody>
+          <a:bodyPr/>
+          <a:lstStyle/>
+          <a:p>
+            <a:r>
+              <a:rPr lang="en-GB" dirty="0"/>
+              <a:t>Finally. . . </a:t>
+            </a:r>
+          </a:p>
+        </p:txBody>
+      </p:sp>
+      <p:sp>
+        <p:nvSpPr>
+          <p:cNvPr id="3" name="Content Placeholder 2">
+            <a:extLst>
+              <a:ext uri="{FF2B5EF4-FFF2-40B4-BE49-F238E27FC236}">
+                <a16:creationId xmlns:a16="http://schemas.microsoft.com/office/drawing/2014/main" id="{671E8D2A-9D4A-4DD9-B759-92B17ABD3153}"/>
+              </a:ext>
+            </a:extLst>
+          </p:cNvPr>
+          <p:cNvSpPr>
+            <a:spLocks noGrp="1"/>
+          </p:cNvSpPr>
+          <p:nvPr>
+            <p:ph idx="1"/>
+          </p:nvPr>
+        </p:nvSpPr>
+        <p:spPr/>
+        <p:txBody>
+          <a:bodyPr/>
+          <a:lstStyle/>
+          <a:p>
+            <a:r>
+              <a:rPr lang="en-GB" dirty="0"/>
+              <a:t>You ran 1379.65 kms for a total time of 171:35:33 (</a:t>
+            </a:r>
+            <a:r>
+              <a:rPr lang="en-GB" dirty="0" err="1"/>
+              <a:t>hh:mm:ss</a:t>
+            </a:r>
+            <a:r>
+              <a:rPr lang="en-GB" dirty="0"/>
+              <a:t>) (over 7 days of running!!), over 603 days, burning </a:t>
+            </a:r>
+            <a:r>
+              <a:rPr lang="en-GB"/>
+              <a:t>146646 calories </a:t>
+            </a:r>
+            <a:r>
+              <a:rPr lang="en-GB" dirty="0"/>
+              <a:t>between the 03/12/12 – 30/07/19. </a:t>
+            </a:r>
+          </a:p>
+          <a:p>
+            <a:endParaRPr lang="en-GB" dirty="0"/>
+          </a:p>
+          <a:p>
+            <a:r>
+              <a:rPr lang="en-GB" dirty="0"/>
+              <a:t>WELL DONE! </a:t>
+            </a:r>
+            <a:r>
+              <a:rPr lang="en-GB" dirty="0">
+                <a:sym typeface="Wingdings" panose="05000000000000000000" pitchFamily="2" charset="2"/>
+              </a:rPr>
+              <a:t></a:t>
+            </a:r>
+            <a:endParaRPr lang="en-GB" dirty="0"/>
+          </a:p>
+        </p:txBody>
+      </p:sp>
+    </p:spTree>
+    <p:extLst>
+      <p:ext uri="{BB962C8B-B14F-4D97-AF65-F5344CB8AC3E}">
+        <p14:creationId xmlns:p14="http://schemas.microsoft.com/office/powerpoint/2010/main" val="886234964"/>
       </p:ext>
     </p:extLst>
   </p:cSld>

</xml_diff>